<commit_message>
edit scheme in home
</commit_message>
<xml_diff>
--- a/scheme.pptx
+++ b/scheme.pptx
@@ -12,27 +12,31 @@
     <p:sldId id="310" r:id="rId6"/>
     <p:sldId id="321" r:id="rId7"/>
     <p:sldId id="323" r:id="rId8"/>
-    <p:sldId id="325" r:id="rId9"/>
-    <p:sldId id="327" r:id="rId10"/>
-    <p:sldId id="339" r:id="rId11"/>
-    <p:sldId id="326" r:id="rId12"/>
-    <p:sldId id="330" r:id="rId13"/>
-    <p:sldId id="331" r:id="rId14"/>
-    <p:sldId id="332" r:id="rId15"/>
-    <p:sldId id="341" r:id="rId16"/>
-    <p:sldId id="343" r:id="rId17"/>
-    <p:sldId id="344" r:id="rId18"/>
-    <p:sldId id="347" r:id="rId19"/>
-    <p:sldId id="342" r:id="rId20"/>
-    <p:sldId id="334" r:id="rId21"/>
-    <p:sldId id="335" r:id="rId22"/>
-    <p:sldId id="336" r:id="rId23"/>
-    <p:sldId id="337" r:id="rId24"/>
-    <p:sldId id="338" r:id="rId25"/>
-    <p:sldId id="329" r:id="rId26"/>
-    <p:sldId id="322" r:id="rId27"/>
-    <p:sldId id="328" r:id="rId28"/>
-    <p:sldId id="276" r:id="rId29"/>
+    <p:sldId id="348" r:id="rId9"/>
+    <p:sldId id="325" r:id="rId10"/>
+    <p:sldId id="327" r:id="rId11"/>
+    <p:sldId id="339" r:id="rId12"/>
+    <p:sldId id="326" r:id="rId13"/>
+    <p:sldId id="330" r:id="rId14"/>
+    <p:sldId id="331" r:id="rId15"/>
+    <p:sldId id="332" r:id="rId16"/>
+    <p:sldId id="341" r:id="rId17"/>
+    <p:sldId id="343" r:id="rId18"/>
+    <p:sldId id="344" r:id="rId19"/>
+    <p:sldId id="347" r:id="rId20"/>
+    <p:sldId id="342" r:id="rId21"/>
+    <p:sldId id="334" r:id="rId22"/>
+    <p:sldId id="335" r:id="rId23"/>
+    <p:sldId id="351" r:id="rId24"/>
+    <p:sldId id="336" r:id="rId25"/>
+    <p:sldId id="337" r:id="rId26"/>
+    <p:sldId id="338" r:id="rId27"/>
+    <p:sldId id="329" r:id="rId28"/>
+    <p:sldId id="322" r:id="rId29"/>
+    <p:sldId id="350" r:id="rId30"/>
+    <p:sldId id="349" r:id="rId31"/>
+    <p:sldId id="328" r:id="rId32"/>
+    <p:sldId id="276" r:id="rId33"/>
   </p:sldIdLst>
   <p:sldSz cx="9144000" cy="6858000" type="screen4x3"/>
   <p:notesSz cx="6858000" cy="9144000"/>
@@ -133,7 +137,7 @@
   </p:defaultTextStyle>
   <p:extLst>
     <p:ext uri="{EFAFB233-063F-42B5-8137-9DF3F51BA10A}">
-      <p15:sldGuideLst xmlns:p15="http://schemas.microsoft.com/office/powerpoint/2012/main">
+      <p15:sldGuideLst xmlns="" xmlns:p15="http://schemas.microsoft.com/office/powerpoint/2012/main">
         <p15:guide id="1" orient="horz" pos="2160">
           <p15:clr>
             <a:srgbClr val="A4A3A4"/>
@@ -284,7 +288,7 @@
           <a:p>
             <a:fld id="{39378AC4-C49C-4159-B332-7738B007311C}" type="datetimeFigureOut">
               <a:rPr kumimoji="1" lang="ja-JP" altLang="en-US" smtClean="0"/>
-              <a:t>2016/9/1</a:t>
+              <a:t>2016/9/4</a:t>
             </a:fld>
             <a:endParaRPr kumimoji="1" lang="ja-JP" altLang="en-US"/>
           </a:p>
@@ -629,7 +633,7 @@
           <a:p>
             <a:fld id="{39378AC4-C49C-4159-B332-7738B007311C}" type="datetimeFigureOut">
               <a:rPr kumimoji="1" lang="ja-JP" altLang="en-US" smtClean="0"/>
-              <a:t>2016/9/1</a:t>
+              <a:t>2016/9/4</a:t>
             </a:fld>
             <a:endParaRPr kumimoji="1" lang="ja-JP" altLang="en-US"/>
           </a:p>
@@ -846,7 +850,7 @@
           <a:p>
             <a:fld id="{39378AC4-C49C-4159-B332-7738B007311C}" type="datetimeFigureOut">
               <a:rPr kumimoji="1" lang="ja-JP" altLang="en-US" smtClean="0"/>
-              <a:t>2016/9/1</a:t>
+              <a:t>2016/9/4</a:t>
             </a:fld>
             <a:endParaRPr kumimoji="1" lang="ja-JP" altLang="en-US"/>
           </a:p>
@@ -1053,7 +1057,7 @@
           <a:p>
             <a:fld id="{39378AC4-C49C-4159-B332-7738B007311C}" type="datetimeFigureOut">
               <a:rPr kumimoji="1" lang="ja-JP" altLang="en-US" smtClean="0"/>
-              <a:t>2016/9/1</a:t>
+              <a:t>2016/9/4</a:t>
             </a:fld>
             <a:endParaRPr kumimoji="1" lang="ja-JP" altLang="en-US"/>
           </a:p>
@@ -1321,7 +1325,7 @@
           <a:p>
             <a:fld id="{39378AC4-C49C-4159-B332-7738B007311C}" type="datetimeFigureOut">
               <a:rPr kumimoji="1" lang="ja-JP" altLang="en-US" smtClean="0"/>
-              <a:t>2016/9/1</a:t>
+              <a:t>2016/9/4</a:t>
             </a:fld>
             <a:endParaRPr kumimoji="1" lang="ja-JP" altLang="en-US"/>
           </a:p>
@@ -1853,7 +1857,7 @@
           <a:p>
             <a:fld id="{39378AC4-C49C-4159-B332-7738B007311C}" type="datetimeFigureOut">
               <a:rPr kumimoji="1" lang="ja-JP" altLang="en-US" smtClean="0"/>
-              <a:t>2016/9/1</a:t>
+              <a:t>2016/9/4</a:t>
             </a:fld>
             <a:endParaRPr kumimoji="1" lang="ja-JP" altLang="en-US"/>
           </a:p>
@@ -2406,7 +2410,7 @@
           <a:p>
             <a:fld id="{39378AC4-C49C-4159-B332-7738B007311C}" type="datetimeFigureOut">
               <a:rPr kumimoji="1" lang="ja-JP" altLang="en-US" smtClean="0"/>
-              <a:t>2016/9/1</a:t>
+              <a:t>2016/9/4</a:t>
             </a:fld>
             <a:endParaRPr kumimoji="1" lang="ja-JP" altLang="en-US"/>
           </a:p>
@@ -2532,7 +2536,7 @@
           <a:p>
             <a:fld id="{39378AC4-C49C-4159-B332-7738B007311C}" type="datetimeFigureOut">
               <a:rPr kumimoji="1" lang="ja-JP" altLang="en-US" smtClean="0"/>
-              <a:t>2016/9/1</a:t>
+              <a:t>2016/9/4</a:t>
             </a:fld>
             <a:endParaRPr kumimoji="1" lang="ja-JP" altLang="en-US"/>
           </a:p>
@@ -2676,7 +2680,7 @@
           <a:p>
             <a:fld id="{39378AC4-C49C-4159-B332-7738B007311C}" type="datetimeFigureOut">
               <a:rPr kumimoji="1" lang="ja-JP" altLang="en-US" smtClean="0"/>
-              <a:t>2016/9/1</a:t>
+              <a:t>2016/9/4</a:t>
             </a:fld>
             <a:endParaRPr kumimoji="1" lang="ja-JP" altLang="en-US"/>
           </a:p>
@@ -3030,7 +3034,7 @@
           <a:p>
             <a:fld id="{39378AC4-C49C-4159-B332-7738B007311C}" type="datetimeFigureOut">
               <a:rPr kumimoji="1" lang="ja-JP" altLang="en-US" smtClean="0"/>
-              <a:t>2016/9/1</a:t>
+              <a:t>2016/9/4</a:t>
             </a:fld>
             <a:endParaRPr kumimoji="1" lang="ja-JP" altLang="en-US"/>
           </a:p>
@@ -3164,7 +3168,7 @@
           <a:p>
             <a:fld id="{39378AC4-C49C-4159-B332-7738B007311C}" type="datetimeFigureOut">
               <a:rPr kumimoji="1" lang="ja-JP" altLang="en-US" smtClean="0"/>
-              <a:t>2016/9/1</a:t>
+              <a:t>2016/9/4</a:t>
             </a:fld>
             <a:endParaRPr kumimoji="1" lang="ja-JP" altLang="en-US"/>
           </a:p>
@@ -3977,7 +3981,7 @@
           <a:p>
             <a:fld id="{39378AC4-C49C-4159-B332-7738B007311C}" type="datetimeFigureOut">
               <a:rPr kumimoji="1" lang="ja-JP" altLang="en-US" smtClean="0"/>
-              <a:t>2016/9/1</a:t>
+              <a:t>2016/9/4</a:t>
             </a:fld>
             <a:endParaRPr kumimoji="1" lang="ja-JP" altLang="en-US"/>
           </a:p>
@@ -4578,11 +4582,6 @@
               </a:rPr>
               <a:t>2016/9</a:t>
             </a:r>
-            <a:endParaRPr kumimoji="1" lang="en-US" altLang="ja-JP" dirty="0" smtClean="0">
-              <a:latin typeface="Meiryo UI" panose="020B0604030504040204" pitchFamily="50" charset="-128"/>
-              <a:ea typeface="Meiryo UI" panose="020B0604030504040204" pitchFamily="50" charset="-128"/>
-              <a:cs typeface="Meiryo UI" panose="020B0604030504040204" pitchFamily="50" charset="-128"/>
-            </a:endParaRPr>
           </a:p>
           <a:p>
             <a:r>
@@ -4622,6 +4621,189 @@
 </file>
 
 <file path=ppt/slides/slide10.xml><?xml version="1.0" encoding="utf-8"?>
+<p:sld xmlns:a="http://schemas.openxmlformats.org/drawingml/2006/main" xmlns:r="http://schemas.openxmlformats.org/officeDocument/2006/relationships" xmlns:p="http://schemas.openxmlformats.org/presentationml/2006/main">
+  <p:cSld>
+    <p:spTree>
+      <p:nvGrpSpPr>
+        <p:cNvPr id="1" name=""/>
+        <p:cNvGrpSpPr/>
+        <p:nvPr/>
+      </p:nvGrpSpPr>
+      <p:grpSpPr>
+        <a:xfrm>
+          <a:off x="0" y="0"/>
+          <a:ext cx="0" cy="0"/>
+          <a:chOff x="0" y="0"/>
+          <a:chExt cx="0" cy="0"/>
+        </a:xfrm>
+      </p:grpSpPr>
+      <p:sp>
+        <p:nvSpPr>
+          <p:cNvPr id="2" name="タイトル 1"/>
+          <p:cNvSpPr>
+            <a:spLocks noGrp="1"/>
+          </p:cNvSpPr>
+          <p:nvPr>
+            <p:ph type="title"/>
+          </p:nvPr>
+        </p:nvSpPr>
+        <p:spPr/>
+        <p:txBody>
+          <a:bodyPr/>
+          <a:lstStyle/>
+          <a:p>
+            <a:r>
+              <a:rPr kumimoji="1" lang="en-US" altLang="ja-JP" dirty="0" smtClean="0"/>
+              <a:t>Scheme</a:t>
+            </a:r>
+            <a:endParaRPr kumimoji="1" lang="ja-JP" altLang="en-US" dirty="0"/>
+          </a:p>
+        </p:txBody>
+      </p:sp>
+      <p:sp>
+        <p:nvSpPr>
+          <p:cNvPr id="3" name="コンテンツ プレースホルダー 2"/>
+          <p:cNvSpPr>
+            <a:spLocks noGrp="1"/>
+          </p:cNvSpPr>
+          <p:nvPr>
+            <p:ph idx="1"/>
+          </p:nvPr>
+        </p:nvSpPr>
+        <p:spPr>
+          <a:xfrm>
+            <a:off x="1115616" y="1124744"/>
+            <a:ext cx="7818072" cy="5544616"/>
+          </a:xfrm>
+        </p:spPr>
+        <p:txBody>
+          <a:bodyPr>
+            <a:normAutofit/>
+          </a:bodyPr>
+          <a:lstStyle/>
+          <a:p>
+            <a:pPr marL="82296" indent="0">
+              <a:buNone/>
+            </a:pPr>
+            <a:r>
+              <a:rPr lang="ja-JP" altLang="en-US" dirty="0"/>
+              <a:t>・</a:t>
+            </a:r>
+            <a:r>
+              <a:rPr lang="en-US" altLang="ja-JP" dirty="0" smtClean="0"/>
+              <a:t>Lisp</a:t>
+            </a:r>
+            <a:r>
+              <a:rPr lang="ja-JP" altLang="en-US" dirty="0" smtClean="0"/>
+              <a:t>の方言の一つで、現在でもよく使われる</a:t>
+            </a:r>
+            <a:endParaRPr lang="en-US" altLang="ja-JP" dirty="0" smtClean="0"/>
+          </a:p>
+          <a:p>
+            <a:pPr marL="82296" indent="0">
+              <a:buNone/>
+            </a:pPr>
+            <a:endParaRPr lang="en-US" altLang="ja-JP" dirty="0" smtClean="0"/>
+          </a:p>
+          <a:p>
+            <a:pPr marL="82296" indent="0">
+              <a:buNone/>
+            </a:pPr>
+            <a:r>
+              <a:rPr lang="ja-JP" altLang="en-US" dirty="0" smtClean="0"/>
+              <a:t>・言語仕様を少数のルールに限定</a:t>
+            </a:r>
+            <a:endParaRPr lang="en-US" altLang="ja-JP" dirty="0" smtClean="0"/>
+          </a:p>
+          <a:p>
+            <a:pPr marL="82296" indent="0">
+              <a:buNone/>
+            </a:pPr>
+            <a:endParaRPr lang="en-US" altLang="ja-JP" dirty="0"/>
+          </a:p>
+          <a:p>
+            <a:pPr marL="82296" indent="0">
+              <a:buNone/>
+            </a:pPr>
+            <a:r>
+              <a:rPr lang="ja-JP" altLang="en-US" dirty="0"/>
+              <a:t>思想「厳選した少数のルールを用意しておけばいくらでも強力な言語を構築する</a:t>
+            </a:r>
+            <a:r>
+              <a:rPr lang="ja-JP" altLang="en-US" dirty="0" smtClean="0"/>
+              <a:t>ことが</a:t>
+            </a:r>
+            <a:r>
+              <a:rPr lang="ja-JP" altLang="en-US" dirty="0"/>
+              <a:t>できる</a:t>
+            </a:r>
+            <a:r>
+              <a:rPr lang="ja-JP" altLang="en-US" dirty="0" smtClean="0"/>
+              <a:t>」</a:t>
+            </a:r>
+            <a:endParaRPr lang="en-US" altLang="ja-JP" dirty="0" smtClean="0"/>
+          </a:p>
+          <a:p>
+            <a:pPr marL="82296" indent="0">
+              <a:buNone/>
+            </a:pPr>
+            <a:endParaRPr lang="en-US" altLang="ja-JP" dirty="0"/>
+          </a:p>
+          <a:p>
+            <a:pPr marL="82296" indent="0">
+              <a:buNone/>
+            </a:pPr>
+            <a:r>
+              <a:rPr lang="ja-JP" altLang="en-US" dirty="0" smtClean="0"/>
+              <a:t>多機能化を目指した</a:t>
+            </a:r>
+            <a:r>
+              <a:rPr lang="en-US" altLang="ja-JP" dirty="0" smtClean="0"/>
+              <a:t>Common Lisp</a:t>
+            </a:r>
+            <a:r>
+              <a:rPr lang="ja-JP" altLang="en-US" dirty="0" smtClean="0"/>
+              <a:t>とは</a:t>
+            </a:r>
+            <a:endParaRPr lang="en-US" altLang="ja-JP" dirty="0" smtClean="0"/>
+          </a:p>
+          <a:p>
+            <a:pPr marL="82296" indent="0">
+              <a:buNone/>
+            </a:pPr>
+            <a:r>
+              <a:rPr lang="ja-JP" altLang="en-US" dirty="0" smtClean="0"/>
+              <a:t>対照的な</a:t>
+            </a:r>
+            <a:r>
+              <a:rPr lang="ja-JP" altLang="en-US" dirty="0"/>
+              <a:t>存在</a:t>
+            </a:r>
+            <a:endParaRPr lang="en-US" altLang="ja-JP" dirty="0" smtClean="0"/>
+          </a:p>
+        </p:txBody>
+      </p:sp>
+    </p:spTree>
+    <p:extLst>
+      <p:ext uri="{BB962C8B-B14F-4D97-AF65-F5344CB8AC3E}">
+        <p14:creationId xmlns:p14="http://schemas.microsoft.com/office/powerpoint/2010/main" val="2748462096"/>
+      </p:ext>
+    </p:extLst>
+  </p:cSld>
+  <p:clrMapOvr>
+    <a:masterClrMapping/>
+  </p:clrMapOvr>
+  <p:timing>
+    <p:tnLst>
+      <p:par>
+        <p:cTn id="1" dur="indefinite" restart="never" nodeType="tmRoot"/>
+      </p:par>
+    </p:tnLst>
+  </p:timing>
+</p:sld>
+</file>
+
+<file path=ppt/slides/slide11.xml><?xml version="1.0" encoding="utf-8"?>
 <p:sld xmlns:a="http://schemas.openxmlformats.org/drawingml/2006/main" xmlns:r="http://schemas.openxmlformats.org/officeDocument/2006/relationships" xmlns:p="http://schemas.openxmlformats.org/presentationml/2006/main">
   <p:cSld>
     <p:spTree>
@@ -5103,7 +5285,7 @@
 </p:sld>
 </file>
 
-<file path=ppt/slides/slide11.xml><?xml version="1.0" encoding="utf-8"?>
+<file path=ppt/slides/slide12.xml><?xml version="1.0" encoding="utf-8"?>
 <p:sld xmlns:a="http://schemas.openxmlformats.org/drawingml/2006/main" xmlns:r="http://schemas.openxmlformats.org/officeDocument/2006/relationships" xmlns:p="http://schemas.openxmlformats.org/presentationml/2006/main" show="0">
   <p:cSld>
     <p:spTree>
@@ -5392,7 +5574,7 @@
 </p:sld>
 </file>
 
-<file path=ppt/slides/slide12.xml><?xml version="1.0" encoding="utf-8"?>
+<file path=ppt/slides/slide13.xml><?xml version="1.0" encoding="utf-8"?>
 <p:sld xmlns:a="http://schemas.openxmlformats.org/drawingml/2006/main" xmlns:r="http://schemas.openxmlformats.org/officeDocument/2006/relationships" xmlns:p="http://schemas.openxmlformats.org/presentationml/2006/main" show="0">
   <p:cSld>
     <p:spTree>
@@ -5510,7 +5692,7 @@
 </p:sld>
 </file>
 
-<file path=ppt/slides/slide13.xml><?xml version="1.0" encoding="utf-8"?>
+<file path=ppt/slides/slide14.xml><?xml version="1.0" encoding="utf-8"?>
 <p:sld xmlns:a="http://schemas.openxmlformats.org/drawingml/2006/main" xmlns:r="http://schemas.openxmlformats.org/officeDocument/2006/relationships" xmlns:p="http://schemas.openxmlformats.org/presentationml/2006/main" show="0">
   <p:cSld>
     <p:spTree>
@@ -6316,7 +6498,7 @@
 </p:sld>
 </file>
 
-<file path=ppt/slides/slide14.xml><?xml version="1.0" encoding="utf-8"?>
+<file path=ppt/slides/slide15.xml><?xml version="1.0" encoding="utf-8"?>
 <p:sld xmlns:a="http://schemas.openxmlformats.org/drawingml/2006/main" xmlns:r="http://schemas.openxmlformats.org/officeDocument/2006/relationships" xmlns:p="http://schemas.openxmlformats.org/presentationml/2006/main" show="0">
   <p:cSld>
     <p:spTree>
@@ -6403,11 +6585,11 @@
   <p:clrMapOvr>
     <a:masterClrMapping/>
   </p:clrMapOvr>
-  <mc:AlternateContent xmlns:mc="http://schemas.openxmlformats.org/markup-compatibility/2006">
-    <mc:Choice xmlns:p14="http://schemas.microsoft.com/office/powerpoint/2010/main" Requires="p14">
+  <mc:AlternateContent xmlns:mc="http://schemas.openxmlformats.org/markup-compatibility/2006" xmlns:p14="http://schemas.microsoft.com/office/powerpoint/2010/main">
+    <mc:Choice Requires="p14">
       <p:transition spd="slow" p14:dur="2000"/>
     </mc:Choice>
-    <mc:Fallback>
+    <mc:Fallback xmlns="">
       <p:transition spd="slow"/>
     </mc:Fallback>
   </mc:AlternateContent>
@@ -6421,7 +6603,7 @@
 </p:sld>
 </file>
 
-<file path=ppt/slides/slide15.xml><?xml version="1.0" encoding="utf-8"?>
+<file path=ppt/slides/slide16.xml><?xml version="1.0" encoding="utf-8"?>
 <p:sld xmlns:a="http://schemas.openxmlformats.org/drawingml/2006/main" xmlns:r="http://schemas.openxmlformats.org/officeDocument/2006/relationships" xmlns:p="http://schemas.openxmlformats.org/presentationml/2006/main">
   <p:cSld>
     <p:spTree>
@@ -6522,7 +6704,7 @@
 </p:sld>
 </file>
 
-<file path=ppt/slides/slide16.xml><?xml version="1.0" encoding="utf-8"?>
+<file path=ppt/slides/slide17.xml><?xml version="1.0" encoding="utf-8"?>
 <p:sld xmlns:a="http://schemas.openxmlformats.org/drawingml/2006/main" xmlns:r="http://schemas.openxmlformats.org/officeDocument/2006/relationships" xmlns:p="http://schemas.openxmlformats.org/presentationml/2006/main">
   <p:cSld>
     <p:spTree>
@@ -6703,155 +6885,6 @@
 </p:sld>
 </file>
 
-<file path=ppt/slides/slide17.xml><?xml version="1.0" encoding="utf-8"?>
-<p:sld xmlns:a="http://schemas.openxmlformats.org/drawingml/2006/main" xmlns:r="http://schemas.openxmlformats.org/officeDocument/2006/relationships" xmlns:p="http://schemas.openxmlformats.org/presentationml/2006/main">
-  <p:cSld>
-    <p:spTree>
-      <p:nvGrpSpPr>
-        <p:cNvPr id="1" name=""/>
-        <p:cNvGrpSpPr/>
-        <p:nvPr/>
-      </p:nvGrpSpPr>
-      <p:grpSpPr>
-        <a:xfrm>
-          <a:off x="0" y="0"/>
-          <a:ext cx="0" cy="0"/>
-          <a:chOff x="0" y="0"/>
-          <a:chExt cx="0" cy="0"/>
-        </a:xfrm>
-      </p:grpSpPr>
-      <p:sp>
-        <p:nvSpPr>
-          <p:cNvPr id="2" name="タイトル 1"/>
-          <p:cNvSpPr>
-            <a:spLocks noGrp="1"/>
-          </p:cNvSpPr>
-          <p:nvPr>
-            <p:ph type="title"/>
-          </p:nvPr>
-        </p:nvSpPr>
-        <p:spPr/>
-        <p:txBody>
-          <a:bodyPr/>
-          <a:lstStyle/>
-          <a:p>
-            <a:r>
-              <a:rPr kumimoji="1" lang="ja-JP" altLang="en-US" dirty="0" smtClean="0"/>
-              <a:t>エディタ</a:t>
-            </a:r>
-            <a:endParaRPr kumimoji="1" lang="ja-JP" altLang="en-US" dirty="0"/>
-          </a:p>
-        </p:txBody>
-      </p:sp>
-      <p:sp>
-        <p:nvSpPr>
-          <p:cNvPr id="3" name="コンテンツ プレースホルダー 2"/>
-          <p:cNvSpPr>
-            <a:spLocks noGrp="1"/>
-          </p:cNvSpPr>
-          <p:nvPr>
-            <p:ph idx="1"/>
-          </p:nvPr>
-        </p:nvSpPr>
-        <p:spPr>
-          <a:xfrm>
-            <a:off x="1115616" y="1124744"/>
-            <a:ext cx="7818072" cy="5544616"/>
-          </a:xfrm>
-        </p:spPr>
-        <p:txBody>
-          <a:bodyPr>
-            <a:normAutofit/>
-          </a:bodyPr>
-          <a:lstStyle/>
-          <a:p>
-            <a:pPr marL="82296" indent="0">
-              <a:buNone/>
-            </a:pPr>
-            <a:r>
-              <a:rPr lang="ja-JP" altLang="en-US" dirty="0" smtClean="0"/>
-              <a:t>・</a:t>
-            </a:r>
-            <a:r>
-              <a:rPr lang="en-US" altLang="ja-JP" dirty="0" smtClean="0"/>
-              <a:t>Lisp</a:t>
-            </a:r>
-            <a:r>
-              <a:rPr lang="ja-JP" altLang="en-US" dirty="0" err="1" smtClean="0"/>
-              <a:t>、</a:t>
-            </a:r>
-            <a:r>
-              <a:rPr lang="en-US" altLang="ja-JP" dirty="0" smtClean="0"/>
-              <a:t>Scheme</a:t>
-            </a:r>
-            <a:r>
-              <a:rPr lang="ja-JP" altLang="en-US" dirty="0" smtClean="0"/>
-              <a:t>界隈では</a:t>
-            </a:r>
-            <a:r>
-              <a:rPr lang="en-US" altLang="ja-JP" dirty="0" err="1" smtClean="0"/>
-              <a:t>Emacs</a:t>
-            </a:r>
-            <a:r>
-              <a:rPr lang="ja-JP" altLang="en-US" dirty="0" smtClean="0"/>
-              <a:t>の使用が推奨されている</a:t>
-            </a:r>
-            <a:endParaRPr lang="en-US" altLang="ja-JP" dirty="0" smtClean="0"/>
-          </a:p>
-          <a:p>
-            <a:pPr marL="82296" indent="0">
-              <a:buNone/>
-            </a:pPr>
-            <a:endParaRPr lang="en-US" altLang="ja-JP" dirty="0"/>
-          </a:p>
-          <a:p>
-            <a:pPr marL="82296" indent="0">
-              <a:buNone/>
-            </a:pPr>
-            <a:r>
-              <a:rPr lang="ja-JP" altLang="en-US" dirty="0" smtClean="0"/>
-              <a:t>→</a:t>
-            </a:r>
-            <a:r>
-              <a:rPr lang="en-US" altLang="ja-JP" dirty="0" err="1" smtClean="0"/>
-              <a:t>Emacs</a:t>
-            </a:r>
-            <a:r>
-              <a:rPr lang="ja-JP" altLang="en-US" dirty="0" smtClean="0"/>
-              <a:t>スクリプトが</a:t>
-            </a:r>
-            <a:r>
-              <a:rPr lang="en-US" altLang="ja-JP" dirty="0" smtClean="0"/>
-              <a:t>Lisp</a:t>
-            </a:r>
-            <a:r>
-              <a:rPr lang="ja-JP" altLang="en-US" dirty="0" smtClean="0"/>
-              <a:t>で書けるため</a:t>
-            </a:r>
-            <a:endParaRPr lang="en-US" altLang="ja-JP" dirty="0" smtClean="0"/>
-          </a:p>
-        </p:txBody>
-      </p:sp>
-    </p:spTree>
-    <p:extLst>
-      <p:ext uri="{BB962C8B-B14F-4D97-AF65-F5344CB8AC3E}">
-        <p14:creationId xmlns:p14="http://schemas.microsoft.com/office/powerpoint/2010/main" val="1277891446"/>
-      </p:ext>
-    </p:extLst>
-  </p:cSld>
-  <p:clrMapOvr>
-    <a:masterClrMapping/>
-  </p:clrMapOvr>
-  <p:timing>
-    <p:tnLst>
-      <p:par>
-        <p:cTn id="1" dur="indefinite" restart="never" nodeType="tmRoot"/>
-      </p:par>
-    </p:tnLst>
-  </p:timing>
-</p:sld>
-</file>
-
 <file path=ppt/slides/slide18.xml><?xml version="1.0" encoding="utf-8"?>
 <p:sld xmlns:a="http://schemas.openxmlformats.org/drawingml/2006/main" xmlns:r="http://schemas.openxmlformats.org/officeDocument/2006/relationships" xmlns:p="http://schemas.openxmlformats.org/presentationml/2006/main">
   <p:cSld>
@@ -6918,56 +6951,80 @@
               <a:buNone/>
             </a:pPr>
             <a:r>
+              <a:rPr lang="en-US" altLang="ja-JP" dirty="0" smtClean="0"/>
+              <a:t>Lisp</a:t>
+            </a:r>
+            <a:r>
+              <a:rPr lang="ja-JP" altLang="en-US" dirty="0" err="1" smtClean="0"/>
+              <a:t>、</a:t>
+            </a:r>
+            <a:r>
+              <a:rPr lang="en-US" altLang="ja-JP" dirty="0" smtClean="0"/>
+              <a:t>Scheme</a:t>
+            </a:r>
+            <a:r>
+              <a:rPr lang="ja-JP" altLang="en-US" dirty="0" smtClean="0"/>
+              <a:t>界隈では</a:t>
+            </a:r>
+            <a:r>
+              <a:rPr lang="en-US" altLang="ja-JP" dirty="0" err="1" smtClean="0"/>
+              <a:t>Emacs</a:t>
+            </a:r>
+            <a:r>
+              <a:rPr lang="ja-JP" altLang="en-US" dirty="0" smtClean="0"/>
+              <a:t>の使用が</a:t>
+            </a:r>
+            <a:endParaRPr lang="en-US" altLang="ja-JP" dirty="0" smtClean="0"/>
+          </a:p>
+          <a:p>
+            <a:pPr marL="82296" indent="0">
+              <a:buNone/>
+            </a:pPr>
+            <a:r>
+              <a:rPr lang="ja-JP" altLang="en-US" dirty="0" smtClean="0"/>
+              <a:t>推奨されている</a:t>
+            </a:r>
+            <a:endParaRPr lang="en-US" altLang="ja-JP" dirty="0" smtClean="0"/>
+          </a:p>
+          <a:p>
+            <a:pPr marL="82296" indent="0">
+              <a:buNone/>
+            </a:pPr>
+            <a:endParaRPr lang="en-US" altLang="ja-JP" dirty="0"/>
+          </a:p>
+          <a:p>
+            <a:pPr marL="82296" indent="0">
+              <a:buNone/>
+            </a:pPr>
+            <a:r>
               <a:rPr lang="ja-JP" altLang="en-US" dirty="0" smtClean="0"/>
               <a:t>・</a:t>
             </a:r>
             <a:r>
+              <a:rPr lang="en-US" altLang="ja-JP" dirty="0" err="1" smtClean="0"/>
+              <a:t>Emacs</a:t>
+            </a:r>
+            <a:r>
+              <a:rPr lang="ja-JP" altLang="en-US" dirty="0" smtClean="0"/>
+              <a:t>スクリプトが</a:t>
+            </a:r>
+            <a:r>
               <a:rPr lang="en-US" altLang="ja-JP" dirty="0" smtClean="0"/>
               <a:t>Lisp</a:t>
             </a:r>
             <a:r>
-              <a:rPr lang="ja-JP" altLang="en-US" dirty="0" err="1" smtClean="0"/>
-              <a:t>、</a:t>
-            </a:r>
-            <a:r>
-              <a:rPr lang="en-US" altLang="ja-JP" dirty="0" smtClean="0"/>
-              <a:t>Scheme</a:t>
-            </a:r>
-            <a:r>
               <a:rPr lang="ja-JP" altLang="en-US" dirty="0" smtClean="0"/>
-              <a:t>界隈では</a:t>
-            </a:r>
-            <a:r>
-              <a:rPr lang="en-US" altLang="ja-JP" dirty="0" err="1" smtClean="0"/>
-              <a:t>Emacs</a:t>
-            </a:r>
+              <a:t>で書ける</a:t>
+            </a:r>
+            <a:endParaRPr lang="en-US" altLang="ja-JP" dirty="0" smtClean="0"/>
+          </a:p>
+          <a:p>
+            <a:pPr marL="82296" indent="0">
+              <a:buNone/>
+            </a:pPr>
             <a:r>
               <a:rPr lang="ja-JP" altLang="en-US" dirty="0" smtClean="0"/>
-              <a:t>の使用が推奨されている</a:t>
-            </a:r>
-            <a:endParaRPr lang="en-US" altLang="ja-JP" dirty="0" smtClean="0"/>
-          </a:p>
-          <a:p>
-            <a:pPr marL="82296" indent="0">
-              <a:buNone/>
-            </a:pPr>
-            <a:endParaRPr lang="en-US" altLang="ja-JP" dirty="0"/>
-          </a:p>
-          <a:p>
-            <a:pPr marL="82296" indent="0">
-              <a:buNone/>
-            </a:pPr>
-            <a:r>
-              <a:rPr lang="ja-JP" altLang="en-US" dirty="0" smtClean="0"/>
-              <a:t>→</a:t>
-            </a:r>
-            <a:r>
-              <a:rPr lang="en-US" altLang="ja-JP" dirty="0" err="1" smtClean="0"/>
-              <a:t>Emacs</a:t>
-            </a:r>
-            <a:r>
-              <a:rPr lang="ja-JP" altLang="en-US" dirty="0" smtClean="0"/>
-              <a:t>スクリプトが</a:t>
+              <a:t>・</a:t>
             </a:r>
             <a:r>
               <a:rPr lang="en-US" altLang="ja-JP" dirty="0" smtClean="0"/>
@@ -6975,56 +7032,16 @@
             </a:r>
             <a:r>
               <a:rPr lang="ja-JP" altLang="en-US" dirty="0" smtClean="0"/>
-              <a:t>で書けるため</a:t>
+              <a:t>系言語の開発支援機能あり</a:t>
             </a:r>
             <a:endParaRPr lang="en-US" altLang="ja-JP" dirty="0" smtClean="0"/>
-          </a:p>
-          <a:p>
-            <a:pPr marL="82296" indent="0">
-              <a:buNone/>
-            </a:pPr>
-            <a:endParaRPr lang="en-US" altLang="ja-JP" dirty="0"/>
-          </a:p>
-          <a:p>
-            <a:pPr marL="82296" indent="0">
-              <a:buNone/>
-            </a:pPr>
-            <a:endParaRPr lang="en-US" altLang="ja-JP" dirty="0" smtClean="0"/>
-          </a:p>
-          <a:p>
-            <a:pPr marL="82296" indent="0">
-              <a:buNone/>
-            </a:pPr>
-            <a:endParaRPr lang="en-US" altLang="ja-JP" dirty="0"/>
-          </a:p>
-          <a:p>
-            <a:pPr marL="82296" indent="0" algn="ctr">
-              <a:buNone/>
-            </a:pPr>
-            <a:r>
-              <a:rPr lang="ja-JP" altLang="en-US" sz="5400" b="1" dirty="0" smtClean="0"/>
-              <a:t>でも</a:t>
-            </a:r>
-            <a:r>
-              <a:rPr lang="ja-JP" altLang="en-US" sz="2000" dirty="0" smtClean="0"/>
-              <a:t>今回は</a:t>
-            </a:r>
-            <a:r>
-              <a:rPr lang="en-US" altLang="ja-JP" sz="5400" b="1" dirty="0" smtClean="0"/>
-              <a:t>Vim</a:t>
-            </a:r>
-            <a:r>
-              <a:rPr lang="ja-JP" altLang="en-US" sz="5400" b="1" dirty="0" smtClean="0"/>
-              <a:t>を使う</a:t>
-            </a:r>
-            <a:endParaRPr lang="en-US" altLang="ja-JP" sz="5400" b="1" dirty="0" smtClean="0"/>
           </a:p>
         </p:txBody>
       </p:sp>
     </p:spTree>
     <p:extLst>
       <p:ext uri="{BB962C8B-B14F-4D97-AF65-F5344CB8AC3E}">
-        <p14:creationId xmlns:p14="http://schemas.microsoft.com/office/powerpoint/2010/main" val="1453277618"/>
+        <p14:creationId xmlns:p14="http://schemas.microsoft.com/office/powerpoint/2010/main" val="1277891446"/>
       </p:ext>
     </p:extLst>
   </p:cSld>
@@ -7073,6 +7090,10 @@
           <a:bodyPr/>
           <a:lstStyle/>
           <a:p>
+            <a:r>
+              <a:rPr kumimoji="1" lang="ja-JP" altLang="en-US" dirty="0" smtClean="0"/>
+              <a:t>エディタ</a:t>
+            </a:r>
             <a:endParaRPr kumimoji="1" lang="ja-JP" altLang="en-US" dirty="0"/>
           </a:p>
         </p:txBody>
@@ -7089,8 +7110,8 @@
         </p:nvSpPr>
         <p:spPr>
           <a:xfrm>
-            <a:off x="899592" y="1447800"/>
-            <a:ext cx="8136904" cy="4069432"/>
+            <a:off x="1115616" y="1124744"/>
+            <a:ext cx="7818072" cy="5544616"/>
           </a:xfrm>
         </p:spPr>
         <p:txBody>
@@ -7099,33 +7120,135 @@
           </a:bodyPr>
           <a:lstStyle/>
           <a:p>
+            <a:pPr marL="82296" indent="0">
+              <a:buNone/>
+            </a:pPr>
+            <a:r>
+              <a:rPr lang="en-US" altLang="ja-JP" dirty="0" smtClean="0"/>
+              <a:t>Lisp</a:t>
+            </a:r>
+            <a:r>
+              <a:rPr lang="ja-JP" altLang="en-US" dirty="0" err="1" smtClean="0"/>
+              <a:t>、</a:t>
+            </a:r>
+            <a:r>
+              <a:rPr lang="en-US" altLang="ja-JP" dirty="0" smtClean="0"/>
+              <a:t>Scheme</a:t>
+            </a:r>
+            <a:r>
+              <a:rPr lang="ja-JP" altLang="en-US" dirty="0" smtClean="0"/>
+              <a:t>界隈では</a:t>
+            </a:r>
+            <a:r>
+              <a:rPr lang="en-US" altLang="ja-JP" dirty="0" err="1" smtClean="0"/>
+              <a:t>Emacs</a:t>
+            </a:r>
+            <a:r>
+              <a:rPr lang="ja-JP" altLang="en-US" dirty="0" smtClean="0"/>
+              <a:t>の使用が</a:t>
+            </a:r>
+            <a:endParaRPr lang="en-US" altLang="ja-JP" dirty="0" smtClean="0"/>
+          </a:p>
+          <a:p>
+            <a:pPr marL="82296" indent="0">
+              <a:buNone/>
+            </a:pPr>
+            <a:r>
+              <a:rPr lang="ja-JP" altLang="en-US" dirty="0" smtClean="0"/>
+              <a:t>推奨されている</a:t>
+            </a:r>
+            <a:endParaRPr lang="en-US" altLang="ja-JP" dirty="0" smtClean="0"/>
+          </a:p>
+          <a:p>
+            <a:pPr marL="82296" indent="0">
+              <a:buNone/>
+            </a:pPr>
+            <a:endParaRPr lang="en-US" altLang="ja-JP" dirty="0"/>
+          </a:p>
+          <a:p>
+            <a:pPr marL="82296" indent="0">
+              <a:buNone/>
+            </a:pPr>
+            <a:r>
+              <a:rPr lang="ja-JP" altLang="en-US" dirty="0"/>
+              <a:t>・</a:t>
+            </a:r>
+            <a:r>
+              <a:rPr lang="en-US" altLang="ja-JP" dirty="0" err="1" smtClean="0"/>
+              <a:t>Emacs</a:t>
+            </a:r>
+            <a:r>
+              <a:rPr lang="ja-JP" altLang="en-US" dirty="0" smtClean="0"/>
+              <a:t>スクリプトが</a:t>
+            </a:r>
+            <a:r>
+              <a:rPr lang="en-US" altLang="ja-JP" dirty="0" smtClean="0"/>
+              <a:t>Lisp</a:t>
+            </a:r>
+            <a:r>
+              <a:rPr lang="ja-JP" altLang="en-US" dirty="0" smtClean="0"/>
+              <a:t>で書ける</a:t>
+            </a:r>
+            <a:endParaRPr lang="en-US" altLang="ja-JP" dirty="0" smtClean="0"/>
+          </a:p>
+          <a:p>
+            <a:pPr marL="82296" indent="0">
+              <a:buNone/>
+            </a:pPr>
+            <a:r>
+              <a:rPr lang="ja-JP" altLang="en-US" dirty="0" smtClean="0"/>
+              <a:t>・</a:t>
+            </a:r>
+            <a:r>
+              <a:rPr lang="en-US" altLang="ja-JP" dirty="0" smtClean="0"/>
+              <a:t>Lisp</a:t>
+            </a:r>
+            <a:r>
+              <a:rPr lang="ja-JP" altLang="en-US" dirty="0" smtClean="0"/>
+              <a:t>系言語の開発支援機能あり</a:t>
+            </a:r>
+            <a:endParaRPr lang="en-US" altLang="ja-JP" dirty="0"/>
+          </a:p>
+          <a:p>
+            <a:pPr marL="82296" indent="0">
+              <a:buNone/>
+            </a:pPr>
+            <a:endParaRPr lang="en-US" altLang="ja-JP" dirty="0" smtClean="0"/>
+          </a:p>
+          <a:p>
+            <a:pPr marL="82296" indent="0">
+              <a:buNone/>
+            </a:pPr>
+            <a:endParaRPr lang="en-US" altLang="ja-JP" dirty="0"/>
+          </a:p>
+          <a:p>
             <a:pPr marL="82296" indent="0" algn="ctr">
               <a:buNone/>
             </a:pPr>
-            <a:endParaRPr kumimoji="1" lang="en-US" altLang="ja-JP" sz="4400" dirty="0" smtClean="0"/>
-          </a:p>
-          <a:p>
-            <a:pPr marL="82296" indent="0" algn="ctr">
-              <a:buNone/>
-            </a:pPr>
-            <a:endParaRPr kumimoji="1" lang="en-US" altLang="ja-JP" sz="4400" dirty="0" smtClean="0"/>
-          </a:p>
-          <a:p>
-            <a:pPr marL="82296" indent="0" algn="ctr">
-              <a:buNone/>
-            </a:pPr>
-            <a:r>
-              <a:rPr kumimoji="1" lang="ja-JP" altLang="en-US" sz="4400" dirty="0" smtClean="0"/>
-              <a:t>④基本的なこと</a:t>
-            </a:r>
-            <a:endParaRPr kumimoji="1" lang="en-US" altLang="ja-JP" sz="4400" dirty="0" smtClean="0"/>
+            <a:r>
+              <a:rPr lang="ja-JP" altLang="en-US" sz="5400" b="1" dirty="0" smtClean="0"/>
+              <a:t>でも</a:t>
+            </a:r>
+            <a:r>
+              <a:rPr lang="ja-JP" altLang="en-US" sz="2000" dirty="0" smtClean="0"/>
+              <a:t>今回は</a:t>
+            </a:r>
+            <a:r>
+              <a:rPr lang="en-US" altLang="ja-JP" sz="5400" b="1" dirty="0" smtClean="0"/>
+              <a:t>Vim</a:t>
+            </a:r>
+            <a:r>
+              <a:rPr lang="ja-JP" altLang="en-US" sz="5400" b="1" dirty="0" smtClean="0"/>
+              <a:t>を使う</a:t>
+            </a:r>
+            <a:endParaRPr lang="en-US" altLang="ja-JP" sz="5400" b="1" dirty="0" smtClean="0"/>
           </a:p>
         </p:txBody>
       </p:sp>
     </p:spTree>
     <p:extLst>
       <p:ext uri="{BB962C8B-B14F-4D97-AF65-F5344CB8AC3E}">
-        <p14:creationId xmlns:p14="http://schemas.microsoft.com/office/powerpoint/2010/main" val="2677223863"/>
+        <p14:creationId xmlns:p14="http://schemas.microsoft.com/office/powerpoint/2010/main" val="1453277618"/>
       </p:ext>
     </p:extLst>
   </p:cSld>
@@ -7209,15 +7332,7 @@
             </a:pPr>
             <a:r>
               <a:rPr kumimoji="1" lang="ja-JP" altLang="en-US" sz="4400" dirty="0" smtClean="0"/>
-              <a:t>①前回</a:t>
-            </a:r>
-            <a:r>
-              <a:rPr kumimoji="1" lang="ja-JP" altLang="en-US" sz="4400" dirty="0" smtClean="0"/>
-              <a:t>の</a:t>
-            </a:r>
-            <a:r>
-              <a:rPr kumimoji="1" lang="ja-JP" altLang="en-US" sz="4400" dirty="0" smtClean="0"/>
-              <a:t>おさらい</a:t>
+              <a:t>①前回のおさらい</a:t>
             </a:r>
             <a:endParaRPr kumimoji="1" lang="en-US" altLang="ja-JP" sz="4400" dirty="0" smtClean="0"/>
           </a:p>
@@ -7227,7 +7342,19 @@
             </a:pPr>
             <a:r>
               <a:rPr lang="ja-JP" altLang="en-US" sz="4400" dirty="0" smtClean="0"/>
-              <a:t>②もうちょっと調べてみた</a:t>
+              <a:t>②</a:t>
+            </a:r>
+            <a:r>
+              <a:rPr lang="en-US" altLang="ja-JP" sz="4400" dirty="0" smtClean="0"/>
+              <a:t>Scheme</a:t>
+            </a:r>
+            <a:r>
+              <a:rPr lang="ja-JP" altLang="en-US" sz="4400" dirty="0" err="1" smtClean="0"/>
+              <a:t>って</a:t>
+            </a:r>
+            <a:r>
+              <a:rPr lang="ja-JP" altLang="en-US" sz="4400" dirty="0" smtClean="0"/>
+              <a:t>どんな言語？</a:t>
             </a:r>
             <a:endParaRPr lang="en-US" altLang="ja-JP" sz="4400" dirty="0" smtClean="0"/>
           </a:p>
@@ -7247,7 +7374,21 @@
             </a:pPr>
             <a:r>
               <a:rPr kumimoji="1" lang="ja-JP" altLang="en-US" sz="4400" dirty="0" smtClean="0"/>
-              <a:t>④基本的なこと</a:t>
+              <a:t>④基本的な</a:t>
+            </a:r>
+            <a:r>
+              <a:rPr kumimoji="1" lang="ja-JP" altLang="en-US" sz="4400" dirty="0" smtClean="0"/>
+              <a:t>こと</a:t>
+            </a:r>
+            <a:endParaRPr kumimoji="1" lang="en-US" altLang="ja-JP" sz="4400" dirty="0" smtClean="0"/>
+          </a:p>
+          <a:p>
+            <a:pPr marL="82296" indent="0">
+              <a:buNone/>
+            </a:pPr>
+            <a:r>
+              <a:rPr lang="ja-JP" altLang="en-US" sz="4400" dirty="0" smtClean="0"/>
+              <a:t>⑤再帰処理</a:t>
             </a:r>
             <a:endParaRPr kumimoji="1" lang="en-US" altLang="ja-JP" sz="4400" dirty="0" smtClean="0"/>
           </a:p>
@@ -7305,10 +7446,6 @@
           <a:bodyPr/>
           <a:lstStyle/>
           <a:p>
-            <a:r>
-              <a:rPr kumimoji="1" lang="ja-JP" altLang="en-US" dirty="0" smtClean="0"/>
-              <a:t>基本的なこと</a:t>
-            </a:r>
             <a:endParaRPr kumimoji="1" lang="ja-JP" altLang="en-US" dirty="0"/>
           </a:p>
         </p:txBody>
@@ -7325,8 +7462,8 @@
         </p:nvSpPr>
         <p:spPr>
           <a:xfrm>
-            <a:off x="1115616" y="1124744"/>
-            <a:ext cx="7818072" cy="5544616"/>
+            <a:off x="899592" y="1447800"/>
+            <a:ext cx="8136904" cy="4069432"/>
           </a:xfrm>
         </p:spPr>
         <p:txBody>
@@ -7335,183 +7472,33 @@
           </a:bodyPr>
           <a:lstStyle/>
           <a:p>
-            <a:pPr marL="82296" indent="0">
-              <a:buNone/>
-            </a:pPr>
-            <a:r>
-              <a:rPr lang="ja-JP" altLang="en-US" dirty="0" smtClean="0"/>
-              <a:t>・基本的な処理の記法は</a:t>
-            </a:r>
-            <a:endParaRPr lang="en-US" altLang="ja-JP" dirty="0" smtClean="0"/>
-          </a:p>
-          <a:p>
-            <a:pPr marL="82296" indent="0">
-              <a:buNone/>
-            </a:pPr>
-            <a:r>
-              <a:rPr lang="ja-JP" altLang="en-US" dirty="0" smtClean="0"/>
-              <a:t>（</a:t>
-            </a:r>
-            <a:r>
-              <a:rPr lang="en-US" altLang="ja-JP" dirty="0" smtClean="0"/>
-              <a:t>&lt;</a:t>
-            </a:r>
-            <a:r>
-              <a:rPr lang="ja-JP" altLang="en-US" dirty="0" smtClean="0"/>
-              <a:t>手続き</a:t>
-            </a:r>
-            <a:r>
-              <a:rPr lang="en-US" altLang="ja-JP" dirty="0" smtClean="0"/>
-              <a:t>&gt; &lt;</a:t>
-            </a:r>
-            <a:r>
-              <a:rPr lang="ja-JP" altLang="en-US" dirty="0" smtClean="0"/>
-              <a:t>引数</a:t>
-            </a:r>
-            <a:r>
-              <a:rPr lang="en-US" altLang="ja-JP" dirty="0" smtClean="0"/>
-              <a:t>1&gt; &lt;</a:t>
-            </a:r>
-            <a:r>
-              <a:rPr lang="ja-JP" altLang="en-US" dirty="0" smtClean="0"/>
-              <a:t>引数</a:t>
-            </a:r>
-            <a:r>
-              <a:rPr lang="en-US" altLang="ja-JP" dirty="0" smtClean="0"/>
-              <a:t>2&gt;</a:t>
-            </a:r>
-            <a:r>
-              <a:rPr lang="ja-JP" altLang="en-US" dirty="0" smtClean="0"/>
-              <a:t>　･･･）</a:t>
-            </a:r>
-            <a:endParaRPr lang="en-US" altLang="ja-JP" dirty="0" smtClean="0"/>
-          </a:p>
-          <a:p>
-            <a:pPr marL="82296" indent="0">
-              <a:buNone/>
-            </a:pPr>
-            <a:r>
-              <a:rPr lang="en-US" altLang="ja-JP" dirty="0" smtClean="0"/>
-              <a:t>(+ 1 2 3)</a:t>
-            </a:r>
-          </a:p>
-          <a:p>
-            <a:pPr marL="82296" indent="0">
-              <a:buNone/>
-            </a:pPr>
-            <a:endParaRPr lang="en-US" altLang="ja-JP" dirty="0" smtClean="0"/>
-          </a:p>
-          <a:p>
-            <a:pPr marL="82296" indent="0">
-              <a:buNone/>
-            </a:pPr>
-            <a:r>
-              <a:rPr lang="ja-JP" altLang="en-US" dirty="0" smtClean="0"/>
-              <a:t>・データとしてのリストはクオートを付ける</a:t>
-            </a:r>
-            <a:endParaRPr lang="en-US" altLang="ja-JP" dirty="0" smtClean="0"/>
-          </a:p>
-          <a:p>
-            <a:pPr marL="82296" indent="0">
-              <a:buNone/>
-            </a:pPr>
-            <a:r>
-              <a:rPr lang="en-US" altLang="ja-JP" dirty="0" smtClean="0"/>
-              <a:t>‘(1 2 3)</a:t>
-            </a:r>
-          </a:p>
-          <a:p>
-            <a:pPr marL="82296" indent="0">
-              <a:buNone/>
-            </a:pPr>
-            <a:endParaRPr lang="en-US" altLang="ja-JP" dirty="0" smtClean="0"/>
-          </a:p>
-          <a:p>
-            <a:pPr marL="82296" indent="0">
-              <a:buNone/>
-            </a:pPr>
-            <a:r>
-              <a:rPr lang="ja-JP" altLang="en-US" dirty="0" smtClean="0"/>
-              <a:t>例）リストの連結処理</a:t>
-            </a:r>
-            <a:endParaRPr lang="en-US" altLang="ja-JP" dirty="0" smtClean="0"/>
-          </a:p>
-          <a:p>
-            <a:pPr marL="82296" indent="0">
-              <a:buNone/>
-            </a:pPr>
-            <a:r>
-              <a:rPr lang="nl-NL" altLang="ja-JP" dirty="0"/>
-              <a:t>(append '(1 2 3) '(4 5 6))</a:t>
-            </a:r>
-            <a:endParaRPr lang="en-US" altLang="ja-JP" dirty="0"/>
-          </a:p>
-        </p:txBody>
-      </p:sp>
-      <p:sp>
-        <p:nvSpPr>
-          <p:cNvPr id="4" name="角丸四角形吹き出し 3"/>
-          <p:cNvSpPr/>
-          <p:nvPr/>
-        </p:nvSpPr>
-        <p:spPr>
-          <a:xfrm>
-            <a:off x="3995936" y="2564904"/>
-            <a:ext cx="2952328" cy="720080"/>
-          </a:xfrm>
-          <a:prstGeom prst="wedgeRoundRectCallout">
-            <a:avLst>
-              <a:gd name="adj1" fmla="val -62129"/>
-              <a:gd name="adj2" fmla="val -32739"/>
-              <a:gd name="adj3" fmla="val 16667"/>
-            </a:avLst>
-          </a:prstGeom>
-        </p:spPr>
-        <p:style>
-          <a:lnRef idx="2">
-            <a:schemeClr val="accent1">
-              <a:shade val="50000"/>
-            </a:schemeClr>
-          </a:lnRef>
-          <a:fillRef idx="1">
-            <a:schemeClr val="accent1"/>
-          </a:fillRef>
-          <a:effectRef idx="0">
-            <a:schemeClr val="accent1"/>
-          </a:effectRef>
-          <a:fontRef idx="minor">
-            <a:schemeClr val="lt1"/>
-          </a:fontRef>
-        </p:style>
-        <p:txBody>
-          <a:bodyPr rtlCol="0" anchor="ctr"/>
-          <a:lstStyle/>
-          <a:p>
-            <a:pPr algn="ctr"/>
-            <a:r>
-              <a:rPr lang="en-US" altLang="ja-JP" dirty="0" smtClean="0"/>
-              <a:t>Scheme</a:t>
-            </a:r>
-            <a:r>
-              <a:rPr lang="ja-JP" altLang="en-US" dirty="0" smtClean="0"/>
-              <a:t>に</a:t>
-            </a:r>
-            <a:endParaRPr lang="en-US" altLang="ja-JP" dirty="0" smtClean="0"/>
-          </a:p>
-          <a:p>
-            <a:pPr algn="ctr"/>
-            <a:r>
-              <a:rPr lang="ja-JP" altLang="en-US" dirty="0" smtClean="0"/>
-              <a:t>演算子というものは無いのだよ</a:t>
-            </a:r>
-            <a:endParaRPr kumimoji="1" lang="ja-JP" altLang="en-US" dirty="0"/>
+            <a:pPr marL="82296" indent="0" algn="ctr">
+              <a:buNone/>
+            </a:pPr>
+            <a:endParaRPr kumimoji="1" lang="en-US" altLang="ja-JP" sz="4400" dirty="0" smtClean="0"/>
+          </a:p>
+          <a:p>
+            <a:pPr marL="82296" indent="0" algn="ctr">
+              <a:buNone/>
+            </a:pPr>
+            <a:endParaRPr kumimoji="1" lang="en-US" altLang="ja-JP" sz="4400" dirty="0" smtClean="0"/>
+          </a:p>
+          <a:p>
+            <a:pPr marL="82296" indent="0" algn="ctr">
+              <a:buNone/>
+            </a:pPr>
+            <a:r>
+              <a:rPr kumimoji="1" lang="ja-JP" altLang="en-US" sz="4400" dirty="0" smtClean="0"/>
+              <a:t>④基本的なこと</a:t>
+            </a:r>
+            <a:endParaRPr kumimoji="1" lang="en-US" altLang="ja-JP" sz="4400" dirty="0" smtClean="0"/>
           </a:p>
         </p:txBody>
       </p:sp>
     </p:spTree>
     <p:extLst>
       <p:ext uri="{BB962C8B-B14F-4D97-AF65-F5344CB8AC3E}">
-        <p14:creationId xmlns:p14="http://schemas.microsoft.com/office/powerpoint/2010/main" val="3513868151"/>
+        <p14:creationId xmlns:p14="http://schemas.microsoft.com/office/powerpoint/2010/main" val="2677223863"/>
       </p:ext>
     </p:extLst>
   </p:cSld>
@@ -7562,11 +7549,7 @@
           <a:p>
             <a:r>
               <a:rPr kumimoji="1" lang="ja-JP" altLang="en-US" dirty="0" smtClean="0"/>
-              <a:t>重要な組み込み手続き</a:t>
-            </a:r>
-            <a:r>
-              <a:rPr kumimoji="1" lang="en-US" altLang="ja-JP" dirty="0" smtClean="0"/>
-              <a:t>1</a:t>
+              <a:t>基本的なこと</a:t>
             </a:r>
             <a:endParaRPr kumimoji="1" lang="ja-JP" altLang="en-US" dirty="0"/>
           </a:p>
@@ -7599,12 +7582,66 @@
             </a:pPr>
             <a:r>
               <a:rPr lang="ja-JP" altLang="en-US" dirty="0" smtClean="0"/>
-              <a:t>・手続き </a:t>
-            </a:r>
+              <a:t>・基本的な処理の記法は</a:t>
+            </a:r>
+            <a:endParaRPr lang="en-US" altLang="ja-JP" dirty="0" smtClean="0"/>
+          </a:p>
+          <a:p>
+            <a:pPr marL="82296" indent="0">
+              <a:buNone/>
+            </a:pPr>
+            <a:r>
+              <a:rPr lang="ja-JP" altLang="en-US" u="sng" dirty="0" smtClean="0"/>
+              <a:t>（</a:t>
+            </a:r>
+            <a:r>
+              <a:rPr lang="en-US" altLang="ja-JP" u="sng" dirty="0" smtClean="0"/>
+              <a:t>&lt;</a:t>
+            </a:r>
+            <a:r>
+              <a:rPr lang="ja-JP" altLang="en-US" u="sng" dirty="0" smtClean="0"/>
+              <a:t>手続き</a:t>
+            </a:r>
+            <a:r>
+              <a:rPr lang="en-US" altLang="ja-JP" u="sng" dirty="0" smtClean="0"/>
+              <a:t>&gt; &lt;</a:t>
+            </a:r>
+            <a:r>
+              <a:rPr lang="ja-JP" altLang="en-US" u="sng" dirty="0" smtClean="0"/>
+              <a:t>引数</a:t>
+            </a:r>
+            <a:r>
+              <a:rPr lang="en-US" altLang="ja-JP" u="sng" dirty="0" smtClean="0"/>
+              <a:t>1&gt; &lt;</a:t>
+            </a:r>
+            <a:r>
+              <a:rPr lang="ja-JP" altLang="en-US" u="sng" dirty="0" smtClean="0"/>
+              <a:t>引数</a:t>
+            </a:r>
+            <a:r>
+              <a:rPr lang="en-US" altLang="ja-JP" u="sng" dirty="0" smtClean="0"/>
+              <a:t>2&gt;</a:t>
+            </a:r>
+            <a:r>
+              <a:rPr lang="ja-JP" altLang="en-US" u="sng" dirty="0" smtClean="0"/>
+              <a:t>　･･･）</a:t>
+            </a:r>
+            <a:endParaRPr lang="en-US" altLang="ja-JP" u="sng" dirty="0" smtClean="0"/>
+          </a:p>
+          <a:p>
+            <a:pPr marL="82296" indent="0">
+              <a:buNone/>
+            </a:pPr>
             <a:r>
               <a:rPr lang="en-US" altLang="ja-JP" dirty="0" smtClean="0"/>
-              <a:t>car</a:t>
-            </a:r>
+              <a:t>(+ 1 2 3)</a:t>
+            </a:r>
+          </a:p>
+          <a:p>
+            <a:pPr marL="82296" indent="0">
+              <a:buNone/>
+            </a:pPr>
+            <a:endParaRPr lang="en-US" altLang="ja-JP" dirty="0" smtClean="0"/>
           </a:p>
           <a:p>
             <a:pPr marL="82296" indent="0">
@@ -7612,7 +7649,7 @@
             </a:pPr>
             <a:r>
               <a:rPr lang="ja-JP" altLang="en-US" dirty="0" smtClean="0"/>
-              <a:t>　リストの先頭要素を返す</a:t>
+              <a:t>・データとしてのリストはクオートを付ける</a:t>
             </a:r>
             <a:endParaRPr lang="en-US" altLang="ja-JP" dirty="0" smtClean="0"/>
           </a:p>
@@ -7622,100 +7659,101 @@
             </a:pPr>
             <a:r>
               <a:rPr lang="en-US" altLang="ja-JP" dirty="0" smtClean="0"/>
-              <a:t>(car ‘(1 2 3))</a:t>
-            </a:r>
-          </a:p>
-          <a:p>
-            <a:pPr marL="82296" indent="0">
-              <a:buNone/>
-            </a:pPr>
+              <a:t>‘(1 2 3)</a:t>
+            </a:r>
+          </a:p>
+          <a:p>
+            <a:pPr marL="82296" indent="0">
+              <a:buNone/>
+            </a:pPr>
+            <a:endParaRPr lang="en-US" altLang="ja-JP" dirty="0" smtClean="0"/>
+          </a:p>
+          <a:p>
+            <a:pPr marL="82296" indent="0">
+              <a:buNone/>
+            </a:pPr>
+            <a:r>
+              <a:rPr lang="ja-JP" altLang="en-US" dirty="0" smtClean="0"/>
+              <a:t>例）リストの連結処理</a:t>
+            </a:r>
+            <a:endParaRPr lang="en-US" altLang="ja-JP" dirty="0" smtClean="0"/>
+          </a:p>
+          <a:p>
+            <a:pPr marL="82296" indent="0">
+              <a:buNone/>
+            </a:pPr>
+            <a:r>
+              <a:rPr lang="nl-NL" altLang="ja-JP" dirty="0"/>
+              <a:t>(append '(1 2 3) '(4 5 6))</a:t>
+            </a:r>
+            <a:endParaRPr lang="en-US" altLang="ja-JP" dirty="0"/>
+          </a:p>
+        </p:txBody>
+      </p:sp>
+      <p:sp>
+        <p:nvSpPr>
+          <p:cNvPr id="4" name="角丸四角形吹き出し 3"/>
+          <p:cNvSpPr/>
+          <p:nvPr/>
+        </p:nvSpPr>
+        <p:spPr>
+          <a:xfrm>
+            <a:off x="3995936" y="2564904"/>
+            <a:ext cx="2952328" cy="720080"/>
+          </a:xfrm>
+          <a:prstGeom prst="wedgeRoundRectCallout">
+            <a:avLst>
+              <a:gd name="adj1" fmla="val -62129"/>
+              <a:gd name="adj2" fmla="val -32739"/>
+              <a:gd name="adj3" fmla="val 16667"/>
+            </a:avLst>
+          </a:prstGeom>
+        </p:spPr>
+        <p:style>
+          <a:lnRef idx="2">
+            <a:schemeClr val="accent1">
+              <a:shade val="50000"/>
+            </a:schemeClr>
+          </a:lnRef>
+          <a:fillRef idx="1">
+            <a:schemeClr val="accent1"/>
+          </a:fillRef>
+          <a:effectRef idx="0">
+            <a:schemeClr val="accent1"/>
+          </a:effectRef>
+          <a:fontRef idx="minor">
+            <a:schemeClr val="lt1"/>
+          </a:fontRef>
+        </p:style>
+        <p:txBody>
+          <a:bodyPr rtlCol="0" anchor="ctr"/>
+          <a:lstStyle/>
+          <a:p>
+            <a:pPr algn="ctr"/>
             <a:r>
               <a:rPr lang="en-US" altLang="ja-JP" dirty="0" smtClean="0"/>
-              <a:t>=&gt; </a:t>
-            </a:r>
-            <a:r>
-              <a:rPr lang="en-US" altLang="ja-JP" dirty="0" smtClean="0"/>
-              <a:t>1</a:t>
-            </a:r>
-          </a:p>
-          <a:p>
-            <a:pPr marL="82296" indent="0">
-              <a:buNone/>
-            </a:pPr>
+              <a:t>Scheme</a:t>
+            </a:r>
+            <a:r>
+              <a:rPr lang="ja-JP" altLang="en-US" dirty="0" smtClean="0"/>
+              <a:t>に</a:t>
+            </a:r>
             <a:endParaRPr lang="en-US" altLang="ja-JP" dirty="0" smtClean="0"/>
           </a:p>
           <a:p>
-            <a:pPr marL="82296" indent="0">
-              <a:buNone/>
-            </a:pPr>
+            <a:pPr algn="ctr"/>
             <a:r>
               <a:rPr lang="ja-JP" altLang="en-US" dirty="0" smtClean="0"/>
-              <a:t>・手続き </a:t>
-            </a:r>
-            <a:r>
-              <a:rPr lang="en-US" altLang="ja-JP" dirty="0" err="1" smtClean="0"/>
-              <a:t>cdr</a:t>
-            </a:r>
-            <a:endParaRPr lang="en-US" altLang="ja-JP" dirty="0" smtClean="0"/>
-          </a:p>
-          <a:p>
-            <a:pPr marL="82296" indent="0">
-              <a:buNone/>
-            </a:pPr>
-            <a:r>
-              <a:rPr lang="ja-JP" altLang="en-US" dirty="0" smtClean="0"/>
-              <a:t>　リストの先頭を除いた残り</a:t>
-            </a:r>
-            <a:r>
-              <a:rPr lang="ja-JP" altLang="en-US" dirty="0" smtClean="0"/>
-              <a:t>の要素を</a:t>
-            </a:r>
-            <a:r>
-              <a:rPr lang="ja-JP" altLang="en-US" dirty="0" smtClean="0"/>
-              <a:t>返す</a:t>
-            </a:r>
-            <a:endParaRPr lang="en-US" altLang="ja-JP" dirty="0" smtClean="0"/>
-          </a:p>
-          <a:p>
-            <a:pPr marL="82296" indent="0">
-              <a:buNone/>
-            </a:pPr>
-            <a:r>
-              <a:rPr lang="en-US" altLang="ja-JP" dirty="0"/>
-              <a:t>(</a:t>
-            </a:r>
-            <a:r>
-              <a:rPr lang="en-US" altLang="ja-JP" dirty="0" err="1" smtClean="0"/>
-              <a:t>cdr</a:t>
-            </a:r>
-            <a:r>
-              <a:rPr lang="en-US" altLang="ja-JP" dirty="0" smtClean="0"/>
-              <a:t> </a:t>
-            </a:r>
-            <a:r>
-              <a:rPr lang="en-US" altLang="ja-JP" dirty="0"/>
-              <a:t>‘(1 2 3))</a:t>
-            </a:r>
-          </a:p>
-          <a:p>
-            <a:pPr marL="82296" indent="0">
-              <a:buNone/>
-            </a:pPr>
-            <a:r>
-              <a:rPr lang="en-US" altLang="ja-JP" dirty="0" smtClean="0"/>
-              <a:t>=&gt; </a:t>
-            </a:r>
-            <a:r>
-              <a:rPr lang="en-US" altLang="ja-JP" dirty="0" smtClean="0"/>
-              <a:t>(2 3)</a:t>
-            </a:r>
+              <a:t>演算子というものは無いのだよ</a:t>
+            </a:r>
+            <a:endParaRPr kumimoji="1" lang="ja-JP" altLang="en-US" dirty="0"/>
           </a:p>
         </p:txBody>
       </p:sp>
     </p:spTree>
     <p:extLst>
       <p:ext uri="{BB962C8B-B14F-4D97-AF65-F5344CB8AC3E}">
-        <p14:creationId xmlns:p14="http://schemas.microsoft.com/office/powerpoint/2010/main" val="235823119"/>
+        <p14:creationId xmlns:p14="http://schemas.microsoft.com/office/powerpoint/2010/main" val="3513868151"/>
       </p:ext>
     </p:extLst>
   </p:cSld>
@@ -7766,11 +7804,15 @@
           <a:p>
             <a:r>
               <a:rPr kumimoji="1" lang="ja-JP" altLang="en-US" dirty="0" smtClean="0"/>
-              <a:t>重要な組み込み手続き</a:t>
-            </a:r>
-            <a:r>
-              <a:rPr kumimoji="1" lang="en-US" altLang="ja-JP" dirty="0" smtClean="0"/>
-              <a:t>2</a:t>
+              <a:t>重要な組み込み</a:t>
+            </a:r>
+            <a:r>
+              <a:rPr kumimoji="1" lang="ja-JP" altLang="en-US" dirty="0" smtClean="0"/>
+              <a:t>手続き</a:t>
+            </a:r>
+            <a:r>
+              <a:rPr lang="ja-JP" altLang="en-US" dirty="0" smtClean="0"/>
+              <a:t>１</a:t>
             </a:r>
             <a:endParaRPr kumimoji="1" lang="ja-JP" altLang="en-US" dirty="0"/>
           </a:p>
@@ -7807,24 +7849,7 @@
             </a:r>
             <a:r>
               <a:rPr lang="en-US" altLang="ja-JP" dirty="0" smtClean="0"/>
-              <a:t>cons</a:t>
-            </a:r>
-          </a:p>
-          <a:p>
-            <a:pPr marL="82296" indent="0">
-              <a:buNone/>
-            </a:pPr>
-            <a:r>
-              <a:rPr lang="ja-JP" altLang="en-US" dirty="0" smtClean="0"/>
-              <a:t>　先頭要素と残りのリストを</a:t>
-            </a:r>
-            <a:r>
-              <a:rPr lang="ja-JP" altLang="en-US" dirty="0"/>
-              <a:t>連結</a:t>
-            </a:r>
-            <a:r>
-              <a:rPr lang="ja-JP" altLang="en-US" dirty="0" smtClean="0"/>
-              <a:t>する</a:t>
+              <a:t>define</a:t>
             </a:r>
             <a:endParaRPr lang="en-US" altLang="ja-JP" dirty="0" smtClean="0"/>
           </a:p>
@@ -7833,73 +7858,8 @@
               <a:buNone/>
             </a:pPr>
             <a:r>
-              <a:rPr lang="en-US" altLang="ja-JP" dirty="0" smtClean="0"/>
-              <a:t>(cons 1 ‘(2 3))</a:t>
-            </a:r>
-          </a:p>
-          <a:p>
-            <a:pPr marL="82296" indent="0">
-              <a:buNone/>
-            </a:pPr>
-            <a:r>
-              <a:rPr lang="en-US" altLang="ja-JP" dirty="0" smtClean="0"/>
-              <a:t>=&gt; </a:t>
-            </a:r>
-            <a:r>
-              <a:rPr lang="en-US" altLang="ja-JP" dirty="0" smtClean="0"/>
-              <a:t>(1 2 3)</a:t>
-            </a:r>
-          </a:p>
-          <a:p>
-            <a:pPr marL="82296" indent="0">
-              <a:buNone/>
-            </a:pPr>
-            <a:endParaRPr lang="en-US" altLang="ja-JP" dirty="0" smtClean="0"/>
-          </a:p>
-          <a:p>
-            <a:pPr marL="82296" indent="0">
-              <a:buNone/>
-            </a:pPr>
-            <a:r>
-              <a:rPr lang="en-US" altLang="ja-JP" dirty="0" smtClean="0"/>
-              <a:t>(cons (car </a:t>
-            </a:r>
-            <a:r>
-              <a:rPr lang="en-US" altLang="ja-JP" dirty="0" err="1" smtClean="0"/>
-              <a:t>lis</a:t>
-            </a:r>
-            <a:r>
-              <a:rPr lang="en-US" altLang="ja-JP" dirty="0" smtClean="0"/>
-              <a:t>) (</a:t>
-            </a:r>
-            <a:r>
-              <a:rPr lang="en-US" altLang="ja-JP" dirty="0" err="1" smtClean="0"/>
-              <a:t>cdr</a:t>
-            </a:r>
-            <a:r>
-              <a:rPr lang="en-US" altLang="ja-JP" dirty="0" smtClean="0"/>
-              <a:t> </a:t>
-            </a:r>
-            <a:r>
-              <a:rPr lang="en-US" altLang="ja-JP" dirty="0" err="1" smtClean="0"/>
-              <a:t>lis</a:t>
-            </a:r>
-            <a:r>
-              <a:rPr lang="en-US" altLang="ja-JP" dirty="0" smtClean="0"/>
-              <a:t>))</a:t>
-            </a:r>
-          </a:p>
-          <a:p>
-            <a:pPr marL="82296" indent="0">
-              <a:buNone/>
-            </a:pPr>
-            <a:r>
-              <a:rPr lang="en-US" altLang="ja-JP" dirty="0" smtClean="0"/>
-              <a:t>=&gt; </a:t>
-            </a:r>
-            <a:r>
-              <a:rPr lang="en-US" altLang="ja-JP" dirty="0" err="1" smtClean="0"/>
-              <a:t>lis</a:t>
+              <a:rPr lang="ja-JP" altLang="en-US" smtClean="0"/>
+              <a:t>　</a:t>
             </a:r>
             <a:endParaRPr lang="en-US" altLang="ja-JP" dirty="0" smtClean="0"/>
           </a:p>
@@ -7908,7 +7868,7 @@
     </p:spTree>
     <p:extLst>
       <p:ext uri="{BB962C8B-B14F-4D97-AF65-F5344CB8AC3E}">
-        <p14:creationId xmlns:p14="http://schemas.microsoft.com/office/powerpoint/2010/main" val="3029638908"/>
+        <p14:creationId xmlns:p14="http://schemas.microsoft.com/office/powerpoint/2010/main" val="235823119"/>
       </p:ext>
     </p:extLst>
   </p:cSld>
@@ -7958,20 +7918,16 @@
           <a:lstStyle/>
           <a:p>
             <a:r>
-              <a:rPr lang="en-US" altLang="ja-JP" dirty="0" smtClean="0"/>
-              <a:t>Scheme</a:t>
-            </a:r>
-            <a:r>
-              <a:rPr lang="ja-JP" altLang="en-US" dirty="0" err="1" smtClean="0"/>
-              <a:t>での</a:t>
-            </a:r>
-            <a:r>
-              <a:rPr lang="ja-JP" altLang="en-US" dirty="0" smtClean="0"/>
-              <a:t>リストの</a:t>
+              <a:rPr kumimoji="1" lang="ja-JP" altLang="en-US" dirty="0" smtClean="0"/>
+              <a:t>重要な組み込み</a:t>
+            </a:r>
+            <a:r>
+              <a:rPr kumimoji="1" lang="ja-JP" altLang="en-US" dirty="0" smtClean="0"/>
+              <a:t>手続き</a:t>
             </a:r>
             <a:r>
               <a:rPr lang="ja-JP" altLang="en-US" dirty="0"/>
-              <a:t>考え方</a:t>
+              <a:t>２</a:t>
             </a:r>
             <a:endParaRPr kumimoji="1" lang="ja-JP" altLang="en-US" dirty="0"/>
           </a:p>
@@ -7989,8 +7945,8 @@
         </p:nvSpPr>
         <p:spPr>
           <a:xfrm>
-            <a:off x="971600" y="1124744"/>
-            <a:ext cx="8172400" cy="5544616"/>
+            <a:off x="1115616" y="1124744"/>
+            <a:ext cx="7818072" cy="5544616"/>
           </a:xfrm>
         </p:spPr>
         <p:txBody>
@@ -8003,77 +7959,70 @@
               <a:buNone/>
             </a:pPr>
             <a:r>
-              <a:rPr lang="ja-JP" altLang="en-US" dirty="0"/>
-              <a:t>内部的</a:t>
-            </a:r>
-            <a:r>
               <a:rPr lang="ja-JP" altLang="en-US" dirty="0" smtClean="0"/>
-              <a:t>には</a:t>
-            </a:r>
-            <a:r>
-              <a:rPr lang="en-US" altLang="ja-JP" b="1" dirty="0" smtClean="0"/>
-              <a:t>2</a:t>
-            </a:r>
-            <a:r>
-              <a:rPr lang="ja-JP" altLang="en-US" b="1" dirty="0" err="1" smtClean="0"/>
-              <a:t>つの</a:t>
-            </a:r>
-            <a:r>
-              <a:rPr lang="ja-JP" altLang="en-US" b="1" dirty="0" smtClean="0"/>
-              <a:t>ポインタを持った対の連なり。</a:t>
-            </a:r>
-            <a:endParaRPr lang="en-US" altLang="ja-JP" b="1" dirty="0" smtClean="0"/>
-          </a:p>
-          <a:p>
-            <a:pPr marL="82296" indent="0">
-              <a:buNone/>
-            </a:pPr>
-            <a:r>
-              <a:rPr lang="ja-JP" altLang="en-US" b="1" dirty="0" smtClean="0"/>
-              <a:t>値</a:t>
-            </a:r>
+              <a:t>・手続き </a:t>
+            </a:r>
+            <a:r>
+              <a:rPr lang="en-US" altLang="ja-JP" dirty="0" smtClean="0"/>
+              <a:t>car</a:t>
+            </a:r>
+          </a:p>
+          <a:p>
+            <a:pPr marL="82296" indent="0">
+              <a:buNone/>
+            </a:pPr>
             <a:r>
               <a:rPr lang="ja-JP" altLang="en-US" dirty="0" smtClean="0"/>
-              <a:t>そのものと</a:t>
-            </a:r>
-            <a:r>
-              <a:rPr lang="ja-JP" altLang="en-US" b="1" dirty="0" smtClean="0"/>
-              <a:t>次の要素の情報</a:t>
-            </a:r>
+              <a:t>　リストの先頭要素を返す</a:t>
+            </a:r>
+            <a:endParaRPr lang="en-US" altLang="ja-JP" dirty="0" smtClean="0"/>
+          </a:p>
+          <a:p>
+            <a:pPr marL="82296" indent="0">
+              <a:buNone/>
+            </a:pPr>
+            <a:r>
+              <a:rPr lang="en-US" altLang="ja-JP" dirty="0" smtClean="0"/>
+              <a:t>(car ‘(1 2 3))</a:t>
+            </a:r>
+          </a:p>
+          <a:p>
+            <a:pPr marL="82296" indent="0">
+              <a:buNone/>
+            </a:pPr>
+            <a:r>
+              <a:rPr lang="en-US" altLang="ja-JP" dirty="0" smtClean="0"/>
+              <a:t>=&gt; 1</a:t>
+            </a:r>
+          </a:p>
+          <a:p>
+            <a:pPr marL="82296" indent="0">
+              <a:buNone/>
+            </a:pPr>
+            <a:endParaRPr lang="en-US" altLang="ja-JP" dirty="0" smtClean="0"/>
+          </a:p>
+          <a:p>
+            <a:pPr marL="82296" indent="0">
+              <a:buNone/>
+            </a:pPr>
             <a:r>
               <a:rPr lang="ja-JP" altLang="en-US" dirty="0" smtClean="0"/>
-              <a:t>を持つ</a:t>
-            </a:r>
-            <a:endParaRPr lang="en-US" altLang="ja-JP" dirty="0" smtClean="0"/>
-          </a:p>
-          <a:p>
-            <a:pPr marL="82296" indent="0">
-              <a:buNone/>
-            </a:pPr>
-            <a:endParaRPr lang="en-US" altLang="ja-JP" b="1" dirty="0"/>
-          </a:p>
-          <a:p>
-            <a:pPr marL="82296" indent="0">
-              <a:buNone/>
-            </a:pPr>
-            <a:r>
-              <a:rPr lang="ja-JP" altLang="en-US" dirty="0" smtClean="0"/>
-              <a:t>・最後の</a:t>
+              <a:t>・手続き </a:t>
             </a:r>
             <a:r>
               <a:rPr lang="en-US" altLang="ja-JP" dirty="0" err="1" smtClean="0"/>
               <a:t>cdr</a:t>
             </a:r>
+            <a:endParaRPr lang="en-US" altLang="ja-JP" dirty="0" smtClean="0"/>
+          </a:p>
+          <a:p>
+            <a:pPr marL="82296" indent="0">
+              <a:buNone/>
+            </a:pPr>
             <a:r>
               <a:rPr lang="ja-JP" altLang="en-US" dirty="0" smtClean="0"/>
-              <a:t>部が空リスト：正式なリスト</a:t>
-            </a:r>
-            <a:endParaRPr lang="en-US" altLang="ja-JP" b="1" dirty="0" smtClean="0"/>
-          </a:p>
-          <a:p>
-            <a:pPr marL="82296" indent="0">
-              <a:buNone/>
-            </a:pPr>
+              <a:t>　リストの先頭を除いた残りの要素を返す</a:t>
+            </a:r>
             <a:endParaRPr lang="en-US" altLang="ja-JP" dirty="0" smtClean="0"/>
           </a:p>
           <a:p>
@@ -8081,87 +8030,37 @@
               <a:buNone/>
             </a:pPr>
             <a:r>
-              <a:rPr lang="ja-JP" altLang="en-US" dirty="0" smtClean="0"/>
-              <a:t>・最後の</a:t>
+              <a:rPr lang="en-US" altLang="ja-JP" dirty="0"/>
+              <a:t>(</a:t>
             </a:r>
             <a:r>
               <a:rPr lang="en-US" altLang="ja-JP" dirty="0" err="1" smtClean="0"/>
               <a:t>cdr</a:t>
             </a:r>
             <a:r>
-              <a:rPr lang="ja-JP" altLang="en-US" dirty="0" smtClean="0"/>
-              <a:t>部が空リストでない：ドットリスト</a:t>
-            </a:r>
-            <a:endParaRPr lang="en-US" altLang="ja-JP" dirty="0" smtClean="0"/>
-          </a:p>
-          <a:p>
-            <a:pPr marL="82296" indent="0">
-              <a:buNone/>
-            </a:pPr>
-            <a:endParaRPr lang="en-US" altLang="ja-JP" dirty="0"/>
-          </a:p>
-          <a:p>
-            <a:pPr marL="82296" indent="0">
-              <a:buNone/>
-            </a:pPr>
-            <a:r>
-              <a:rPr lang="en-US" altLang="ja-JP" sz="2000" dirty="0">
-                <a:hlinkClick r:id="rId2"/>
-              </a:rPr>
-              <a:t>https://</a:t>
-            </a:r>
-            <a:r>
-              <a:rPr lang="en-US" altLang="ja-JP" sz="2000" dirty="0" smtClean="0">
-                <a:hlinkClick r:id="rId2"/>
-              </a:rPr>
-              <a:t>www.shido.info/lisp/scheme3.html</a:t>
-            </a:r>
-            <a:endParaRPr lang="en-US" altLang="ja-JP" sz="2000" dirty="0" smtClean="0"/>
-          </a:p>
-          <a:p>
-            <a:pPr marL="82296" indent="0">
-              <a:buNone/>
-            </a:pPr>
-            <a:endParaRPr lang="en-US" altLang="ja-JP" sz="2000" dirty="0" smtClean="0">
-              <a:hlinkClick r:id="rId3"/>
-            </a:endParaRPr>
-          </a:p>
-          <a:p>
-            <a:pPr marL="82296" indent="0">
-              <a:buNone/>
-            </a:pPr>
-            <a:r>
-              <a:rPr lang="en-US" altLang="ja-JP" sz="2000" dirty="0" smtClean="0">
-                <a:hlinkClick r:id="rId3"/>
-              </a:rPr>
-              <a:t>http</a:t>
-            </a:r>
-            <a:r>
-              <a:rPr lang="en-US" altLang="ja-JP" sz="2000" dirty="0">
-                <a:hlinkClick r:id="rId3"/>
-              </a:rPr>
-              <a:t>://</a:t>
-            </a:r>
-            <a:r>
-              <a:rPr lang="en-US" altLang="ja-JP" sz="2000" dirty="0" smtClean="0">
-                <a:hlinkClick r:id="rId3"/>
-              </a:rPr>
-              <a:t>bach.istc.kobe-u.ac.jp/lect/ProLang/org/lisp-cell.html</a:t>
-            </a:r>
-            <a:endParaRPr lang="en-US" altLang="ja-JP" dirty="0"/>
-          </a:p>
-          <a:p>
-            <a:pPr marL="82296" indent="0">
-              <a:buNone/>
-            </a:pPr>
-            <a:endParaRPr lang="en-US" altLang="ja-JP" b="1" dirty="0" smtClean="0"/>
+              <a:rPr lang="en-US" altLang="ja-JP" dirty="0" smtClean="0"/>
+              <a:t> </a:t>
+            </a:r>
+            <a:r>
+              <a:rPr lang="en-US" altLang="ja-JP" dirty="0"/>
+              <a:t>‘(1 2 3))</a:t>
+            </a:r>
+          </a:p>
+          <a:p>
+            <a:pPr marL="82296" indent="0">
+              <a:buNone/>
+            </a:pPr>
+            <a:r>
+              <a:rPr lang="en-US" altLang="ja-JP" dirty="0" smtClean="0"/>
+              <a:t>=&gt; (2 3)</a:t>
+            </a:r>
           </a:p>
         </p:txBody>
       </p:sp>
     </p:spTree>
     <p:extLst>
       <p:ext uri="{BB962C8B-B14F-4D97-AF65-F5344CB8AC3E}">
-        <p14:creationId xmlns:p14="http://schemas.microsoft.com/office/powerpoint/2010/main" val="1176395678"/>
+        <p14:creationId xmlns:p14="http://schemas.microsoft.com/office/powerpoint/2010/main" val="1880388047"/>
       </p:ext>
     </p:extLst>
   </p:cSld>
@@ -8212,7 +8111,15 @@
           <a:p>
             <a:r>
               <a:rPr kumimoji="1" lang="ja-JP" altLang="en-US" dirty="0" smtClean="0"/>
-              <a:t>重要な組み込み手続き３</a:t>
+              <a:t>重要な組み込み</a:t>
+            </a:r>
+            <a:r>
+              <a:rPr kumimoji="1" lang="ja-JP" altLang="en-US" dirty="0" smtClean="0"/>
+              <a:t>手続き</a:t>
+            </a:r>
+            <a:r>
+              <a:rPr lang="ja-JP" altLang="en-US" dirty="0"/>
+              <a:t>３</a:t>
             </a:r>
             <a:endParaRPr kumimoji="1" lang="ja-JP" altLang="en-US" dirty="0"/>
           </a:p>
@@ -8230,8 +8137,8 @@
         </p:nvSpPr>
         <p:spPr>
           <a:xfrm>
-            <a:off x="1043608" y="1124744"/>
-            <a:ext cx="8100392" cy="5544616"/>
+            <a:off x="1115616" y="1124744"/>
+            <a:ext cx="7818072" cy="5544616"/>
           </a:xfrm>
         </p:spPr>
         <p:txBody>
@@ -8249,7 +8156,24 @@
             </a:r>
             <a:r>
               <a:rPr lang="en-US" altLang="ja-JP" dirty="0" smtClean="0"/>
-              <a:t>fold</a:t>
+              <a:t>cons</a:t>
+            </a:r>
+          </a:p>
+          <a:p>
+            <a:pPr marL="82296" indent="0">
+              <a:buNone/>
+            </a:pPr>
+            <a:r>
+              <a:rPr lang="ja-JP" altLang="en-US" dirty="0" smtClean="0"/>
+              <a:t>　先頭要素と残りのリストを</a:t>
+            </a:r>
+            <a:r>
+              <a:rPr lang="ja-JP" altLang="en-US" dirty="0"/>
+              <a:t>連結</a:t>
+            </a:r>
+            <a:r>
+              <a:rPr lang="ja-JP" altLang="en-US" dirty="0" smtClean="0"/>
+              <a:t>する</a:t>
             </a:r>
             <a:endParaRPr lang="en-US" altLang="ja-JP" dirty="0" smtClean="0"/>
           </a:p>
@@ -8258,105 +8182,47 @@
               <a:buNone/>
             </a:pPr>
             <a:r>
-              <a:rPr lang="ja-JP" altLang="en-US" dirty="0" smtClean="0"/>
-              <a:t>　</a:t>
-            </a:r>
-            <a:r>
               <a:rPr lang="en-US" altLang="ja-JP" dirty="0" smtClean="0"/>
-              <a:t>(fold &lt;</a:t>
-            </a:r>
-            <a:r>
-              <a:rPr lang="ja-JP" altLang="en-US" dirty="0" smtClean="0"/>
-              <a:t>手続き</a:t>
-            </a:r>
+              <a:t>(cons 1 ‘(2 3))</a:t>
+            </a:r>
+          </a:p>
+          <a:p>
+            <a:pPr marL="82296" indent="0">
+              <a:buNone/>
+            </a:pPr>
             <a:r>
               <a:rPr lang="en-US" altLang="ja-JP" dirty="0" smtClean="0"/>
-              <a:t>&gt; &lt;</a:t>
-            </a:r>
-            <a:r>
-              <a:rPr lang="ja-JP" altLang="en-US" dirty="0" smtClean="0"/>
-              <a:t>初期値</a:t>
-            </a:r>
+              <a:t>=&gt; (1 2 3)</a:t>
+            </a:r>
+          </a:p>
+          <a:p>
+            <a:pPr marL="82296" indent="0">
+              <a:buNone/>
+            </a:pPr>
+            <a:endParaRPr lang="en-US" altLang="ja-JP" dirty="0" smtClean="0"/>
+          </a:p>
+          <a:p>
+            <a:pPr marL="82296" indent="0">
+              <a:buNone/>
+            </a:pPr>
+            <a:endParaRPr lang="en-US" altLang="ja-JP" dirty="0" smtClean="0"/>
+          </a:p>
+          <a:p>
+            <a:pPr marL="82296" indent="0">
+              <a:buNone/>
+            </a:pPr>
             <a:r>
               <a:rPr lang="en-US" altLang="ja-JP" dirty="0" smtClean="0"/>
-              <a:t>&gt; &lt;</a:t>
-            </a:r>
-            <a:r>
-              <a:rPr lang="ja-JP" altLang="en-US" dirty="0" smtClean="0"/>
-              <a:t>リスト</a:t>
+              <a:t>(define </a:t>
+            </a:r>
+            <a:r>
+              <a:rPr lang="en-US" altLang="ja-JP" dirty="0" err="1" smtClean="0"/>
+              <a:t>lis</a:t>
             </a:r>
             <a:r>
               <a:rPr lang="en-US" altLang="ja-JP" dirty="0" smtClean="0"/>
-              <a:t>&gt;)</a:t>
-            </a:r>
-          </a:p>
-          <a:p>
-            <a:pPr marL="82296" indent="0">
-              <a:buNone/>
-            </a:pPr>
-            <a:r>
-              <a:rPr lang="ja-JP" altLang="en-US" sz="2800" dirty="0" smtClean="0"/>
-              <a:t>①リストの第一要素と初期値を引数に</a:t>
-            </a:r>
-            <a:r>
-              <a:rPr lang="en-US" altLang="ja-JP" sz="2800" dirty="0" smtClean="0"/>
-              <a:t>&lt;</a:t>
-            </a:r>
-            <a:r>
-              <a:rPr lang="ja-JP" altLang="en-US" sz="2800" dirty="0" smtClean="0"/>
-              <a:t>手続き</a:t>
-            </a:r>
-            <a:r>
-              <a:rPr lang="en-US" altLang="ja-JP" sz="2800" dirty="0" smtClean="0"/>
-              <a:t>&gt;</a:t>
-            </a:r>
-            <a:r>
-              <a:rPr lang="ja-JP" altLang="en-US" sz="2800" dirty="0" smtClean="0"/>
-              <a:t>実施</a:t>
-            </a:r>
-            <a:endParaRPr lang="en-US" altLang="ja-JP" sz="2800" dirty="0" smtClean="0"/>
-          </a:p>
-          <a:p>
-            <a:pPr marL="82296" indent="0">
-              <a:buNone/>
-            </a:pPr>
-            <a:r>
-              <a:rPr lang="ja-JP" altLang="en-US" sz="2800" dirty="0" smtClean="0"/>
-              <a:t>②第二要素と①の結果を引数に</a:t>
-            </a:r>
-            <a:r>
-              <a:rPr lang="en-US" altLang="ja-JP" sz="2800" dirty="0" smtClean="0"/>
-              <a:t>&lt;</a:t>
-            </a:r>
-            <a:r>
-              <a:rPr lang="ja-JP" altLang="en-US" sz="2800" dirty="0" smtClean="0"/>
-              <a:t>手続き</a:t>
-            </a:r>
-            <a:r>
-              <a:rPr lang="en-US" altLang="ja-JP" sz="2800" dirty="0" smtClean="0"/>
-              <a:t>&gt;</a:t>
-            </a:r>
-            <a:r>
-              <a:rPr lang="ja-JP" altLang="en-US" sz="2800" dirty="0" smtClean="0"/>
-              <a:t>実施</a:t>
-            </a:r>
-            <a:endParaRPr lang="en-US" altLang="ja-JP" sz="2800" dirty="0" smtClean="0"/>
-          </a:p>
-          <a:p>
-            <a:pPr marL="82296" indent="0">
-              <a:buNone/>
-            </a:pPr>
-            <a:r>
-              <a:rPr lang="ja-JP" altLang="en-US" sz="2800" dirty="0" smtClean="0"/>
-              <a:t>③以下、リストが終わるまで繰り返し</a:t>
-            </a:r>
-            <a:endParaRPr lang="en-US" altLang="ja-JP" sz="2800" dirty="0" smtClean="0"/>
-          </a:p>
-          <a:p>
-            <a:pPr marL="82296" indent="0">
-              <a:buNone/>
-            </a:pPr>
-            <a:endParaRPr lang="en-US" altLang="ja-JP" sz="2800" dirty="0"/>
+              <a:t> ‘(1 2 3))</a:t>
+            </a:r>
           </a:p>
           <a:p>
             <a:pPr marL="82296" indent="0">
@@ -8364,16 +8230,44 @@
             </a:pPr>
             <a:r>
               <a:rPr lang="en-US" altLang="ja-JP" dirty="0" smtClean="0"/>
-              <a:t>(fold * 1 ‘(1 2 3 4 5))</a:t>
-            </a:r>
-          </a:p>
-          <a:p>
-            <a:pPr marL="82296" indent="0">
-              <a:buNone/>
-            </a:pPr>
+              <a:t>(cons (car </a:t>
+            </a:r>
+            <a:r>
+              <a:rPr lang="en-US" altLang="ja-JP" dirty="0" err="1" smtClean="0"/>
+              <a:t>lis</a:t>
+            </a:r>
             <a:r>
               <a:rPr lang="en-US" altLang="ja-JP" dirty="0" smtClean="0"/>
-              <a:t>=&gt; 120</a:t>
+              <a:t>) (</a:t>
+            </a:r>
+            <a:r>
+              <a:rPr lang="en-US" altLang="ja-JP" dirty="0" err="1" smtClean="0"/>
+              <a:t>cdr</a:t>
+            </a:r>
+            <a:r>
+              <a:rPr lang="en-US" altLang="ja-JP" dirty="0" smtClean="0"/>
+              <a:t> </a:t>
+            </a:r>
+            <a:r>
+              <a:rPr lang="en-US" altLang="ja-JP" dirty="0" err="1" smtClean="0"/>
+              <a:t>lis</a:t>
+            </a:r>
+            <a:r>
+              <a:rPr lang="en-US" altLang="ja-JP" dirty="0" smtClean="0"/>
+              <a:t>))</a:t>
+            </a:r>
+          </a:p>
+          <a:p>
+            <a:pPr marL="82296" indent="0">
+              <a:buNone/>
+            </a:pPr>
+            <a:r>
+              <a:rPr lang="en-US" altLang="ja-JP" dirty="0" smtClean="0"/>
+              <a:t>=&gt; </a:t>
+            </a:r>
+            <a:r>
+              <a:rPr lang="en-US" altLang="ja-JP" dirty="0" err="1" smtClean="0"/>
+              <a:t>lis</a:t>
             </a:r>
             <a:endParaRPr lang="en-US" altLang="ja-JP" dirty="0" smtClean="0"/>
           </a:p>
@@ -8382,7 +8276,7 @@
     </p:spTree>
     <p:extLst>
       <p:ext uri="{BB962C8B-B14F-4D97-AF65-F5344CB8AC3E}">
-        <p14:creationId xmlns:p14="http://schemas.microsoft.com/office/powerpoint/2010/main" val="1964440084"/>
+        <p14:creationId xmlns:p14="http://schemas.microsoft.com/office/powerpoint/2010/main" val="3029638908"/>
       </p:ext>
     </p:extLst>
   </p:cSld>
@@ -8432,8 +8326,20 @@
           <a:lstStyle/>
           <a:p>
             <a:r>
-              <a:rPr kumimoji="1" lang="ja-JP" altLang="en-US" dirty="0" smtClean="0"/>
-              <a:t>ハローワールド</a:t>
+              <a:rPr lang="en-US" altLang="ja-JP" dirty="0" smtClean="0"/>
+              <a:t>Scheme</a:t>
+            </a:r>
+            <a:r>
+              <a:rPr lang="ja-JP" altLang="en-US" dirty="0" err="1" smtClean="0"/>
+              <a:t>での</a:t>
+            </a:r>
+            <a:r>
+              <a:rPr lang="ja-JP" altLang="en-US" dirty="0" smtClean="0"/>
+              <a:t>リストの</a:t>
+            </a:r>
+            <a:r>
+              <a:rPr lang="ja-JP" altLang="en-US" dirty="0"/>
+              <a:t>考え方</a:t>
             </a:r>
             <a:endParaRPr kumimoji="1" lang="ja-JP" altLang="en-US" dirty="0"/>
           </a:p>
@@ -8451,8 +8357,8 @@
         </p:nvSpPr>
         <p:spPr>
           <a:xfrm>
-            <a:off x="1115616" y="1124744"/>
-            <a:ext cx="7818072" cy="5544616"/>
+            <a:off x="971600" y="1124744"/>
+            <a:ext cx="8172400" cy="5544616"/>
           </a:xfrm>
         </p:spPr>
         <p:txBody>
@@ -8465,8 +8371,46 @@
               <a:buNone/>
             </a:pPr>
             <a:r>
+              <a:rPr lang="ja-JP" altLang="en-US" dirty="0"/>
+              <a:t>内部的</a:t>
+            </a:r>
+            <a:r>
               <a:rPr lang="ja-JP" altLang="en-US" dirty="0" smtClean="0"/>
-              <a:t>・対話型の場合</a:t>
+              <a:t>には</a:t>
+            </a:r>
+            <a:r>
+              <a:rPr lang="en-US" altLang="ja-JP" b="1" dirty="0" smtClean="0"/>
+              <a:t>2</a:t>
+            </a:r>
+            <a:r>
+              <a:rPr lang="ja-JP" altLang="en-US" b="1" dirty="0" err="1" smtClean="0"/>
+              <a:t>つの</a:t>
+            </a:r>
+            <a:r>
+              <a:rPr lang="ja-JP" altLang="en-US" b="1" dirty="0" smtClean="0"/>
+              <a:t>ポインタを持った対の連なり。</a:t>
+            </a:r>
+            <a:endParaRPr lang="en-US" altLang="ja-JP" b="1" dirty="0" smtClean="0"/>
+          </a:p>
+          <a:p>
+            <a:pPr marL="82296" indent="0">
+              <a:buNone/>
+            </a:pPr>
+            <a:r>
+              <a:rPr lang="ja-JP" altLang="en-US" b="1" dirty="0" smtClean="0"/>
+              <a:t>値</a:t>
+            </a:r>
+            <a:r>
+              <a:rPr lang="ja-JP" altLang="en-US" dirty="0" smtClean="0"/>
+              <a:t>そのものと</a:t>
+            </a:r>
+            <a:r>
+              <a:rPr lang="ja-JP" altLang="en-US" b="1" dirty="0" smtClean="0"/>
+              <a:t>次の要素の情報</a:t>
+            </a:r>
+            <a:r>
+              <a:rPr lang="ja-JP" altLang="en-US" dirty="0" smtClean="0"/>
+              <a:t>を持つ</a:t>
             </a:r>
             <a:endParaRPr lang="en-US" altLang="ja-JP" dirty="0" smtClean="0"/>
           </a:p>
@@ -8474,10 +8418,49 @@
             <a:pPr marL="82296" indent="0">
               <a:buNone/>
             </a:pPr>
-            <a:r>
-              <a:rPr lang="en-US" altLang="ja-JP" dirty="0" smtClean="0"/>
-              <a:t>(print “Hello, world.”)</a:t>
-            </a:r>
+            <a:endParaRPr lang="en-US" altLang="ja-JP" b="1" dirty="0"/>
+          </a:p>
+          <a:p>
+            <a:pPr marL="82296" indent="0">
+              <a:buNone/>
+            </a:pPr>
+            <a:r>
+              <a:rPr lang="ja-JP" altLang="en-US" dirty="0" smtClean="0"/>
+              <a:t>・最後の</a:t>
+            </a:r>
+            <a:r>
+              <a:rPr lang="en-US" altLang="ja-JP" dirty="0" err="1" smtClean="0"/>
+              <a:t>cdr</a:t>
+            </a:r>
+            <a:r>
+              <a:rPr lang="ja-JP" altLang="en-US" dirty="0" smtClean="0"/>
+              <a:t>部が空リスト：正式なリスト</a:t>
+            </a:r>
+            <a:endParaRPr lang="en-US" altLang="ja-JP" b="1" dirty="0" smtClean="0"/>
+          </a:p>
+          <a:p>
+            <a:pPr marL="82296" indent="0">
+              <a:buNone/>
+            </a:pPr>
+            <a:endParaRPr lang="en-US" altLang="ja-JP" dirty="0" smtClean="0"/>
+          </a:p>
+          <a:p>
+            <a:pPr marL="82296" indent="0">
+              <a:buNone/>
+            </a:pPr>
+            <a:r>
+              <a:rPr lang="ja-JP" altLang="en-US" dirty="0" smtClean="0"/>
+              <a:t>・最後の</a:t>
+            </a:r>
+            <a:r>
+              <a:rPr lang="en-US" altLang="ja-JP" dirty="0" err="1" smtClean="0"/>
+              <a:t>cdr</a:t>
+            </a:r>
+            <a:r>
+              <a:rPr lang="ja-JP" altLang="en-US" dirty="0" smtClean="0"/>
+              <a:t>部が空リストでない：ドットリスト</a:t>
+            </a:r>
+            <a:endParaRPr lang="en-US" altLang="ja-JP" dirty="0" smtClean="0"/>
           </a:p>
           <a:p>
             <a:pPr marL="82296" indent="0">
@@ -8489,15 +8472,49 @@
             <a:pPr marL="82296" indent="0">
               <a:buNone/>
             </a:pPr>
-            <a:endParaRPr lang="en-US" altLang="ja-JP" dirty="0" smtClean="0"/>
-          </a:p>
-          <a:p>
-            <a:pPr marL="82296" indent="0">
-              <a:buNone/>
-            </a:pPr>
-            <a:r>
-              <a:rPr lang="ja-JP" altLang="en-US" smtClean="0"/>
-              <a:t>・ファイル呼び出しの場合</a:t>
+            <a:r>
+              <a:rPr lang="en-US" altLang="ja-JP" sz="2000" dirty="0">
+                <a:hlinkClick r:id="rId2"/>
+              </a:rPr>
+              <a:t>https://</a:t>
+            </a:r>
+            <a:r>
+              <a:rPr lang="en-US" altLang="ja-JP" sz="2000" dirty="0" smtClean="0">
+                <a:hlinkClick r:id="rId2"/>
+              </a:rPr>
+              <a:t>www.shido.info/lisp/scheme3.html</a:t>
+            </a:r>
+            <a:endParaRPr lang="en-US" altLang="ja-JP" sz="2000" dirty="0" smtClean="0"/>
+          </a:p>
+          <a:p>
+            <a:pPr marL="82296" indent="0">
+              <a:buNone/>
+            </a:pPr>
+            <a:endParaRPr lang="en-US" altLang="ja-JP" sz="2000" dirty="0" smtClean="0">
+              <a:hlinkClick r:id="rId3"/>
+            </a:endParaRPr>
+          </a:p>
+          <a:p>
+            <a:pPr marL="82296" indent="0">
+              <a:buNone/>
+            </a:pPr>
+            <a:r>
+              <a:rPr lang="en-US" altLang="ja-JP" sz="2000" dirty="0" smtClean="0">
+                <a:hlinkClick r:id="rId3"/>
+              </a:rPr>
+              <a:t>http</a:t>
+            </a:r>
+            <a:r>
+              <a:rPr lang="en-US" altLang="ja-JP" sz="2000" dirty="0">
+                <a:hlinkClick r:id="rId3"/>
+              </a:rPr>
+              <a:t>://</a:t>
+            </a:r>
+            <a:r>
+              <a:rPr lang="en-US" altLang="ja-JP" sz="2000" dirty="0" smtClean="0">
+                <a:hlinkClick r:id="rId3"/>
+              </a:rPr>
+              <a:t>bach.istc.kobe-u.ac.jp/lect/ProLang/org/lisp-cell.html</a:t>
             </a:r>
             <a:endParaRPr lang="en-US" altLang="ja-JP" dirty="0"/>
           </a:p>
@@ -8505,59 +8522,14 @@
             <a:pPr marL="82296" indent="0">
               <a:buNone/>
             </a:pPr>
-            <a:r>
-              <a:rPr lang="en-US" altLang="ja-JP" dirty="0" smtClean="0"/>
-              <a:t>(</a:t>
-            </a:r>
-            <a:r>
-              <a:rPr lang="en-US" altLang="ja-JP" dirty="0"/>
-              <a:t>define (main </a:t>
-            </a:r>
-            <a:r>
-              <a:rPr lang="en-US" altLang="ja-JP" dirty="0" err="1"/>
-              <a:t>args</a:t>
-            </a:r>
-            <a:r>
-              <a:rPr lang="en-US" altLang="ja-JP" dirty="0"/>
-              <a:t>)</a:t>
-            </a:r>
-          </a:p>
-          <a:p>
-            <a:pPr marL="82296" indent="0">
-              <a:buNone/>
-            </a:pPr>
-            <a:r>
-              <a:rPr lang="ja-JP" altLang="en-US" dirty="0" smtClean="0"/>
-              <a:t>  </a:t>
-            </a:r>
-            <a:r>
-              <a:rPr lang="en-US" altLang="ja-JP" dirty="0" smtClean="0"/>
-              <a:t>(</a:t>
-            </a:r>
-            <a:r>
-              <a:rPr lang="en-US" altLang="ja-JP" dirty="0"/>
-              <a:t>print "Hello, world.")</a:t>
-            </a:r>
-          </a:p>
-          <a:p>
-            <a:pPr marL="82296" indent="0">
-              <a:buNone/>
-            </a:pPr>
-            <a:r>
-              <a:rPr lang="en-US" altLang="ja-JP" dirty="0" smtClean="0"/>
-              <a:t>  0</a:t>
-            </a:r>
-            <a:r>
-              <a:rPr lang="en-US" altLang="ja-JP" dirty="0"/>
-              <a:t>)</a:t>
-            </a:r>
+            <a:endParaRPr lang="en-US" altLang="ja-JP" b="1" dirty="0" smtClean="0"/>
           </a:p>
         </p:txBody>
       </p:sp>
     </p:spTree>
     <p:extLst>
       <p:ext uri="{BB962C8B-B14F-4D97-AF65-F5344CB8AC3E}">
-        <p14:creationId xmlns:p14="http://schemas.microsoft.com/office/powerpoint/2010/main" val="751171923"/>
+        <p14:creationId xmlns:p14="http://schemas.microsoft.com/office/powerpoint/2010/main" val="1176395678"/>
       </p:ext>
     </p:extLst>
   </p:cSld>
@@ -8606,6 +8578,18 @@
           <a:bodyPr/>
           <a:lstStyle/>
           <a:p>
+            <a:r>
+              <a:rPr kumimoji="1" lang="ja-JP" altLang="en-US" dirty="0" smtClean="0"/>
+              <a:t>重要な組み込み</a:t>
+            </a:r>
+            <a:r>
+              <a:rPr kumimoji="1" lang="ja-JP" altLang="en-US" dirty="0" smtClean="0"/>
+              <a:t>手続き</a:t>
+            </a:r>
+            <a:r>
+              <a:rPr lang="ja-JP" altLang="en-US" dirty="0"/>
+              <a:t>４</a:t>
+            </a:r>
             <a:endParaRPr kumimoji="1" lang="ja-JP" altLang="en-US" dirty="0"/>
           </a:p>
         </p:txBody>
@@ -8622,8 +8606,8 @@
         </p:nvSpPr>
         <p:spPr>
           <a:xfrm>
-            <a:off x="899592" y="1447800"/>
-            <a:ext cx="8136904" cy="4069432"/>
+            <a:off x="1043608" y="1124744"/>
+            <a:ext cx="8100392" cy="5544616"/>
           </a:xfrm>
         </p:spPr>
         <p:txBody>
@@ -8632,33 +8616,147 @@
           </a:bodyPr>
           <a:lstStyle/>
           <a:p>
-            <a:pPr marL="82296" indent="0" algn="ctr">
-              <a:buNone/>
-            </a:pPr>
-            <a:endParaRPr kumimoji="1" lang="en-US" altLang="ja-JP" sz="4400" dirty="0" smtClean="0"/>
-          </a:p>
-          <a:p>
-            <a:pPr marL="82296" indent="0" algn="ctr">
-              <a:buNone/>
-            </a:pPr>
-            <a:endParaRPr kumimoji="1" lang="en-US" altLang="ja-JP" sz="4400" dirty="0" smtClean="0"/>
-          </a:p>
-          <a:p>
-            <a:pPr marL="82296" indent="0" algn="ctr">
-              <a:buNone/>
-            </a:pPr>
-            <a:r>
-              <a:rPr kumimoji="1" lang="ja-JP" altLang="en-US" sz="4400" dirty="0" smtClean="0"/>
-              <a:t>前回のおさらい</a:t>
-            </a:r>
-            <a:endParaRPr kumimoji="1" lang="en-US" altLang="ja-JP" sz="4400" dirty="0" smtClean="0"/>
+            <a:pPr marL="82296" indent="0">
+              <a:buNone/>
+            </a:pPr>
+            <a:r>
+              <a:rPr lang="ja-JP" altLang="en-US" dirty="0" smtClean="0"/>
+              <a:t>・手続き </a:t>
+            </a:r>
+            <a:r>
+              <a:rPr lang="en-US" altLang="ja-JP" dirty="0" smtClean="0"/>
+              <a:t>fold</a:t>
+            </a:r>
+          </a:p>
+          <a:p>
+            <a:pPr marL="82296" indent="0">
+              <a:buNone/>
+            </a:pPr>
+            <a:r>
+              <a:rPr lang="ja-JP" altLang="en-US" dirty="0" smtClean="0"/>
+              <a:t>　</a:t>
+            </a:r>
+            <a:r>
+              <a:rPr lang="en-US" altLang="ja-JP" dirty="0" smtClean="0"/>
+              <a:t>(fold &lt;</a:t>
+            </a:r>
+            <a:r>
+              <a:rPr lang="ja-JP" altLang="en-US" dirty="0" smtClean="0"/>
+              <a:t>手続き</a:t>
+            </a:r>
+            <a:r>
+              <a:rPr lang="en-US" altLang="ja-JP" dirty="0" smtClean="0"/>
+              <a:t>&gt; &lt;</a:t>
+            </a:r>
+            <a:r>
+              <a:rPr lang="ja-JP" altLang="en-US" dirty="0" smtClean="0"/>
+              <a:t>初期値</a:t>
+            </a:r>
+            <a:r>
+              <a:rPr lang="en-US" altLang="ja-JP" dirty="0" smtClean="0"/>
+              <a:t>&gt; &lt;</a:t>
+            </a:r>
+            <a:r>
+              <a:rPr lang="ja-JP" altLang="en-US" dirty="0" smtClean="0"/>
+              <a:t>リスト</a:t>
+            </a:r>
+            <a:r>
+              <a:rPr lang="en-US" altLang="ja-JP" dirty="0" smtClean="0"/>
+              <a:t>&gt;)</a:t>
+            </a:r>
+          </a:p>
+          <a:p>
+            <a:pPr marL="82296" indent="0">
+              <a:buNone/>
+            </a:pPr>
+            <a:r>
+              <a:rPr lang="ja-JP" altLang="en-US" sz="2800" dirty="0" smtClean="0"/>
+              <a:t>①リストの第一要素と初期値を引数に</a:t>
+            </a:r>
+            <a:r>
+              <a:rPr lang="en-US" altLang="ja-JP" sz="2800" dirty="0" smtClean="0"/>
+              <a:t>&lt;</a:t>
+            </a:r>
+            <a:r>
+              <a:rPr lang="ja-JP" altLang="en-US" sz="2800" dirty="0" smtClean="0"/>
+              <a:t>手続き</a:t>
+            </a:r>
+            <a:r>
+              <a:rPr lang="en-US" altLang="ja-JP" sz="2800" dirty="0" smtClean="0"/>
+              <a:t>&gt;</a:t>
+            </a:r>
+            <a:r>
+              <a:rPr lang="ja-JP" altLang="en-US" sz="2800" dirty="0" smtClean="0"/>
+              <a:t>実施</a:t>
+            </a:r>
+            <a:endParaRPr lang="en-US" altLang="ja-JP" sz="2800" dirty="0" smtClean="0"/>
+          </a:p>
+          <a:p>
+            <a:pPr marL="82296" indent="0">
+              <a:buNone/>
+            </a:pPr>
+            <a:r>
+              <a:rPr lang="ja-JP" altLang="en-US" sz="2800" dirty="0" smtClean="0"/>
+              <a:t>②第二要素と①の結果を引数に</a:t>
+            </a:r>
+            <a:r>
+              <a:rPr lang="en-US" altLang="ja-JP" sz="2800" dirty="0" smtClean="0"/>
+              <a:t>&lt;</a:t>
+            </a:r>
+            <a:r>
+              <a:rPr lang="ja-JP" altLang="en-US" sz="2800" dirty="0" smtClean="0"/>
+              <a:t>手続き</a:t>
+            </a:r>
+            <a:r>
+              <a:rPr lang="en-US" altLang="ja-JP" sz="2800" dirty="0" smtClean="0"/>
+              <a:t>&gt;</a:t>
+            </a:r>
+            <a:r>
+              <a:rPr lang="ja-JP" altLang="en-US" sz="2800" dirty="0" smtClean="0"/>
+              <a:t>実施</a:t>
+            </a:r>
+            <a:endParaRPr lang="en-US" altLang="ja-JP" sz="2800" dirty="0" smtClean="0"/>
+          </a:p>
+          <a:p>
+            <a:pPr marL="82296" indent="0">
+              <a:buNone/>
+            </a:pPr>
+            <a:r>
+              <a:rPr lang="ja-JP" altLang="en-US" sz="2800" dirty="0" smtClean="0"/>
+              <a:t>③以下、リストが終わるまで繰り返し</a:t>
+            </a:r>
+            <a:endParaRPr lang="en-US" altLang="ja-JP" sz="2800" dirty="0" smtClean="0"/>
+          </a:p>
+          <a:p>
+            <a:pPr marL="82296" indent="0">
+              <a:buNone/>
+            </a:pPr>
+            <a:endParaRPr lang="en-US" altLang="ja-JP" sz="2800" dirty="0"/>
+          </a:p>
+          <a:p>
+            <a:pPr marL="82296" indent="0">
+              <a:buNone/>
+            </a:pPr>
+            <a:r>
+              <a:rPr lang="en-US" altLang="ja-JP" dirty="0" smtClean="0"/>
+              <a:t>(fold * 1 ‘(1 2 3 4 5))</a:t>
+            </a:r>
+          </a:p>
+          <a:p>
+            <a:pPr marL="82296" indent="0">
+              <a:buNone/>
+            </a:pPr>
+            <a:r>
+              <a:rPr lang="en-US" altLang="ja-JP" dirty="0" smtClean="0"/>
+              <a:t>=&gt; 120</a:t>
+            </a:r>
           </a:p>
         </p:txBody>
       </p:sp>
     </p:spTree>
     <p:extLst>
       <p:ext uri="{BB962C8B-B14F-4D97-AF65-F5344CB8AC3E}">
-        <p14:creationId xmlns:p14="http://schemas.microsoft.com/office/powerpoint/2010/main" val="125130579"/>
+        <p14:creationId xmlns:p14="http://schemas.microsoft.com/office/powerpoint/2010/main" val="1964440084"/>
       </p:ext>
     </p:extLst>
   </p:cSld>
@@ -8709,7 +8807,7 @@
           <a:p>
             <a:r>
               <a:rPr kumimoji="1" lang="ja-JP" altLang="en-US" dirty="0" smtClean="0"/>
-              <a:t>余談</a:t>
+              <a:t>ハローワールド</a:t>
             </a:r>
             <a:endParaRPr kumimoji="1" lang="ja-JP" altLang="en-US" dirty="0"/>
           </a:p>
@@ -8717,7 +8815,7 @@
       </p:sp>
       <p:sp>
         <p:nvSpPr>
-          <p:cNvPr id="6" name="コンテンツ プレースホルダー 2"/>
+          <p:cNvPr id="3" name="コンテンツ プレースホルダー 2"/>
           <p:cNvSpPr>
             <a:spLocks noGrp="1"/>
           </p:cNvSpPr>
@@ -8727,8 +8825,8 @@
         </p:nvSpPr>
         <p:spPr>
           <a:xfrm>
-            <a:off x="1043608" y="1447800"/>
-            <a:ext cx="7890080" cy="5077544"/>
+            <a:off x="1115616" y="1124744"/>
+            <a:ext cx="7818072" cy="5544616"/>
           </a:xfrm>
         </p:spPr>
         <p:txBody>
@@ -8737,32 +8835,116 @@
           </a:bodyPr>
           <a:lstStyle/>
           <a:p>
-            <a:r>
-              <a:rPr kumimoji="1" lang="ja-JP" altLang="en-US" dirty="0" smtClean="0"/>
-              <a:t>ニコニコ大百科の</a:t>
-            </a:r>
-            <a:r>
-              <a:rPr kumimoji="1" lang="en-US" altLang="ja-JP" dirty="0" smtClean="0"/>
-              <a:t>Lisp</a:t>
-            </a:r>
-            <a:r>
-              <a:rPr kumimoji="1" lang="ja-JP" altLang="en-US" dirty="0" smtClean="0"/>
-              <a:t>の記事が異様に詳しい</a:t>
-            </a:r>
+            <a:pPr marL="82296" indent="0">
+              <a:buNone/>
+            </a:pPr>
+            <a:r>
+              <a:rPr lang="ja-JP" altLang="en-US" dirty="0" smtClean="0"/>
+              <a:t>・対話型の場合</a:t>
+            </a:r>
+            <a:endParaRPr lang="en-US" altLang="ja-JP" dirty="0" smtClean="0"/>
+          </a:p>
+          <a:p>
+            <a:pPr marL="82296" indent="0">
+              <a:buNone/>
+            </a:pPr>
+            <a:r>
+              <a:rPr lang="en-US" altLang="ja-JP" dirty="0" smtClean="0"/>
+              <a:t>(print “Hello, world.”)</a:t>
+            </a:r>
+          </a:p>
+          <a:p>
+            <a:pPr marL="82296" indent="0">
+              <a:buNone/>
+            </a:pPr>
             <a:endParaRPr lang="en-US" altLang="ja-JP" dirty="0"/>
+          </a:p>
+          <a:p>
+            <a:pPr marL="82296" indent="0">
+              <a:buNone/>
+            </a:pPr>
+            <a:endParaRPr lang="en-US" altLang="ja-JP" dirty="0" smtClean="0"/>
+          </a:p>
+          <a:p>
+            <a:pPr marL="82296" indent="0">
+              <a:buNone/>
+            </a:pPr>
+            <a:r>
+              <a:rPr lang="ja-JP" altLang="en-US" smtClean="0"/>
+              <a:t>・ファイル呼び出しの場合</a:t>
+            </a:r>
+            <a:endParaRPr lang="en-US" altLang="ja-JP" dirty="0"/>
+          </a:p>
+          <a:p>
+            <a:pPr marL="82296" indent="0">
+              <a:buNone/>
+            </a:pPr>
+            <a:r>
+              <a:rPr lang="en-US" altLang="ja-JP" dirty="0" smtClean="0"/>
+              <a:t>(</a:t>
+            </a:r>
+            <a:r>
+              <a:rPr lang="en-US" altLang="ja-JP" dirty="0"/>
+              <a:t>define (main </a:t>
+            </a:r>
+            <a:r>
+              <a:rPr lang="en-US" altLang="ja-JP" dirty="0" err="1"/>
+              <a:t>args</a:t>
+            </a:r>
+            <a:r>
+              <a:rPr lang="en-US" altLang="ja-JP" dirty="0"/>
+              <a:t>)</a:t>
+            </a:r>
+          </a:p>
+          <a:p>
+            <a:pPr marL="82296" indent="0">
+              <a:buNone/>
+            </a:pPr>
+            <a:r>
+              <a:rPr lang="ja-JP" altLang="en-US" dirty="0" smtClean="0"/>
+              <a:t>  </a:t>
+            </a:r>
+            <a:r>
+              <a:rPr lang="en-US" altLang="ja-JP" dirty="0" smtClean="0"/>
+              <a:t>(</a:t>
+            </a:r>
+            <a:r>
+              <a:rPr lang="en-US" altLang="ja-JP" dirty="0"/>
+              <a:t>print "Hello, world.")</a:t>
+            </a:r>
+          </a:p>
+          <a:p>
+            <a:pPr marL="82296" indent="0">
+              <a:buNone/>
+            </a:pPr>
+            <a:r>
+              <a:rPr lang="en-US" altLang="ja-JP" dirty="0" smtClean="0"/>
+              <a:t>  0</a:t>
+            </a:r>
+            <a:r>
+              <a:rPr lang="en-US" altLang="ja-JP" dirty="0"/>
+              <a:t>)</a:t>
+            </a:r>
           </a:p>
         </p:txBody>
       </p:sp>
     </p:spTree>
     <p:extLst>
       <p:ext uri="{BB962C8B-B14F-4D97-AF65-F5344CB8AC3E}">
-        <p14:creationId xmlns:p14="http://schemas.microsoft.com/office/powerpoint/2010/main" val="3823870900"/>
+        <p14:creationId xmlns:p14="http://schemas.microsoft.com/office/powerpoint/2010/main" val="751171923"/>
       </p:ext>
     </p:extLst>
   </p:cSld>
   <p:clrMapOvr>
     <a:masterClrMapping/>
   </p:clrMapOvr>
+  <p:timing>
+    <p:tnLst>
+      <p:par>
+        <p:cTn id="1" dur="indefinite" restart="never" nodeType="tmRoot"/>
+      </p:par>
+    </p:tnLst>
+  </p:timing>
 </p:sld>
 </file>
 
@@ -8785,6 +8967,25 @@
       </p:grpSpPr>
       <p:sp>
         <p:nvSpPr>
+          <p:cNvPr id="2" name="タイトル 1"/>
+          <p:cNvSpPr>
+            <a:spLocks noGrp="1"/>
+          </p:cNvSpPr>
+          <p:nvPr>
+            <p:ph type="title"/>
+          </p:nvPr>
+        </p:nvSpPr>
+        <p:spPr/>
+        <p:txBody>
+          <a:bodyPr/>
+          <a:lstStyle/>
+          <a:p>
+            <a:endParaRPr kumimoji="1" lang="ja-JP" altLang="en-US" dirty="0"/>
+          </a:p>
+        </p:txBody>
+      </p:sp>
+      <p:sp>
+        <p:nvSpPr>
           <p:cNvPr id="3" name="コンテンツ プレースホルダー 2"/>
           <p:cNvSpPr>
             <a:spLocks noGrp="1"/>
@@ -8795,54 +8996,231 @@
         </p:nvSpPr>
         <p:spPr>
           <a:xfrm>
-            <a:off x="1435608" y="3068960"/>
-            <a:ext cx="7498080" cy="3179440"/>
+            <a:off x="899592" y="1447800"/>
+            <a:ext cx="8136904" cy="4069432"/>
           </a:xfrm>
         </p:spPr>
         <p:txBody>
-          <a:bodyPr/>
+          <a:bodyPr>
+            <a:normAutofit/>
+          </a:bodyPr>
           <a:lstStyle/>
           <a:p>
-            <a:pPr marL="82296" indent="0">
-              <a:buNone/>
-            </a:pPr>
-            <a:r>
-              <a:rPr kumimoji="1" lang="ja-JP" altLang="en-US" dirty="0" smtClean="0"/>
-              <a:t>ご清聴ありがとうございました</a:t>
-            </a:r>
-            <a:endParaRPr kumimoji="1" lang="ja-JP" altLang="en-US" dirty="0"/>
-          </a:p>
-        </p:txBody>
-      </p:sp>
-      <p:sp>
-        <p:nvSpPr>
-          <p:cNvPr id="4" name="タイトル 3"/>
-          <p:cNvSpPr>
-            <a:spLocks noGrp="1"/>
-          </p:cNvSpPr>
-          <p:nvPr>
-            <p:ph type="title"/>
-          </p:nvPr>
-        </p:nvSpPr>
-        <p:spPr/>
-        <p:txBody>
-          <a:bodyPr/>
-          <a:lstStyle/>
-          <a:p>
-            <a:endParaRPr kumimoji="1" lang="ja-JP" altLang="en-US"/>
+            <a:pPr marL="82296" indent="0" algn="ctr">
+              <a:buNone/>
+            </a:pPr>
+            <a:endParaRPr kumimoji="1" lang="en-US" altLang="ja-JP" sz="4400" dirty="0" smtClean="0"/>
+          </a:p>
+          <a:p>
+            <a:pPr marL="82296" indent="0" algn="ctr">
+              <a:buNone/>
+            </a:pPr>
+            <a:endParaRPr kumimoji="1" lang="en-US" altLang="ja-JP" sz="4400" dirty="0" smtClean="0"/>
+          </a:p>
+          <a:p>
+            <a:pPr marL="82296" indent="0" algn="ctr">
+              <a:buNone/>
+            </a:pPr>
+            <a:r>
+              <a:rPr kumimoji="1" lang="ja-JP" altLang="en-US" sz="4400" dirty="0" smtClean="0"/>
+              <a:t>⑤再帰処理</a:t>
+            </a:r>
+            <a:endParaRPr kumimoji="1" lang="en-US" altLang="ja-JP" sz="4400" dirty="0" smtClean="0"/>
           </a:p>
         </p:txBody>
       </p:sp>
     </p:spTree>
     <p:extLst>
       <p:ext uri="{BB962C8B-B14F-4D97-AF65-F5344CB8AC3E}">
-        <p14:creationId xmlns:p14="http://schemas.microsoft.com/office/powerpoint/2010/main" val="2805364914"/>
+        <p14:creationId xmlns:p14="http://schemas.microsoft.com/office/powerpoint/2010/main" val="125130579"/>
       </p:ext>
     </p:extLst>
   </p:cSld>
   <p:clrMapOvr>
     <a:masterClrMapping/>
   </p:clrMapOvr>
+  <p:timing>
+    <p:tnLst>
+      <p:par>
+        <p:cTn id="1" dur="indefinite" restart="never" nodeType="tmRoot"/>
+      </p:par>
+    </p:tnLst>
+  </p:timing>
+</p:sld>
+</file>
+
+<file path=ppt/slides/slide29.xml><?xml version="1.0" encoding="utf-8"?>
+<p:sld xmlns:a="http://schemas.openxmlformats.org/drawingml/2006/main" xmlns:r="http://schemas.openxmlformats.org/officeDocument/2006/relationships" xmlns:p="http://schemas.openxmlformats.org/presentationml/2006/main">
+  <p:cSld>
+    <p:spTree>
+      <p:nvGrpSpPr>
+        <p:cNvPr id="1" name=""/>
+        <p:cNvGrpSpPr/>
+        <p:nvPr/>
+      </p:nvGrpSpPr>
+      <p:grpSpPr>
+        <a:xfrm>
+          <a:off x="0" y="0"/>
+          <a:ext cx="0" cy="0"/>
+          <a:chOff x="0" y="0"/>
+          <a:chExt cx="0" cy="0"/>
+        </a:xfrm>
+      </p:grpSpPr>
+      <p:sp>
+        <p:nvSpPr>
+          <p:cNvPr id="2" name="タイトル 1"/>
+          <p:cNvSpPr>
+            <a:spLocks noGrp="1"/>
+          </p:cNvSpPr>
+          <p:nvPr>
+            <p:ph type="title"/>
+          </p:nvPr>
+        </p:nvSpPr>
+        <p:spPr/>
+        <p:txBody>
+          <a:bodyPr/>
+          <a:lstStyle/>
+          <a:p>
+            <a:r>
+              <a:rPr kumimoji="1" lang="ja-JP" altLang="en-US" dirty="0" smtClean="0"/>
+              <a:t>ハローワールド</a:t>
+            </a:r>
+            <a:endParaRPr kumimoji="1" lang="ja-JP" altLang="en-US" dirty="0"/>
+          </a:p>
+        </p:txBody>
+      </p:sp>
+      <p:sp>
+        <p:nvSpPr>
+          <p:cNvPr id="3" name="コンテンツ プレースホルダー 2"/>
+          <p:cNvSpPr>
+            <a:spLocks noGrp="1"/>
+          </p:cNvSpPr>
+          <p:nvPr>
+            <p:ph idx="1"/>
+          </p:nvPr>
+        </p:nvSpPr>
+        <p:spPr>
+          <a:xfrm>
+            <a:off x="1115616" y="1124744"/>
+            <a:ext cx="7818072" cy="5544616"/>
+          </a:xfrm>
+        </p:spPr>
+        <p:txBody>
+          <a:bodyPr>
+            <a:normAutofit/>
+          </a:bodyPr>
+          <a:lstStyle/>
+          <a:p>
+            <a:pPr marL="82296" indent="0">
+              <a:buNone/>
+            </a:pPr>
+            <a:r>
+              <a:rPr lang="ja-JP" altLang="en-US" dirty="0" smtClean="0"/>
+              <a:t>・対話型の場合</a:t>
+            </a:r>
+            <a:endParaRPr lang="en-US" altLang="ja-JP" dirty="0" smtClean="0"/>
+          </a:p>
+          <a:p>
+            <a:pPr marL="82296" indent="0">
+              <a:buNone/>
+            </a:pPr>
+            <a:r>
+              <a:rPr lang="en-US" altLang="ja-JP" dirty="0" smtClean="0"/>
+              <a:t>(print “Hello, world.”)</a:t>
+            </a:r>
+          </a:p>
+          <a:p>
+            <a:pPr marL="82296" indent="0">
+              <a:buNone/>
+            </a:pPr>
+            <a:endParaRPr lang="en-US" altLang="ja-JP" dirty="0"/>
+          </a:p>
+          <a:p>
+            <a:pPr marL="82296" indent="0">
+              <a:buNone/>
+            </a:pPr>
+            <a:endParaRPr lang="en-US" altLang="ja-JP" dirty="0" smtClean="0"/>
+          </a:p>
+          <a:p>
+            <a:pPr marL="82296" indent="0">
+              <a:buNone/>
+            </a:pPr>
+            <a:r>
+              <a:rPr lang="ja-JP" altLang="en-US" smtClean="0"/>
+              <a:t>・ファイル呼び出しの場合</a:t>
+            </a:r>
+            <a:endParaRPr lang="en-US" altLang="ja-JP" dirty="0"/>
+          </a:p>
+          <a:p>
+            <a:pPr marL="82296" indent="0">
+              <a:buNone/>
+            </a:pPr>
+            <a:r>
+              <a:rPr lang="en-US" altLang="ja-JP" dirty="0" smtClean="0"/>
+              <a:t>(</a:t>
+            </a:r>
+            <a:r>
+              <a:rPr lang="en-US" altLang="ja-JP" dirty="0"/>
+              <a:t>define (main </a:t>
+            </a:r>
+            <a:r>
+              <a:rPr lang="en-US" altLang="ja-JP" dirty="0" err="1"/>
+              <a:t>args</a:t>
+            </a:r>
+            <a:r>
+              <a:rPr lang="en-US" altLang="ja-JP" dirty="0"/>
+              <a:t>)</a:t>
+            </a:r>
+          </a:p>
+          <a:p>
+            <a:pPr marL="82296" indent="0">
+              <a:buNone/>
+            </a:pPr>
+            <a:r>
+              <a:rPr lang="ja-JP" altLang="en-US" dirty="0" smtClean="0"/>
+              <a:t>  </a:t>
+            </a:r>
+            <a:r>
+              <a:rPr lang="en-US" altLang="ja-JP" dirty="0" smtClean="0"/>
+              <a:t>(</a:t>
+            </a:r>
+            <a:r>
+              <a:rPr lang="en-US" altLang="ja-JP" dirty="0"/>
+              <a:t>print "Hello, world.")</a:t>
+            </a:r>
+          </a:p>
+          <a:p>
+            <a:pPr marL="82296" indent="0">
+              <a:buNone/>
+            </a:pPr>
+            <a:r>
+              <a:rPr lang="en-US" altLang="ja-JP" dirty="0" smtClean="0"/>
+              <a:t>  0</a:t>
+            </a:r>
+            <a:r>
+              <a:rPr lang="en-US" altLang="ja-JP" dirty="0"/>
+              <a:t>)</a:t>
+            </a:r>
+          </a:p>
+        </p:txBody>
+      </p:sp>
+    </p:spTree>
+    <p:extLst>
+      <p:ext uri="{BB962C8B-B14F-4D97-AF65-F5344CB8AC3E}">
+        <p14:creationId xmlns:p14="http://schemas.microsoft.com/office/powerpoint/2010/main" val="2647976719"/>
+      </p:ext>
+    </p:extLst>
+  </p:cSld>
+  <p:clrMapOvr>
+    <a:masterClrMapping/>
+  </p:clrMapOvr>
+  <p:timing>
+    <p:tnLst>
+      <p:par>
+        <p:cTn id="1" dur="indefinite" restart="never" nodeType="tmRoot"/>
+      </p:par>
+    </p:tnLst>
+  </p:timing>
 </p:sld>
 </file>
 
@@ -8921,11 +9299,7 @@
             </a:pPr>
             <a:r>
               <a:rPr kumimoji="1" lang="ja-JP" altLang="en-US" sz="4400" dirty="0" smtClean="0"/>
-              <a:t>①前回</a:t>
-            </a:r>
-            <a:r>
-              <a:rPr kumimoji="1" lang="ja-JP" altLang="en-US" sz="4400" dirty="0" smtClean="0"/>
-              <a:t>のおさらい</a:t>
+              <a:t>①前回のおさらい</a:t>
             </a:r>
             <a:endParaRPr kumimoji="1" lang="en-US" altLang="ja-JP" sz="4400" dirty="0" smtClean="0"/>
           </a:p>
@@ -8948,6 +9322,278 @@
       </p:par>
     </p:tnLst>
   </p:timing>
+</p:sld>
+</file>
+
+<file path=ppt/slides/slide30.xml><?xml version="1.0" encoding="utf-8"?>
+<p:sld xmlns:a="http://schemas.openxmlformats.org/drawingml/2006/main" xmlns:r="http://schemas.openxmlformats.org/officeDocument/2006/relationships" xmlns:p="http://schemas.openxmlformats.org/presentationml/2006/main">
+  <p:cSld>
+    <p:spTree>
+      <p:nvGrpSpPr>
+        <p:cNvPr id="1" name=""/>
+        <p:cNvGrpSpPr/>
+        <p:nvPr/>
+      </p:nvGrpSpPr>
+      <p:grpSpPr>
+        <a:xfrm>
+          <a:off x="0" y="0"/>
+          <a:ext cx="0" cy="0"/>
+          <a:chOff x="0" y="0"/>
+          <a:chExt cx="0" cy="0"/>
+        </a:xfrm>
+      </p:grpSpPr>
+      <p:sp>
+        <p:nvSpPr>
+          <p:cNvPr id="2" name="タイトル 1"/>
+          <p:cNvSpPr>
+            <a:spLocks noGrp="1"/>
+          </p:cNvSpPr>
+          <p:nvPr>
+            <p:ph type="title"/>
+          </p:nvPr>
+        </p:nvSpPr>
+        <p:spPr/>
+        <p:txBody>
+          <a:bodyPr/>
+          <a:lstStyle/>
+          <a:p>
+            <a:endParaRPr kumimoji="1" lang="ja-JP" altLang="en-US" dirty="0"/>
+          </a:p>
+        </p:txBody>
+      </p:sp>
+      <p:sp>
+        <p:nvSpPr>
+          <p:cNvPr id="3" name="コンテンツ プレースホルダー 2"/>
+          <p:cNvSpPr>
+            <a:spLocks noGrp="1"/>
+          </p:cNvSpPr>
+          <p:nvPr>
+            <p:ph idx="1"/>
+          </p:nvPr>
+        </p:nvSpPr>
+        <p:spPr>
+          <a:xfrm>
+            <a:off x="899592" y="1447800"/>
+            <a:ext cx="8136904" cy="4069432"/>
+          </a:xfrm>
+        </p:spPr>
+        <p:txBody>
+          <a:bodyPr>
+            <a:normAutofit/>
+          </a:bodyPr>
+          <a:lstStyle/>
+          <a:p>
+            <a:pPr marL="82296" indent="0" algn="ctr">
+              <a:buNone/>
+            </a:pPr>
+            <a:endParaRPr kumimoji="1" lang="en-US" altLang="ja-JP" sz="4400" dirty="0" smtClean="0"/>
+          </a:p>
+          <a:p>
+            <a:pPr marL="82296" indent="0" algn="ctr">
+              <a:buNone/>
+            </a:pPr>
+            <a:endParaRPr kumimoji="1" lang="en-US" altLang="ja-JP" sz="4400" dirty="0" smtClean="0"/>
+          </a:p>
+          <a:p>
+            <a:pPr marL="82296" indent="0" algn="ctr">
+              <a:buNone/>
+            </a:pPr>
+            <a:r>
+              <a:rPr kumimoji="1" lang="ja-JP" altLang="en-US" sz="4400" dirty="0" smtClean="0"/>
+              <a:t>前回のおさらい</a:t>
+            </a:r>
+            <a:endParaRPr kumimoji="1" lang="en-US" altLang="ja-JP" sz="4400" dirty="0" smtClean="0"/>
+          </a:p>
+        </p:txBody>
+      </p:sp>
+    </p:spTree>
+    <p:extLst>
+      <p:ext uri="{BB962C8B-B14F-4D97-AF65-F5344CB8AC3E}">
+        <p14:creationId xmlns:p14="http://schemas.microsoft.com/office/powerpoint/2010/main" val="1923805304"/>
+      </p:ext>
+    </p:extLst>
+  </p:cSld>
+  <p:clrMapOvr>
+    <a:masterClrMapping/>
+  </p:clrMapOvr>
+  <p:timing>
+    <p:tnLst>
+      <p:par>
+        <p:cTn id="1" dur="indefinite" restart="never" nodeType="tmRoot"/>
+      </p:par>
+    </p:tnLst>
+  </p:timing>
+</p:sld>
+</file>
+
+<file path=ppt/slides/slide31.xml><?xml version="1.0" encoding="utf-8"?>
+<p:sld xmlns:a="http://schemas.openxmlformats.org/drawingml/2006/main" xmlns:r="http://schemas.openxmlformats.org/officeDocument/2006/relationships" xmlns:p="http://schemas.openxmlformats.org/presentationml/2006/main">
+  <p:cSld>
+    <p:spTree>
+      <p:nvGrpSpPr>
+        <p:cNvPr id="1" name=""/>
+        <p:cNvGrpSpPr/>
+        <p:nvPr/>
+      </p:nvGrpSpPr>
+      <p:grpSpPr>
+        <a:xfrm>
+          <a:off x="0" y="0"/>
+          <a:ext cx="0" cy="0"/>
+          <a:chOff x="0" y="0"/>
+          <a:chExt cx="0" cy="0"/>
+        </a:xfrm>
+      </p:grpSpPr>
+      <p:sp>
+        <p:nvSpPr>
+          <p:cNvPr id="2" name="タイトル 1"/>
+          <p:cNvSpPr>
+            <a:spLocks noGrp="1"/>
+          </p:cNvSpPr>
+          <p:nvPr>
+            <p:ph type="title"/>
+          </p:nvPr>
+        </p:nvSpPr>
+        <p:spPr/>
+        <p:txBody>
+          <a:bodyPr/>
+          <a:lstStyle/>
+          <a:p>
+            <a:r>
+              <a:rPr kumimoji="1" lang="ja-JP" altLang="en-US" dirty="0" smtClean="0"/>
+              <a:t>余談</a:t>
+            </a:r>
+            <a:endParaRPr kumimoji="1" lang="ja-JP" altLang="en-US" dirty="0"/>
+          </a:p>
+        </p:txBody>
+      </p:sp>
+      <p:sp>
+        <p:nvSpPr>
+          <p:cNvPr id="6" name="コンテンツ プレースホルダー 2"/>
+          <p:cNvSpPr>
+            <a:spLocks noGrp="1"/>
+          </p:cNvSpPr>
+          <p:nvPr>
+            <p:ph idx="1"/>
+          </p:nvPr>
+        </p:nvSpPr>
+        <p:spPr>
+          <a:xfrm>
+            <a:off x="1043608" y="1447800"/>
+            <a:ext cx="7890080" cy="5077544"/>
+          </a:xfrm>
+        </p:spPr>
+        <p:txBody>
+          <a:bodyPr>
+            <a:normAutofit/>
+          </a:bodyPr>
+          <a:lstStyle/>
+          <a:p>
+            <a:r>
+              <a:rPr kumimoji="1" lang="ja-JP" altLang="en-US" dirty="0" smtClean="0"/>
+              <a:t>ニコニコ大百科の</a:t>
+            </a:r>
+            <a:r>
+              <a:rPr kumimoji="1" lang="en-US" altLang="ja-JP" dirty="0" smtClean="0"/>
+              <a:t>Lisp</a:t>
+            </a:r>
+            <a:r>
+              <a:rPr kumimoji="1" lang="ja-JP" altLang="en-US" dirty="0" smtClean="0"/>
+              <a:t>の記事が異様に詳しい</a:t>
+            </a:r>
+            <a:endParaRPr lang="en-US" altLang="ja-JP" dirty="0"/>
+          </a:p>
+        </p:txBody>
+      </p:sp>
+    </p:spTree>
+    <p:extLst>
+      <p:ext uri="{BB962C8B-B14F-4D97-AF65-F5344CB8AC3E}">
+        <p14:creationId xmlns:p14="http://schemas.microsoft.com/office/powerpoint/2010/main" val="3823870900"/>
+      </p:ext>
+    </p:extLst>
+  </p:cSld>
+  <p:clrMapOvr>
+    <a:masterClrMapping/>
+  </p:clrMapOvr>
+</p:sld>
+</file>
+
+<file path=ppt/slides/slide32.xml><?xml version="1.0" encoding="utf-8"?>
+<p:sld xmlns:a="http://schemas.openxmlformats.org/drawingml/2006/main" xmlns:r="http://schemas.openxmlformats.org/officeDocument/2006/relationships" xmlns:p="http://schemas.openxmlformats.org/presentationml/2006/main">
+  <p:cSld>
+    <p:spTree>
+      <p:nvGrpSpPr>
+        <p:cNvPr id="1" name=""/>
+        <p:cNvGrpSpPr/>
+        <p:nvPr/>
+      </p:nvGrpSpPr>
+      <p:grpSpPr>
+        <a:xfrm>
+          <a:off x="0" y="0"/>
+          <a:ext cx="0" cy="0"/>
+          <a:chOff x="0" y="0"/>
+          <a:chExt cx="0" cy="0"/>
+        </a:xfrm>
+      </p:grpSpPr>
+      <p:sp>
+        <p:nvSpPr>
+          <p:cNvPr id="3" name="コンテンツ プレースホルダー 2"/>
+          <p:cNvSpPr>
+            <a:spLocks noGrp="1"/>
+          </p:cNvSpPr>
+          <p:nvPr>
+            <p:ph idx="1"/>
+          </p:nvPr>
+        </p:nvSpPr>
+        <p:spPr>
+          <a:xfrm>
+            <a:off x="1435608" y="3068960"/>
+            <a:ext cx="7498080" cy="3179440"/>
+          </a:xfrm>
+        </p:spPr>
+        <p:txBody>
+          <a:bodyPr/>
+          <a:lstStyle/>
+          <a:p>
+            <a:pPr marL="82296" indent="0">
+              <a:buNone/>
+            </a:pPr>
+            <a:r>
+              <a:rPr kumimoji="1" lang="ja-JP" altLang="en-US" dirty="0" smtClean="0"/>
+              <a:t>ご清聴ありがとうございました</a:t>
+            </a:r>
+            <a:endParaRPr kumimoji="1" lang="ja-JP" altLang="en-US" dirty="0"/>
+          </a:p>
+        </p:txBody>
+      </p:sp>
+      <p:sp>
+        <p:nvSpPr>
+          <p:cNvPr id="4" name="タイトル 3"/>
+          <p:cNvSpPr>
+            <a:spLocks noGrp="1"/>
+          </p:cNvSpPr>
+          <p:nvPr>
+            <p:ph type="title"/>
+          </p:nvPr>
+        </p:nvSpPr>
+        <p:spPr/>
+        <p:txBody>
+          <a:bodyPr/>
+          <a:lstStyle/>
+          <a:p>
+            <a:endParaRPr kumimoji="1" lang="ja-JP" altLang="en-US"/>
+          </a:p>
+        </p:txBody>
+      </p:sp>
+    </p:spTree>
+    <p:extLst>
+      <p:ext uri="{BB962C8B-B14F-4D97-AF65-F5344CB8AC3E}">
+        <p14:creationId xmlns:p14="http://schemas.microsoft.com/office/powerpoint/2010/main" val="2805364914"/>
+      </p:ext>
+    </p:extLst>
+  </p:cSld>
+  <p:clrMapOvr>
+    <a:masterClrMapping/>
+  </p:clrMapOvr>
 </p:sld>
 </file>
 
@@ -9559,11 +10205,7 @@
             </a:pPr>
             <a:r>
               <a:rPr kumimoji="1" lang="ja-JP" altLang="en-US" sz="4400" dirty="0" smtClean="0"/>
-              <a:t>②もう</a:t>
-            </a:r>
-            <a:r>
-              <a:rPr kumimoji="1" lang="ja-JP" altLang="en-US" sz="4400" dirty="0" smtClean="0"/>
-              <a:t>ちょっと調べてみた</a:t>
+              <a:t>もうちょっと調べてみた</a:t>
             </a:r>
             <a:endParaRPr kumimoji="1" lang="en-US" altLang="ja-JP" sz="4400" dirty="0" smtClean="0"/>
           </a:p>
@@ -9621,10 +10263,6 @@
           <a:bodyPr/>
           <a:lstStyle/>
           <a:p>
-            <a:r>
-              <a:rPr kumimoji="1" lang="en-US" altLang="ja-JP" dirty="0" smtClean="0"/>
-              <a:t>Lisp</a:t>
-            </a:r>
             <a:endParaRPr kumimoji="1" lang="ja-JP" altLang="en-US" dirty="0"/>
           </a:p>
         </p:txBody>
@@ -9641,8 +10279,8 @@
         </p:nvSpPr>
         <p:spPr>
           <a:xfrm>
-            <a:off x="1115616" y="1124744"/>
-            <a:ext cx="7818072" cy="5544616"/>
+            <a:off x="899592" y="1447800"/>
+            <a:ext cx="8136904" cy="4069432"/>
           </a:xfrm>
         </p:spPr>
         <p:txBody>
@@ -9651,145 +10289,45 @@
           </a:bodyPr>
           <a:lstStyle/>
           <a:p>
-            <a:pPr marL="82296" indent="0">
-              <a:buNone/>
-            </a:pPr>
-            <a:r>
-              <a:rPr lang="ja-JP" altLang="en-US" dirty="0" smtClean="0"/>
-              <a:t>・</a:t>
-            </a:r>
-            <a:r>
-              <a:rPr lang="en-US" altLang="ja-JP" b="1" dirty="0" err="1" smtClean="0"/>
-              <a:t>LIS</a:t>
-            </a:r>
-            <a:r>
-              <a:rPr lang="en-US" altLang="ja-JP" dirty="0" err="1" smtClean="0"/>
-              <a:t>t</a:t>
-            </a:r>
-            <a:r>
-              <a:rPr lang="en-US" altLang="ja-JP" dirty="0" smtClean="0"/>
-              <a:t> </a:t>
-            </a:r>
-            <a:r>
-              <a:rPr lang="en-US" altLang="ja-JP" b="1" dirty="0" smtClean="0"/>
-              <a:t>P</a:t>
-            </a:r>
-            <a:r>
-              <a:rPr lang="en-US" altLang="ja-JP" dirty="0" smtClean="0"/>
-              <a:t>rocessing</a:t>
-            </a:r>
-          </a:p>
-          <a:p>
-            <a:pPr marL="82296" indent="0">
-              <a:buNone/>
-            </a:pPr>
-            <a:r>
-              <a:rPr lang="en-US" altLang="ja-JP" sz="2000" strike="sngStrike" dirty="0"/>
-              <a:t>Lots of Insane Stupid </a:t>
-            </a:r>
-            <a:r>
-              <a:rPr lang="en-US" altLang="ja-JP" sz="2000" strike="sngStrike" dirty="0" smtClean="0"/>
-              <a:t>Parenthesis(</a:t>
-            </a:r>
-            <a:r>
-              <a:rPr lang="ja-JP" altLang="en-US" sz="2000" strike="sngStrike" dirty="0" smtClean="0"/>
-              <a:t>アホみたいな括弧の山</a:t>
-            </a:r>
-            <a:r>
-              <a:rPr lang="en-US" altLang="ja-JP" sz="2000" strike="sngStrike" dirty="0" smtClean="0"/>
-              <a:t>)</a:t>
-            </a:r>
-          </a:p>
-          <a:p>
-            <a:pPr marL="82296" indent="0">
-              <a:buNone/>
-            </a:pPr>
-            <a:endParaRPr lang="en-US" altLang="ja-JP" dirty="0"/>
-          </a:p>
-          <a:p>
-            <a:pPr marL="82296" indent="0">
-              <a:buNone/>
-            </a:pPr>
-            <a:r>
-              <a:rPr lang="ja-JP" altLang="en-US" dirty="0" smtClean="0"/>
-              <a:t>・現在使われる高級言語では</a:t>
-            </a:r>
-            <a:endParaRPr lang="en-US" altLang="ja-JP" dirty="0" smtClean="0"/>
-          </a:p>
-          <a:p>
-            <a:pPr marL="82296" indent="0">
-              <a:buNone/>
-            </a:pPr>
-            <a:r>
-              <a:rPr lang="ja-JP" altLang="en-US" dirty="0"/>
-              <a:t>　</a:t>
-            </a:r>
-            <a:r>
-              <a:rPr lang="en-US" altLang="ja-JP" dirty="0" smtClean="0"/>
-              <a:t>Fortran</a:t>
-            </a:r>
-            <a:r>
-              <a:rPr lang="ja-JP" altLang="en-US" dirty="0" smtClean="0"/>
-              <a:t>に次いで古い言語</a:t>
-            </a:r>
-            <a:endParaRPr lang="en-US" altLang="ja-JP" dirty="0" smtClean="0"/>
-          </a:p>
-          <a:p>
-            <a:pPr marL="82296" indent="0">
-              <a:buNone/>
-            </a:pPr>
-            <a:endParaRPr lang="en-US" altLang="ja-JP" dirty="0" smtClean="0"/>
-          </a:p>
-          <a:p>
-            <a:pPr marL="82296" indent="0">
-              <a:buNone/>
-            </a:pPr>
-            <a:r>
-              <a:rPr lang="ja-JP" altLang="en-US" dirty="0" smtClean="0"/>
-              <a:t>・</a:t>
-            </a:r>
-            <a:r>
-              <a:rPr lang="en-US" altLang="ja-JP" dirty="0" smtClean="0"/>
-              <a:t>S</a:t>
-            </a:r>
-            <a:r>
-              <a:rPr lang="ja-JP" altLang="en-US" dirty="0" smtClean="0"/>
-              <a:t>式と前置記法</a:t>
-            </a:r>
-            <a:r>
-              <a:rPr lang="en-US" altLang="ja-JP" dirty="0" smtClean="0"/>
-              <a:t>(</a:t>
-            </a:r>
-            <a:r>
-              <a:rPr lang="ja-JP" altLang="en-US" dirty="0" smtClean="0"/>
-              <a:t>ポーランド記法</a:t>
-            </a:r>
-            <a:r>
-              <a:rPr lang="en-US" altLang="ja-JP" dirty="0" smtClean="0"/>
-              <a:t>)</a:t>
-            </a:r>
-            <a:r>
-              <a:rPr lang="ja-JP" altLang="en-US" dirty="0" smtClean="0"/>
-              <a:t>が特徴</a:t>
-            </a:r>
-            <a:endParaRPr lang="en-US" altLang="ja-JP" dirty="0" smtClean="0"/>
-          </a:p>
-          <a:p>
-            <a:pPr marL="82296" indent="0">
-              <a:buNone/>
-            </a:pPr>
-            <a:r>
-              <a:rPr lang="ja-JP" altLang="en-US" dirty="0"/>
-              <a:t>　</a:t>
-            </a:r>
-            <a:endParaRPr lang="en-US" altLang="ja-JP" dirty="0"/>
+            <a:pPr marL="82296" indent="0" algn="ctr">
+              <a:buNone/>
+            </a:pPr>
+            <a:endParaRPr kumimoji="1" lang="en-US" altLang="ja-JP" sz="4400" dirty="0" smtClean="0"/>
+          </a:p>
+          <a:p>
+            <a:pPr marL="82296" indent="0" algn="ctr">
+              <a:buNone/>
+            </a:pPr>
+            <a:endParaRPr kumimoji="1" lang="en-US" altLang="ja-JP" sz="4400" dirty="0" smtClean="0"/>
+          </a:p>
+          <a:p>
+            <a:pPr marL="82296" indent="0" algn="ctr">
+              <a:buNone/>
+            </a:pPr>
+            <a:r>
+              <a:rPr kumimoji="1" lang="ja-JP" altLang="en-US" sz="4400" dirty="0" smtClean="0"/>
+              <a:t>②</a:t>
+            </a:r>
+            <a:r>
+              <a:rPr kumimoji="1" lang="en-US" altLang="ja-JP" sz="4400" dirty="0" smtClean="0"/>
+              <a:t>Scheme</a:t>
+            </a:r>
+            <a:r>
+              <a:rPr kumimoji="1" lang="ja-JP" altLang="en-US" sz="4400" dirty="0" err="1" smtClean="0"/>
+              <a:t>って</a:t>
+            </a:r>
+            <a:r>
+              <a:rPr kumimoji="1" lang="ja-JP" altLang="en-US" sz="4400" dirty="0" smtClean="0"/>
+              <a:t>どんな言語？</a:t>
+            </a:r>
+            <a:endParaRPr kumimoji="1" lang="en-US" altLang="ja-JP" sz="4400" dirty="0" smtClean="0"/>
           </a:p>
         </p:txBody>
       </p:sp>
     </p:spTree>
     <p:extLst>
       <p:ext uri="{BB962C8B-B14F-4D97-AF65-F5344CB8AC3E}">
-        <p14:creationId xmlns:p14="http://schemas.microsoft.com/office/powerpoint/2010/main" val="1548140014"/>
+        <p14:creationId xmlns:p14="http://schemas.microsoft.com/office/powerpoint/2010/main" val="2706628285"/>
       </p:ext>
     </p:extLst>
   </p:cSld>
@@ -9840,7 +10378,7 @@
           <a:p>
             <a:r>
               <a:rPr kumimoji="1" lang="en-US" altLang="ja-JP" dirty="0" smtClean="0"/>
-              <a:t>Scheme</a:t>
+              <a:t>Lisp</a:t>
             </a:r>
             <a:endParaRPr kumimoji="1" lang="ja-JP" altLang="en-US" dirty="0"/>
           </a:p>
@@ -9872,16 +10410,122 @@
               <a:buNone/>
             </a:pPr>
             <a:r>
+              <a:rPr lang="ja-JP" altLang="en-US" dirty="0" smtClean="0"/>
+              <a:t>・</a:t>
+            </a:r>
+            <a:r>
+              <a:rPr lang="en-US" altLang="ja-JP" b="1" dirty="0" err="1" smtClean="0"/>
+              <a:t>LIS</a:t>
+            </a:r>
+            <a:r>
+              <a:rPr lang="en-US" altLang="ja-JP" dirty="0" err="1" smtClean="0"/>
+              <a:t>t</a:t>
+            </a:r>
+            <a:r>
+              <a:rPr lang="en-US" altLang="ja-JP" dirty="0" smtClean="0"/>
+              <a:t> </a:t>
+            </a:r>
+            <a:r>
+              <a:rPr lang="en-US" altLang="ja-JP" b="1" dirty="0" smtClean="0"/>
+              <a:t>P</a:t>
+            </a:r>
+            <a:r>
+              <a:rPr lang="en-US" altLang="ja-JP" dirty="0" smtClean="0"/>
+              <a:t>rocessing</a:t>
+            </a:r>
+          </a:p>
+          <a:p>
+            <a:pPr marL="82296" indent="0">
+              <a:buNone/>
+            </a:pPr>
+            <a:r>
+              <a:rPr lang="en-US" altLang="ja-JP" sz="2000" strike="sngStrike" dirty="0"/>
+              <a:t>Lots of Insane Stupid </a:t>
+            </a:r>
+            <a:r>
+              <a:rPr lang="en-US" altLang="ja-JP" sz="2000" strike="sngStrike" dirty="0" smtClean="0"/>
+              <a:t>Parenthesis(</a:t>
+            </a:r>
+            <a:r>
+              <a:rPr lang="ja-JP" altLang="en-US" sz="2000" strike="sngStrike" dirty="0" smtClean="0"/>
+              <a:t>アホみたいな括弧の山</a:t>
+            </a:r>
+            <a:r>
+              <a:rPr lang="en-US" altLang="ja-JP" sz="2000" strike="sngStrike" dirty="0" smtClean="0"/>
+              <a:t>)</a:t>
+            </a:r>
+          </a:p>
+          <a:p>
+            <a:pPr marL="82296" indent="0">
+              <a:buNone/>
+            </a:pPr>
+            <a:endParaRPr lang="en-US" altLang="ja-JP" dirty="0"/>
+          </a:p>
+          <a:p>
+            <a:pPr marL="82296" indent="0">
+              <a:buNone/>
+            </a:pPr>
+            <a:r>
+              <a:rPr lang="ja-JP" altLang="en-US" dirty="0" smtClean="0"/>
+              <a:t>・現在使われる高級言語では</a:t>
+            </a:r>
+            <a:endParaRPr lang="en-US" altLang="ja-JP" dirty="0" smtClean="0"/>
+          </a:p>
+          <a:p>
+            <a:pPr marL="82296" indent="0">
+              <a:buNone/>
+            </a:pPr>
+            <a:r>
               <a:rPr lang="ja-JP" altLang="en-US" dirty="0"/>
+              <a:t>　</a:t>
+            </a:r>
+            <a:r>
+              <a:rPr lang="en-US" altLang="ja-JP" dirty="0" smtClean="0"/>
+              <a:t>Fortran</a:t>
+            </a:r>
+            <a:r>
+              <a:rPr lang="ja-JP" altLang="en-US" dirty="0" smtClean="0"/>
+              <a:t>に次いで古い言語</a:t>
+            </a:r>
+            <a:endParaRPr lang="en-US" altLang="ja-JP" dirty="0" smtClean="0"/>
+          </a:p>
+          <a:p>
+            <a:pPr marL="82296" indent="0">
+              <a:buNone/>
+            </a:pPr>
+            <a:endParaRPr lang="en-US" altLang="ja-JP" dirty="0" smtClean="0"/>
+          </a:p>
+          <a:p>
+            <a:pPr marL="82296" indent="0">
+              <a:buNone/>
+            </a:pPr>
+            <a:r>
+              <a:rPr lang="ja-JP" altLang="en-US" dirty="0" smtClean="0"/>
               <a:t>・</a:t>
             </a:r>
             <a:r>
               <a:rPr lang="en-US" altLang="ja-JP" dirty="0" smtClean="0"/>
-              <a:t>Lisp</a:t>
+              <a:t>S</a:t>
             </a:r>
             <a:r>
               <a:rPr lang="ja-JP" altLang="en-US" dirty="0" smtClean="0"/>
-              <a:t>の方言の一つで、現在でもよく使われる</a:t>
+              <a:t>式と前置記法</a:t>
+            </a:r>
+            <a:r>
+              <a:rPr lang="en-US" altLang="ja-JP" dirty="0" smtClean="0"/>
+              <a:t>(</a:t>
+            </a:r>
+            <a:r>
+              <a:rPr lang="ja-JP" altLang="en-US" dirty="0" smtClean="0"/>
+              <a:t>ポーランド記法</a:t>
+            </a:r>
+            <a:r>
+              <a:rPr lang="en-US" altLang="ja-JP" dirty="0" smtClean="0"/>
+              <a:t>)</a:t>
+            </a:r>
+            <a:r>
+              <a:rPr lang="ja-JP" altLang="en-US" dirty="0" smtClean="0"/>
+              <a:t>が特徴</a:t>
             </a:r>
             <a:endParaRPr lang="en-US" altLang="ja-JP" dirty="0" smtClean="0"/>
           </a:p>
@@ -9889,90 +10533,18 @@
             <a:pPr marL="82296" indent="0">
               <a:buNone/>
             </a:pPr>
-            <a:endParaRPr lang="en-US" altLang="ja-JP" dirty="0" smtClean="0"/>
-          </a:p>
-          <a:p>
-            <a:pPr marL="82296" indent="0">
-              <a:buNone/>
-            </a:pPr>
-            <a:r>
-              <a:rPr lang="ja-JP" altLang="en-US" dirty="0" smtClean="0"/>
-              <a:t>・言語仕様を少数のルールに限定</a:t>
-            </a:r>
-            <a:endParaRPr lang="en-US" altLang="ja-JP" dirty="0" smtClean="0"/>
-          </a:p>
-          <a:p>
-            <a:pPr marL="82296" indent="0">
-              <a:buNone/>
-            </a:pPr>
+            <a:r>
+              <a:rPr lang="ja-JP" altLang="en-US" dirty="0"/>
+              <a:t>　</a:t>
+            </a:r>
             <a:endParaRPr lang="en-US" altLang="ja-JP" dirty="0"/>
-          </a:p>
-          <a:p>
-            <a:pPr marL="82296" indent="0">
-              <a:buNone/>
-            </a:pPr>
-            <a:r>
-              <a:rPr lang="ja-JP" altLang="en-US" dirty="0"/>
-              <a:t>思想「厳選した少数のルールを用意しておけばいくらでも強力な言語を構築する</a:t>
-            </a:r>
-            <a:r>
-              <a:rPr lang="ja-JP" altLang="en-US" dirty="0" smtClean="0"/>
-              <a:t>ことが</a:t>
-            </a:r>
-            <a:r>
-              <a:rPr lang="ja-JP" altLang="en-US" dirty="0"/>
-              <a:t>できる</a:t>
-            </a:r>
-            <a:r>
-              <a:rPr lang="ja-JP" altLang="en-US" dirty="0" smtClean="0"/>
-              <a:t>」</a:t>
-            </a:r>
-            <a:endParaRPr lang="en-US" altLang="ja-JP" dirty="0" smtClean="0"/>
-          </a:p>
-          <a:p>
-            <a:pPr marL="82296" indent="0">
-              <a:buNone/>
-            </a:pPr>
-            <a:endParaRPr lang="en-US" altLang="ja-JP" dirty="0"/>
-          </a:p>
-          <a:p>
-            <a:pPr marL="82296" indent="0">
-              <a:buNone/>
-            </a:pPr>
-            <a:r>
-              <a:rPr lang="ja-JP" altLang="en-US" dirty="0" smtClean="0"/>
-              <a:t>多機能化を目指した</a:t>
-            </a:r>
-            <a:r>
-              <a:rPr lang="en-US" altLang="ja-JP" dirty="0" smtClean="0"/>
-              <a:t>Common Lisp</a:t>
-            </a:r>
-            <a:r>
-              <a:rPr lang="ja-JP" altLang="en-US" dirty="0" smtClean="0"/>
-              <a:t>とは</a:t>
-            </a:r>
-            <a:endParaRPr lang="en-US" altLang="ja-JP" dirty="0" smtClean="0"/>
-          </a:p>
-          <a:p>
-            <a:pPr marL="82296" indent="0">
-              <a:buNone/>
-            </a:pPr>
-            <a:r>
-              <a:rPr lang="ja-JP" altLang="en-US" dirty="0" smtClean="0"/>
-              <a:t>対照的な</a:t>
-            </a:r>
-            <a:r>
-              <a:rPr lang="ja-JP" altLang="en-US" dirty="0"/>
-              <a:t>存在</a:t>
-            </a:r>
-            <a:endParaRPr lang="en-US" altLang="ja-JP" dirty="0" smtClean="0"/>
           </a:p>
         </p:txBody>
       </p:sp>
     </p:spTree>
     <p:extLst>
       <p:ext uri="{BB962C8B-B14F-4D97-AF65-F5344CB8AC3E}">
-        <p14:creationId xmlns:p14="http://schemas.microsoft.com/office/powerpoint/2010/main" val="2748462096"/>
+        <p14:creationId xmlns:p14="http://schemas.microsoft.com/office/powerpoint/2010/main" val="1548140014"/>
       </p:ext>
     </p:extLst>
   </p:cSld>

</xml_diff>

<commit_message>
edit scheme in home last
</commit_message>
<xml_diff>
--- a/scheme.pptx
+++ b/scheme.pptx
@@ -37,10 +37,12 @@
     <p:sldId id="322" r:id="rId31"/>
     <p:sldId id="350" r:id="rId32"/>
     <p:sldId id="353" r:id="rId33"/>
-    <p:sldId id="354" r:id="rId34"/>
-    <p:sldId id="349" r:id="rId35"/>
-    <p:sldId id="328" r:id="rId36"/>
-    <p:sldId id="276" r:id="rId37"/>
+    <p:sldId id="356" r:id="rId34"/>
+    <p:sldId id="357" r:id="rId35"/>
+    <p:sldId id="349" r:id="rId36"/>
+    <p:sldId id="358" r:id="rId37"/>
+    <p:sldId id="359" r:id="rId38"/>
+    <p:sldId id="276" r:id="rId39"/>
   </p:sldIdLst>
   <p:sldSz cx="9144000" cy="6858000" type="screen4x3"/>
   <p:notesSz cx="6858000" cy="9144000"/>
@@ -141,7 +143,7 @@
   </p:defaultTextStyle>
   <p:extLst>
     <p:ext uri="{EFAFB233-063F-42B5-8137-9DF3F51BA10A}">
-      <p15:sldGuideLst xmlns:p15="http://schemas.microsoft.com/office/powerpoint/2012/main">
+      <p15:sldGuideLst xmlns:p15="http://schemas.microsoft.com/office/powerpoint/2012/main" xmlns="">
         <p15:guide id="1" orient="horz" pos="2160">
           <p15:clr>
             <a:srgbClr val="A4A3A4"/>
@@ -9370,7 +9372,6 @@
               <a:rPr lang="en-US" altLang="ja-JP" dirty="0" smtClean="0"/>
               <a:t>&gt;)</a:t>
             </a:r>
-            <a:endParaRPr lang="en-US" altLang="ja-JP" dirty="0" smtClean="0"/>
           </a:p>
           <a:p>
             <a:pPr marL="82296" indent="0">
@@ -9773,7 +9774,6 @@
               <a:rPr lang="en-US" altLang="ja-JP" u="sng" dirty="0"/>
               <a:t>&gt;)</a:t>
             </a:r>
-            <a:endParaRPr lang="en-US" altLang="ja-JP" u="sng" dirty="0"/>
           </a:p>
           <a:p>
             <a:pPr marL="82296" indent="0">
@@ -9786,34 +9786,34 @@
               <a:buNone/>
             </a:pPr>
             <a:r>
-              <a:rPr lang="en-US" altLang="ja-JP" dirty="0" smtClean="0"/>
+              <a:rPr lang="en-US" altLang="ja-JP" sz="2800" dirty="0" smtClean="0"/>
               <a:t>(define (fold proc </a:t>
             </a:r>
             <a:r>
-              <a:rPr lang="en-US" altLang="ja-JP" dirty="0" err="1" smtClean="0"/>
+              <a:rPr lang="en-US" altLang="ja-JP" sz="2800" dirty="0" err="1" smtClean="0"/>
               <a:t>init</a:t>
             </a:r>
             <a:r>
-              <a:rPr lang="en-US" altLang="ja-JP" dirty="0" smtClean="0"/>
+              <a:rPr lang="en-US" altLang="ja-JP" sz="2800" dirty="0" smtClean="0"/>
               <a:t> </a:t>
             </a:r>
             <a:r>
-              <a:rPr lang="en-US" altLang="ja-JP" dirty="0" err="1" smtClean="0"/>
+              <a:rPr lang="en-US" altLang="ja-JP" sz="2800" dirty="0" err="1" smtClean="0"/>
               <a:t>lis</a:t>
             </a:r>
             <a:r>
-              <a:rPr lang="en-US" altLang="ja-JP" dirty="0" smtClean="0"/>
+              <a:rPr lang="en-US" altLang="ja-JP" sz="2800" dirty="0" smtClean="0"/>
               <a:t>) &lt;</a:t>
             </a:r>
             <a:r>
-              <a:rPr lang="ja-JP" altLang="en-US" dirty="0" smtClean="0"/>
+              <a:rPr lang="ja-JP" altLang="en-US" sz="2800" dirty="0" smtClean="0"/>
               <a:t>式</a:t>
             </a:r>
             <a:r>
-              <a:rPr lang="en-US" altLang="ja-JP" dirty="0" smtClean="0"/>
+              <a:rPr lang="en-US" altLang="ja-JP" sz="2800" dirty="0" smtClean="0"/>
               <a:t>&gt;)</a:t>
             </a:r>
-            <a:endParaRPr lang="en-US" altLang="ja-JP" dirty="0"/>
+            <a:endParaRPr lang="en-US" altLang="ja-JP" sz="2800" dirty="0"/>
           </a:p>
         </p:txBody>
       </p:sp>
@@ -9934,7 +9934,6 @@
               <a:rPr lang="en-US" altLang="ja-JP" u="sng" dirty="0"/>
               <a:t>&gt;)</a:t>
             </a:r>
-            <a:endParaRPr lang="en-US" altLang="ja-JP" u="sng" dirty="0"/>
           </a:p>
           <a:p>
             <a:pPr marL="82296" indent="0">
@@ -9947,23 +9946,23 @@
               <a:buNone/>
             </a:pPr>
             <a:r>
-              <a:rPr lang="en-US" altLang="ja-JP" dirty="0" smtClean="0"/>
+              <a:rPr lang="en-US" altLang="ja-JP" sz="2800" dirty="0" smtClean="0"/>
               <a:t>(define (fold proc </a:t>
             </a:r>
             <a:r>
-              <a:rPr lang="en-US" altLang="ja-JP" dirty="0" err="1" smtClean="0"/>
+              <a:rPr lang="en-US" altLang="ja-JP" sz="2800" dirty="0" err="1" smtClean="0"/>
               <a:t>init</a:t>
             </a:r>
             <a:r>
-              <a:rPr lang="en-US" altLang="ja-JP" dirty="0" smtClean="0"/>
+              <a:rPr lang="en-US" altLang="ja-JP" sz="2800" dirty="0" smtClean="0"/>
               <a:t> </a:t>
             </a:r>
             <a:r>
-              <a:rPr lang="en-US" altLang="ja-JP" dirty="0" err="1" smtClean="0"/>
+              <a:rPr lang="en-US" altLang="ja-JP" sz="2800" dirty="0" err="1" smtClean="0"/>
               <a:t>lis</a:t>
             </a:r>
             <a:r>
-              <a:rPr lang="en-US" altLang="ja-JP" dirty="0" smtClean="0"/>
+              <a:rPr lang="en-US" altLang="ja-JP" sz="2800" dirty="0" smtClean="0"/>
               <a:t>) </a:t>
             </a:r>
           </a:p>
@@ -9972,45 +9971,53 @@
               <a:buNone/>
             </a:pPr>
             <a:r>
-              <a:rPr lang="en-US" altLang="ja-JP" dirty="0" smtClean="0"/>
+              <a:rPr lang="en-US" altLang="ja-JP" sz="2800" dirty="0" smtClean="0"/>
               <a:t>  </a:t>
             </a:r>
             <a:r>
-              <a:rPr lang="en-US" altLang="ja-JP" b="1" dirty="0" smtClean="0"/>
-              <a:t>(if (null? Lis)</a:t>
-            </a:r>
-          </a:p>
-          <a:p>
-            <a:pPr marL="82296" indent="0">
-              <a:buNone/>
-            </a:pPr>
-            <a:r>
-              <a:rPr lang="en-US" altLang="ja-JP" b="1" dirty="0"/>
+              <a:rPr lang="en-US" altLang="ja-JP" sz="2800" b="1" dirty="0" smtClean="0"/>
+              <a:t>(if (null? </a:t>
+            </a:r>
+            <a:r>
+              <a:rPr lang="en-US" altLang="ja-JP" sz="2800" b="1" dirty="0" err="1" smtClean="0"/>
+              <a:t>lis</a:t>
+            </a:r>
+            <a:r>
+              <a:rPr lang="en-US" altLang="ja-JP" sz="2800" b="1" dirty="0" smtClean="0"/>
+              <a:t>)</a:t>
+            </a:r>
+          </a:p>
+          <a:p>
+            <a:pPr marL="82296" indent="0">
+              <a:buNone/>
+            </a:pPr>
+            <a:r>
+              <a:rPr lang="en-US" altLang="ja-JP" sz="2800" b="1" dirty="0"/>
               <a:t> </a:t>
             </a:r>
             <a:r>
-              <a:rPr lang="en-US" altLang="ja-JP" b="1" dirty="0" smtClean="0"/>
+              <a:rPr lang="en-US" altLang="ja-JP" sz="2800" b="1" dirty="0" smtClean="0"/>
               <a:t>   </a:t>
             </a:r>
             <a:r>
-              <a:rPr lang="en-US" altLang="ja-JP" b="1" dirty="0" err="1" smtClean="0"/>
+              <a:rPr lang="en-US" altLang="ja-JP" sz="2800" b="1" dirty="0" err="1" smtClean="0"/>
               <a:t>init</a:t>
             </a:r>
-            <a:endParaRPr lang="en-US" altLang="ja-JP" b="1" dirty="0" smtClean="0"/>
-          </a:p>
-          <a:p>
-            <a:pPr marL="82296" indent="0">
-              <a:buNone/>
-            </a:pPr>
-            <a:r>
-              <a:rPr lang="en-US" altLang="ja-JP" dirty="0"/>
+            <a:endParaRPr lang="en-US" altLang="ja-JP" sz="2800" b="1" dirty="0" smtClean="0"/>
+          </a:p>
+          <a:p>
+            <a:pPr marL="82296" indent="0">
+              <a:buNone/>
+            </a:pPr>
+            <a:r>
+              <a:rPr lang="en-US" altLang="ja-JP" sz="2800" dirty="0"/>
               <a:t> </a:t>
             </a:r>
             <a:r>
-              <a:rPr lang="en-US" altLang="ja-JP" dirty="0" smtClean="0"/>
+              <a:rPr lang="en-US" altLang="ja-JP" sz="2800" dirty="0" smtClean="0"/>
               <a:t>   ?????))</a:t>
             </a:r>
-            <a:endParaRPr lang="en-US" altLang="ja-JP" dirty="0"/>
+            <a:endParaRPr lang="en-US" altLang="ja-JP" sz="2800" dirty="0"/>
           </a:p>
         </p:txBody>
       </p:sp>
@@ -10207,7 +10214,6 @@
               <a:rPr lang="en-US" altLang="ja-JP" u="sng" dirty="0"/>
               <a:t>&gt;)</a:t>
             </a:r>
-            <a:endParaRPr lang="en-US" altLang="ja-JP" u="sng" dirty="0"/>
           </a:p>
           <a:p>
             <a:pPr marL="82296" indent="0">
@@ -10220,41 +10226,177 @@
               <a:buNone/>
             </a:pPr>
             <a:r>
-              <a:rPr lang="en-US" altLang="ja-JP" dirty="0" smtClean="0"/>
+              <a:rPr lang="en-US" altLang="ja-JP" sz="2800" dirty="0" smtClean="0"/>
               <a:t>(define (fold proc </a:t>
             </a:r>
             <a:r>
-              <a:rPr lang="en-US" altLang="ja-JP" dirty="0" err="1" smtClean="0"/>
+              <a:rPr lang="en-US" altLang="ja-JP" sz="2800" dirty="0" err="1" smtClean="0"/>
               <a:t>init</a:t>
             </a:r>
             <a:r>
-              <a:rPr lang="en-US" altLang="ja-JP" dirty="0" smtClean="0"/>
+              <a:rPr lang="en-US" altLang="ja-JP" sz="2800" dirty="0" smtClean="0"/>
               <a:t> </a:t>
             </a:r>
             <a:r>
-              <a:rPr lang="en-US" altLang="ja-JP" dirty="0" err="1" smtClean="0"/>
+              <a:rPr lang="en-US" altLang="ja-JP" sz="2800" dirty="0" err="1" smtClean="0"/>
               <a:t>lis</a:t>
             </a:r>
             <a:r>
-              <a:rPr lang="en-US" altLang="ja-JP" dirty="0" smtClean="0"/>
-              <a:t>) &lt;</a:t>
-            </a:r>
-            <a:r>
-              <a:rPr lang="ja-JP" altLang="en-US" dirty="0" smtClean="0"/>
-              <a:t>式</a:t>
-            </a:r>
-            <a:r>
-              <a:rPr lang="en-US" altLang="ja-JP" dirty="0" smtClean="0"/>
-              <a:t>&gt;)</a:t>
-            </a:r>
-            <a:endParaRPr lang="en-US" altLang="ja-JP" dirty="0"/>
+              <a:rPr lang="en-US" altLang="ja-JP" sz="2800" dirty="0" smtClean="0"/>
+              <a:t>) </a:t>
+            </a:r>
+          </a:p>
+          <a:p>
+            <a:pPr marL="82296" indent="0">
+              <a:buNone/>
+            </a:pPr>
+            <a:r>
+              <a:rPr lang="en-US" altLang="ja-JP" sz="2800" dirty="0" smtClean="0"/>
+              <a:t>  (if (null? </a:t>
+            </a:r>
+            <a:r>
+              <a:rPr lang="en-US" altLang="ja-JP" sz="2800" dirty="0" err="1" smtClean="0"/>
+              <a:t>lis</a:t>
+            </a:r>
+            <a:r>
+              <a:rPr lang="en-US" altLang="ja-JP" sz="2800" dirty="0" smtClean="0"/>
+              <a:t>)</a:t>
+            </a:r>
+          </a:p>
+          <a:p>
+            <a:pPr marL="82296" indent="0">
+              <a:buNone/>
+            </a:pPr>
+            <a:r>
+              <a:rPr lang="en-US" altLang="ja-JP" sz="2800" dirty="0"/>
+              <a:t> </a:t>
+            </a:r>
+            <a:r>
+              <a:rPr lang="en-US" altLang="ja-JP" sz="2800" dirty="0" smtClean="0"/>
+              <a:t>   </a:t>
+            </a:r>
+            <a:r>
+              <a:rPr lang="en-US" altLang="ja-JP" sz="2800" dirty="0" err="1" smtClean="0"/>
+              <a:t>init</a:t>
+            </a:r>
+            <a:endParaRPr lang="en-US" altLang="ja-JP" sz="2800" dirty="0" smtClean="0"/>
+          </a:p>
+          <a:p>
+            <a:pPr marL="82296" indent="0">
+              <a:buNone/>
+            </a:pPr>
+            <a:r>
+              <a:rPr lang="en-US" altLang="ja-JP" sz="2800" dirty="0"/>
+              <a:t> </a:t>
+            </a:r>
+            <a:r>
+              <a:rPr lang="en-US" altLang="ja-JP" sz="2800" dirty="0" smtClean="0"/>
+              <a:t>   </a:t>
+            </a:r>
+            <a:r>
+              <a:rPr lang="en-US" altLang="ja-JP" sz="2800" dirty="0" smtClean="0"/>
+              <a:t>??</a:t>
+            </a:r>
+            <a:r>
+              <a:rPr lang="ja-JP" altLang="en-US" sz="2800" dirty="0" smtClean="0"/>
+              <a:t>　</a:t>
+            </a:r>
+            <a:r>
+              <a:rPr lang="en-US" altLang="ja-JP" sz="2800" b="1" dirty="0" smtClean="0"/>
+              <a:t>(proc (car </a:t>
+            </a:r>
+            <a:r>
+              <a:rPr lang="en-US" altLang="ja-JP" sz="2800" b="1" dirty="0" err="1" smtClean="0"/>
+              <a:t>lis</a:t>
+            </a:r>
+            <a:r>
+              <a:rPr lang="en-US" altLang="ja-JP" sz="2800" b="1" dirty="0"/>
+              <a:t>) </a:t>
+            </a:r>
+            <a:r>
+              <a:rPr lang="en-US" altLang="ja-JP" sz="2800" b="1" dirty="0" err="1"/>
+              <a:t>init</a:t>
+            </a:r>
+            <a:r>
+              <a:rPr lang="en-US" altLang="ja-JP" sz="2800" b="1" dirty="0"/>
+              <a:t>)</a:t>
+            </a:r>
+            <a:r>
+              <a:rPr lang="ja-JP" altLang="en-US" sz="2800" dirty="0" smtClean="0"/>
+              <a:t>　</a:t>
+            </a:r>
+            <a:r>
+              <a:rPr lang="en-US" altLang="ja-JP" sz="2800" dirty="0" smtClean="0"/>
+              <a:t>??))</a:t>
+            </a:r>
+            <a:endParaRPr lang="en-US" altLang="ja-JP" sz="2800" dirty="0"/>
+          </a:p>
+        </p:txBody>
+      </p:sp>
+      <p:sp>
+        <p:nvSpPr>
+          <p:cNvPr id="5" name="角丸四角形 4"/>
+          <p:cNvSpPr/>
+          <p:nvPr/>
+        </p:nvSpPr>
+        <p:spPr>
+          <a:xfrm>
+            <a:off x="1115616" y="4725144"/>
+            <a:ext cx="6696744" cy="1440160"/>
+          </a:xfrm>
+          <a:prstGeom prst="roundRect">
+            <a:avLst/>
+          </a:prstGeom>
+        </p:spPr>
+        <p:style>
+          <a:lnRef idx="2">
+            <a:schemeClr val="accent1">
+              <a:shade val="50000"/>
+            </a:schemeClr>
+          </a:lnRef>
+          <a:fillRef idx="1">
+            <a:schemeClr val="accent1"/>
+          </a:fillRef>
+          <a:effectRef idx="0">
+            <a:schemeClr val="accent1"/>
+          </a:effectRef>
+          <a:fontRef idx="minor">
+            <a:schemeClr val="lt1"/>
+          </a:fontRef>
+        </p:style>
+        <p:txBody>
+          <a:bodyPr rtlCol="0" anchor="ctr"/>
+          <a:lstStyle/>
+          <a:p>
+            <a:pPr algn="ctr"/>
+            <a:r>
+              <a:rPr lang="ja-JP" altLang="en-US" sz="3200" dirty="0"/>
+              <a:t>リスト</a:t>
+            </a:r>
+            <a:r>
+              <a:rPr lang="ja-JP" altLang="en-US" sz="3200" dirty="0" smtClean="0"/>
+              <a:t>の先頭と初期値を処理する</a:t>
+            </a:r>
+            <a:endParaRPr lang="en-US" altLang="ja-JP" sz="3200" dirty="0" smtClean="0"/>
+          </a:p>
+          <a:p>
+            <a:pPr algn="ctr"/>
+            <a:r>
+              <a:rPr kumimoji="1" lang="ja-JP" altLang="en-US" sz="3200" dirty="0"/>
+              <a:t>リストの</a:t>
+            </a:r>
+            <a:r>
+              <a:rPr kumimoji="1" lang="ja-JP" altLang="en-US" sz="3200" dirty="0" smtClean="0"/>
+              <a:t>残りはあとで考える</a:t>
+            </a:r>
+            <a:endParaRPr kumimoji="1" lang="ja-JP" altLang="en-US" sz="3200" dirty="0"/>
           </a:p>
         </p:txBody>
       </p:sp>
     </p:spTree>
     <p:extLst>
       <p:ext uri="{BB962C8B-B14F-4D97-AF65-F5344CB8AC3E}">
-        <p14:creationId xmlns:p14="http://schemas.microsoft.com/office/powerpoint/2010/main" val="320661236"/>
+        <p14:creationId xmlns:p14="http://schemas.microsoft.com/office/powerpoint/2010/main" val="2408865116"/>
       </p:ext>
     </p:extLst>
   </p:cSld>
@@ -10303,6 +10445,14 @@
           <a:bodyPr/>
           <a:lstStyle/>
           <a:p>
+            <a:r>
+              <a:rPr kumimoji="1" lang="en-US" altLang="ja-JP" dirty="0" smtClean="0"/>
+              <a:t>fold</a:t>
+            </a:r>
+            <a:r>
+              <a:rPr kumimoji="1" lang="ja-JP" altLang="en-US" dirty="0" smtClean="0"/>
+              <a:t>を自前で作ってみよう</a:t>
+            </a:r>
             <a:endParaRPr kumimoji="1" lang="ja-JP" altLang="en-US" dirty="0"/>
           </a:p>
         </p:txBody>
@@ -10319,8 +10469,8 @@
         </p:nvSpPr>
         <p:spPr>
           <a:xfrm>
-            <a:off x="899592" y="1447800"/>
-            <a:ext cx="8136904" cy="4069432"/>
+            <a:off x="1115616" y="1124744"/>
+            <a:ext cx="8028384" cy="5544616"/>
           </a:xfrm>
         </p:spPr>
         <p:txBody>
@@ -10329,33 +10479,299 @@
           </a:bodyPr>
           <a:lstStyle/>
           <a:p>
-            <a:pPr marL="82296" indent="0" algn="ctr">
-              <a:buNone/>
-            </a:pPr>
-            <a:endParaRPr kumimoji="1" lang="en-US" altLang="ja-JP" sz="4400" dirty="0" smtClean="0"/>
-          </a:p>
-          <a:p>
-            <a:pPr marL="82296" indent="0" algn="ctr">
-              <a:buNone/>
-            </a:pPr>
-            <a:endParaRPr kumimoji="1" lang="en-US" altLang="ja-JP" sz="4400" dirty="0" smtClean="0"/>
-          </a:p>
-          <a:p>
-            <a:pPr marL="82296" indent="0" algn="ctr">
-              <a:buNone/>
-            </a:pPr>
-            <a:r>
-              <a:rPr kumimoji="1" lang="ja-JP" altLang="en-US" sz="4400" dirty="0" smtClean="0"/>
-              <a:t>前回のおさらい</a:t>
-            </a:r>
-            <a:endParaRPr kumimoji="1" lang="en-US" altLang="ja-JP" sz="4400" dirty="0" smtClean="0"/>
+            <a:pPr marL="82296" indent="0">
+              <a:buNone/>
+            </a:pPr>
+            <a:r>
+              <a:rPr lang="en-US" altLang="ja-JP" u="sng" dirty="0"/>
+              <a:t>(fold &lt;</a:t>
+            </a:r>
+            <a:r>
+              <a:rPr lang="ja-JP" altLang="en-US" u="sng" dirty="0"/>
+              <a:t>手続き</a:t>
+            </a:r>
+            <a:r>
+              <a:rPr lang="en-US" altLang="ja-JP" u="sng" dirty="0"/>
+              <a:t>&gt; &lt;</a:t>
+            </a:r>
+            <a:r>
+              <a:rPr lang="ja-JP" altLang="en-US" u="sng" dirty="0"/>
+              <a:t>初期値</a:t>
+            </a:r>
+            <a:r>
+              <a:rPr lang="en-US" altLang="ja-JP" u="sng" dirty="0"/>
+              <a:t>&gt; &lt;</a:t>
+            </a:r>
+            <a:r>
+              <a:rPr lang="ja-JP" altLang="en-US" u="sng" dirty="0"/>
+              <a:t>リスト</a:t>
+            </a:r>
+            <a:r>
+              <a:rPr lang="en-US" altLang="ja-JP" u="sng" dirty="0"/>
+              <a:t>&gt;)</a:t>
+            </a:r>
+          </a:p>
+          <a:p>
+            <a:pPr marL="82296" indent="0">
+              <a:buNone/>
+            </a:pPr>
+            <a:endParaRPr lang="en-US" altLang="ja-JP" dirty="0" smtClean="0"/>
+          </a:p>
+          <a:p>
+            <a:pPr marL="82296" indent="0">
+              <a:buNone/>
+            </a:pPr>
+            <a:r>
+              <a:rPr lang="en-US" altLang="ja-JP" sz="2800" dirty="0" smtClean="0"/>
+              <a:t>(define (fold proc </a:t>
+            </a:r>
+            <a:r>
+              <a:rPr lang="en-US" altLang="ja-JP" sz="2800" dirty="0" err="1" smtClean="0"/>
+              <a:t>init</a:t>
+            </a:r>
+            <a:r>
+              <a:rPr lang="en-US" altLang="ja-JP" sz="2800" dirty="0" smtClean="0"/>
+              <a:t> </a:t>
+            </a:r>
+            <a:r>
+              <a:rPr lang="en-US" altLang="ja-JP" sz="2800" dirty="0" err="1" smtClean="0"/>
+              <a:t>lis</a:t>
+            </a:r>
+            <a:r>
+              <a:rPr lang="en-US" altLang="ja-JP" sz="2800" dirty="0" smtClean="0"/>
+              <a:t>) </a:t>
+            </a:r>
+          </a:p>
+          <a:p>
+            <a:pPr marL="82296" indent="0">
+              <a:buNone/>
+            </a:pPr>
+            <a:r>
+              <a:rPr lang="en-US" altLang="ja-JP" sz="2800" dirty="0" smtClean="0"/>
+              <a:t>  (if (null? </a:t>
+            </a:r>
+            <a:r>
+              <a:rPr lang="en-US" altLang="ja-JP" sz="2800" dirty="0" err="1" smtClean="0"/>
+              <a:t>lis</a:t>
+            </a:r>
+            <a:r>
+              <a:rPr lang="en-US" altLang="ja-JP" sz="2800" dirty="0" smtClean="0"/>
+              <a:t>)</a:t>
+            </a:r>
+          </a:p>
+          <a:p>
+            <a:pPr marL="82296" indent="0">
+              <a:buNone/>
+            </a:pPr>
+            <a:r>
+              <a:rPr lang="en-US" altLang="ja-JP" sz="2800" dirty="0"/>
+              <a:t> </a:t>
+            </a:r>
+            <a:r>
+              <a:rPr lang="en-US" altLang="ja-JP" sz="2800" dirty="0" smtClean="0"/>
+              <a:t>   </a:t>
+            </a:r>
+            <a:r>
+              <a:rPr lang="en-US" altLang="ja-JP" sz="2800" dirty="0" err="1" smtClean="0"/>
+              <a:t>init</a:t>
+            </a:r>
+            <a:endParaRPr lang="en-US" altLang="ja-JP" sz="2800" dirty="0" smtClean="0"/>
+          </a:p>
+          <a:p>
+            <a:pPr marL="82296" indent="0">
+              <a:buNone/>
+            </a:pPr>
+            <a:r>
+              <a:rPr lang="en-US" altLang="ja-JP" sz="2800" dirty="0"/>
+              <a:t> </a:t>
+            </a:r>
+            <a:r>
+              <a:rPr lang="en-US" altLang="ja-JP" sz="2800" dirty="0" smtClean="0"/>
+              <a:t>   </a:t>
+            </a:r>
+            <a:r>
+              <a:rPr lang="en-US" altLang="ja-JP" sz="2800" b="1" dirty="0" smtClean="0">
+                <a:solidFill>
+                  <a:srgbClr val="FF0000"/>
+                </a:solidFill>
+              </a:rPr>
+              <a:t>fold</a:t>
+            </a:r>
+            <a:r>
+              <a:rPr lang="en-US" altLang="ja-JP" sz="2800" b="1" dirty="0" smtClean="0"/>
+              <a:t> proc</a:t>
+            </a:r>
+            <a:r>
+              <a:rPr lang="ja-JP" altLang="en-US" sz="2800" dirty="0" smtClean="0"/>
+              <a:t>　</a:t>
+            </a:r>
+            <a:r>
+              <a:rPr lang="en-US" altLang="ja-JP" sz="2800" dirty="0" smtClean="0"/>
+              <a:t>(proc (car </a:t>
+            </a:r>
+            <a:r>
+              <a:rPr lang="en-US" altLang="ja-JP" sz="2800" dirty="0" err="1" smtClean="0"/>
+              <a:t>lis</a:t>
+            </a:r>
+            <a:r>
+              <a:rPr lang="en-US" altLang="ja-JP" sz="2800" dirty="0"/>
+              <a:t>) </a:t>
+            </a:r>
+            <a:r>
+              <a:rPr lang="en-US" altLang="ja-JP" sz="2800" dirty="0" err="1"/>
+              <a:t>init</a:t>
+            </a:r>
+            <a:r>
+              <a:rPr lang="en-US" altLang="ja-JP" sz="2800" dirty="0"/>
+              <a:t>)</a:t>
+            </a:r>
+            <a:r>
+              <a:rPr lang="ja-JP" altLang="en-US" sz="2800" dirty="0" smtClean="0"/>
+              <a:t>　</a:t>
+            </a:r>
+            <a:r>
+              <a:rPr lang="en-US" altLang="ja-JP" sz="2800" b="1" dirty="0" smtClean="0"/>
+              <a:t>(</a:t>
+            </a:r>
+            <a:r>
+              <a:rPr lang="en-US" altLang="ja-JP" sz="2800" b="1" dirty="0" err="1" smtClean="0"/>
+              <a:t>cdr</a:t>
+            </a:r>
+            <a:r>
+              <a:rPr lang="en-US" altLang="ja-JP" sz="2800" b="1" dirty="0" smtClean="0"/>
+              <a:t> </a:t>
+            </a:r>
+            <a:r>
+              <a:rPr lang="en-US" altLang="ja-JP" sz="2800" b="1" dirty="0" err="1" smtClean="0"/>
+              <a:t>lis</a:t>
+            </a:r>
+            <a:r>
+              <a:rPr lang="en-US" altLang="ja-JP" sz="2800" b="1" dirty="0" smtClean="0"/>
+              <a:t>)</a:t>
+            </a:r>
+            <a:r>
+              <a:rPr lang="en-US" altLang="ja-JP" sz="2800" dirty="0" smtClean="0"/>
+              <a:t>))</a:t>
+            </a:r>
+            <a:endParaRPr lang="en-US" altLang="ja-JP" sz="2800" dirty="0"/>
+          </a:p>
+        </p:txBody>
+      </p:sp>
+      <p:sp>
+        <p:nvSpPr>
+          <p:cNvPr id="5" name="角丸四角形 4"/>
+          <p:cNvSpPr/>
+          <p:nvPr/>
+        </p:nvSpPr>
+        <p:spPr>
+          <a:xfrm>
+            <a:off x="1115616" y="4725144"/>
+            <a:ext cx="6696744" cy="1944216"/>
+          </a:xfrm>
+          <a:prstGeom prst="roundRect">
+            <a:avLst/>
+          </a:prstGeom>
+        </p:spPr>
+        <p:style>
+          <a:lnRef idx="2">
+            <a:schemeClr val="accent1">
+              <a:shade val="50000"/>
+            </a:schemeClr>
+          </a:lnRef>
+          <a:fillRef idx="1">
+            <a:schemeClr val="accent1"/>
+          </a:fillRef>
+          <a:effectRef idx="0">
+            <a:schemeClr val="accent1"/>
+          </a:effectRef>
+          <a:fontRef idx="minor">
+            <a:schemeClr val="lt1"/>
+          </a:fontRef>
+        </p:style>
+        <p:txBody>
+          <a:bodyPr rtlCol="0" anchor="ctr"/>
+          <a:lstStyle/>
+          <a:p>
+            <a:pPr algn="ctr"/>
+            <a:r>
+              <a:rPr lang="ja-JP" altLang="en-US" sz="3200" dirty="0" smtClean="0"/>
+              <a:t>二回目以降の</a:t>
+            </a:r>
+            <a:r>
+              <a:rPr lang="ja-JP" altLang="en-US" sz="3200" dirty="0"/>
+              <a:t>処理</a:t>
+            </a:r>
+            <a:r>
+              <a:rPr lang="ja-JP" altLang="en-US" sz="3200" dirty="0" smtClean="0"/>
+              <a:t>は</a:t>
+            </a:r>
+            <a:r>
+              <a:rPr lang="en-US" altLang="ja-JP" sz="3200" dirty="0" err="1" smtClean="0"/>
+              <a:t>lis</a:t>
+            </a:r>
+            <a:r>
+              <a:rPr lang="ja-JP" altLang="en-US" sz="3200" dirty="0" smtClean="0"/>
+              <a:t>→</a:t>
+            </a:r>
+            <a:r>
+              <a:rPr lang="en-US" altLang="ja-JP" sz="3200" dirty="0" err="1" smtClean="0"/>
+              <a:t>cdr</a:t>
+            </a:r>
+            <a:r>
+              <a:rPr lang="en-US" altLang="ja-JP" sz="3200" dirty="0" smtClean="0"/>
+              <a:t> </a:t>
+            </a:r>
+            <a:r>
+              <a:rPr lang="en-US" altLang="ja-JP" sz="3200" dirty="0" err="1" smtClean="0"/>
+              <a:t>lis</a:t>
+            </a:r>
+            <a:endParaRPr lang="en-US" altLang="ja-JP" sz="3200" dirty="0"/>
+          </a:p>
+          <a:p>
+            <a:pPr algn="ctr"/>
+            <a:r>
+              <a:rPr lang="en-US" altLang="ja-JP" sz="3200" dirty="0" err="1" smtClean="0"/>
+              <a:t>init</a:t>
+            </a:r>
+            <a:r>
+              <a:rPr lang="ja-JP" altLang="en-US" sz="3200" dirty="0" smtClean="0"/>
+              <a:t>→</a:t>
+            </a:r>
+            <a:r>
+              <a:rPr lang="en-US" altLang="ja-JP" sz="3200" dirty="0" smtClean="0"/>
+              <a:t>(proc (car </a:t>
+            </a:r>
+            <a:r>
+              <a:rPr lang="en-US" altLang="ja-JP" sz="3200" dirty="0" err="1" smtClean="0"/>
+              <a:t>lis</a:t>
+            </a:r>
+            <a:r>
+              <a:rPr lang="en-US" altLang="ja-JP" sz="3200" dirty="0" smtClean="0"/>
+              <a:t>) </a:t>
+            </a:r>
+            <a:r>
+              <a:rPr lang="en-US" altLang="ja-JP" sz="3200" dirty="0" err="1" smtClean="0"/>
+              <a:t>init</a:t>
+            </a:r>
+            <a:r>
+              <a:rPr lang="en-US" altLang="ja-JP" sz="3200" dirty="0" smtClean="0"/>
+              <a:t>)</a:t>
+            </a:r>
+          </a:p>
+          <a:p>
+            <a:pPr algn="ctr"/>
+            <a:r>
+              <a:rPr kumimoji="1" lang="ja-JP" altLang="en-US" sz="3200" dirty="0" smtClean="0"/>
+              <a:t>で置き換えて繰り返せばおｋ</a:t>
+            </a:r>
+            <a:endParaRPr kumimoji="1" lang="ja-JP" altLang="en-US" sz="3200" dirty="0"/>
           </a:p>
         </p:txBody>
       </p:sp>
     </p:spTree>
     <p:extLst>
       <p:ext uri="{BB962C8B-B14F-4D97-AF65-F5344CB8AC3E}">
-        <p14:creationId xmlns:p14="http://schemas.microsoft.com/office/powerpoint/2010/main" val="1923805304"/>
+        <p14:creationId xmlns:p14="http://schemas.microsoft.com/office/powerpoint/2010/main" val="2946854418"/>
       </p:ext>
     </p:extLst>
   </p:cSld>
@@ -10404,17 +10820,13 @@
           <a:bodyPr/>
           <a:lstStyle/>
           <a:p>
-            <a:r>
-              <a:rPr kumimoji="1" lang="ja-JP" altLang="en-US" dirty="0" smtClean="0"/>
-              <a:t>余談</a:t>
-            </a:r>
             <a:endParaRPr kumimoji="1" lang="ja-JP" altLang="en-US" dirty="0"/>
           </a:p>
         </p:txBody>
       </p:sp>
       <p:sp>
         <p:nvSpPr>
-          <p:cNvPr id="6" name="コンテンツ プレースホルダー 2"/>
+          <p:cNvPr id="3" name="コンテンツ プレースホルダー 2"/>
           <p:cNvSpPr>
             <a:spLocks noGrp="1"/>
           </p:cNvSpPr>
@@ -10424,8 +10836,8 @@
         </p:nvSpPr>
         <p:spPr>
           <a:xfrm>
-            <a:off x="1043608" y="1447800"/>
-            <a:ext cx="7890080" cy="5077544"/>
+            <a:off x="899592" y="1447800"/>
+            <a:ext cx="8136904" cy="4069432"/>
           </a:xfrm>
         </p:spPr>
         <p:txBody>
@@ -10434,36 +10846,404 @@
           </a:bodyPr>
           <a:lstStyle/>
           <a:p>
-            <a:r>
-              <a:rPr kumimoji="1" lang="ja-JP" altLang="en-US" dirty="0" smtClean="0"/>
-              <a:t>ニコニコ大百科の</a:t>
-            </a:r>
-            <a:r>
-              <a:rPr kumimoji="1" lang="en-US" altLang="ja-JP" dirty="0" smtClean="0"/>
-              <a:t>Lisp</a:t>
-            </a:r>
-            <a:r>
-              <a:rPr kumimoji="1" lang="ja-JP" altLang="en-US" dirty="0" smtClean="0"/>
-              <a:t>の記事が異様に詳しい</a:t>
-            </a:r>
-            <a:endParaRPr lang="en-US" altLang="ja-JP" dirty="0"/>
+            <a:pPr marL="82296" indent="0" algn="ctr">
+              <a:buNone/>
+            </a:pPr>
+            <a:endParaRPr kumimoji="1" lang="en-US" altLang="ja-JP" sz="4400" dirty="0" smtClean="0"/>
+          </a:p>
+          <a:p>
+            <a:pPr marL="82296" indent="0" algn="ctr">
+              <a:buNone/>
+            </a:pPr>
+            <a:endParaRPr kumimoji="1" lang="en-US" altLang="ja-JP" sz="4400" dirty="0" smtClean="0"/>
+          </a:p>
+          <a:p>
+            <a:pPr marL="82296" indent="0" algn="ctr">
+              <a:buNone/>
+            </a:pPr>
+            <a:r>
+              <a:rPr kumimoji="1" lang="ja-JP" altLang="en-US" sz="4400" dirty="0" smtClean="0"/>
+              <a:t>慣れが必要</a:t>
+            </a:r>
+            <a:endParaRPr kumimoji="1" lang="en-US" altLang="ja-JP" sz="4400" dirty="0" smtClean="0"/>
           </a:p>
         </p:txBody>
       </p:sp>
     </p:spTree>
     <p:extLst>
       <p:ext uri="{BB962C8B-B14F-4D97-AF65-F5344CB8AC3E}">
-        <p14:creationId xmlns:p14="http://schemas.microsoft.com/office/powerpoint/2010/main" val="3823870900"/>
+        <p14:creationId xmlns:p14="http://schemas.microsoft.com/office/powerpoint/2010/main" val="1923805304"/>
       </p:ext>
     </p:extLst>
   </p:cSld>
   <p:clrMapOvr>
     <a:masterClrMapping/>
   </p:clrMapOvr>
+  <p:timing>
+    <p:tnLst>
+      <p:par>
+        <p:cTn id="1" dur="indefinite" restart="never" nodeType="tmRoot"/>
+      </p:par>
+    </p:tnLst>
+  </p:timing>
 </p:sld>
 </file>
 
 <file path=ppt/slides/slide36.xml><?xml version="1.0" encoding="utf-8"?>
+<p:sld xmlns:a="http://schemas.openxmlformats.org/drawingml/2006/main" xmlns:r="http://schemas.openxmlformats.org/officeDocument/2006/relationships" xmlns:p="http://schemas.openxmlformats.org/presentationml/2006/main">
+  <p:cSld>
+    <p:spTree>
+      <p:nvGrpSpPr>
+        <p:cNvPr id="1" name=""/>
+        <p:cNvGrpSpPr/>
+        <p:nvPr/>
+      </p:nvGrpSpPr>
+      <p:grpSpPr>
+        <a:xfrm>
+          <a:off x="0" y="0"/>
+          <a:ext cx="0" cy="0"/>
+          <a:chOff x="0" y="0"/>
+          <a:chExt cx="0" cy="0"/>
+        </a:xfrm>
+      </p:grpSpPr>
+      <p:sp>
+        <p:nvSpPr>
+          <p:cNvPr id="2" name="タイトル 1"/>
+          <p:cNvSpPr>
+            <a:spLocks noGrp="1"/>
+          </p:cNvSpPr>
+          <p:nvPr>
+            <p:ph type="title"/>
+          </p:nvPr>
+        </p:nvSpPr>
+        <p:spPr/>
+        <p:txBody>
+          <a:bodyPr/>
+          <a:lstStyle/>
+          <a:p>
+            <a:r>
+              <a:rPr kumimoji="1" lang="ja-JP" altLang="en-US" dirty="0" smtClean="0"/>
+              <a:t>感想</a:t>
+            </a:r>
+            <a:endParaRPr kumimoji="1" lang="ja-JP" altLang="en-US" dirty="0"/>
+          </a:p>
+        </p:txBody>
+      </p:sp>
+      <p:sp>
+        <p:nvSpPr>
+          <p:cNvPr id="3" name="コンテンツ プレースホルダー 2"/>
+          <p:cNvSpPr>
+            <a:spLocks noGrp="1"/>
+          </p:cNvSpPr>
+          <p:nvPr>
+            <p:ph idx="1"/>
+          </p:nvPr>
+        </p:nvSpPr>
+        <p:spPr>
+          <a:xfrm>
+            <a:off x="1115616" y="1124744"/>
+            <a:ext cx="7818072" cy="5544616"/>
+          </a:xfrm>
+        </p:spPr>
+        <p:txBody>
+          <a:bodyPr>
+            <a:normAutofit lnSpcReduction="10000"/>
+          </a:bodyPr>
+          <a:lstStyle/>
+          <a:p>
+            <a:pPr marL="82296" indent="0">
+              <a:buNone/>
+            </a:pPr>
+            <a:r>
+              <a:rPr lang="ja-JP" altLang="en-US" dirty="0" smtClean="0"/>
+              <a:t>・</a:t>
+            </a:r>
+            <a:r>
+              <a:rPr lang="en-US" altLang="ja-JP" dirty="0" smtClean="0"/>
+              <a:t>Java</a:t>
+            </a:r>
+            <a:r>
+              <a:rPr lang="ja-JP" altLang="en-US" dirty="0" smtClean="0"/>
+              <a:t>とのパラダイムの違いに戸惑う</a:t>
+            </a:r>
+            <a:endParaRPr lang="en-US" altLang="ja-JP" dirty="0" smtClean="0"/>
+          </a:p>
+          <a:p>
+            <a:pPr marL="82296" indent="0">
+              <a:buNone/>
+            </a:pPr>
+            <a:endParaRPr lang="en-US" altLang="ja-JP" dirty="0"/>
+          </a:p>
+          <a:p>
+            <a:pPr marL="82296" indent="0">
+              <a:buNone/>
+            </a:pPr>
+            <a:r>
+              <a:rPr lang="ja-JP" altLang="en-US" dirty="0" smtClean="0"/>
+              <a:t>・特に</a:t>
+            </a:r>
+            <a:r>
+              <a:rPr lang="ja-JP" altLang="en-US" dirty="0"/>
+              <a:t>再帰処理</a:t>
+            </a:r>
+            <a:r>
+              <a:rPr lang="ja-JP" altLang="en-US" dirty="0" smtClean="0"/>
+              <a:t>は慣れないと難しい</a:t>
+            </a:r>
+            <a:endParaRPr lang="en-US" altLang="ja-JP" dirty="0" smtClean="0"/>
+          </a:p>
+          <a:p>
+            <a:pPr marL="82296" indent="0">
+              <a:buNone/>
+            </a:pPr>
+            <a:endParaRPr lang="en-US" altLang="ja-JP" dirty="0"/>
+          </a:p>
+          <a:p>
+            <a:pPr marL="82296" indent="0">
+              <a:buNone/>
+            </a:pPr>
+            <a:r>
+              <a:rPr lang="ja-JP" altLang="en-US" dirty="0"/>
+              <a:t>・“自分で</a:t>
+            </a:r>
+            <a:r>
+              <a:rPr lang="ja-JP" altLang="en-US" dirty="0" smtClean="0"/>
+              <a:t>いろいろ言語拡張</a:t>
+            </a:r>
+            <a:r>
+              <a:rPr lang="ja-JP" altLang="en-US" dirty="0"/>
+              <a:t>できる</a:t>
+            </a:r>
+            <a:r>
+              <a:rPr lang="ja-JP" altLang="en-US" dirty="0" smtClean="0"/>
+              <a:t>“感は</a:t>
+            </a:r>
+            <a:r>
+              <a:rPr lang="ja-JP" altLang="en-US" dirty="0"/>
+              <a:t>すごい</a:t>
+            </a:r>
+            <a:endParaRPr lang="en-US" altLang="ja-JP" dirty="0"/>
+          </a:p>
+          <a:p>
+            <a:pPr marL="82296" indent="0">
+              <a:buNone/>
+            </a:pPr>
+            <a:endParaRPr lang="en-US" altLang="ja-JP" dirty="0" smtClean="0"/>
+          </a:p>
+          <a:p>
+            <a:pPr marL="82296" indent="0">
+              <a:buNone/>
+            </a:pPr>
+            <a:r>
+              <a:rPr lang="ja-JP" altLang="en-US" dirty="0" smtClean="0"/>
+              <a:t>・括弧が多い</a:t>
+            </a:r>
+            <a:endParaRPr lang="en-US" altLang="ja-JP" dirty="0"/>
+          </a:p>
+          <a:p>
+            <a:pPr marL="82296" indent="0">
+              <a:buNone/>
+            </a:pPr>
+            <a:endParaRPr lang="en-US" altLang="ja-JP" dirty="0" smtClean="0"/>
+          </a:p>
+          <a:p>
+            <a:pPr marL="82296" indent="0">
+              <a:buNone/>
+            </a:pPr>
+            <a:r>
+              <a:rPr lang="ja-JP" altLang="en-US" dirty="0" smtClean="0"/>
+              <a:t>・</a:t>
+            </a:r>
+            <a:r>
+              <a:rPr lang="en-US" altLang="ja-JP" dirty="0" smtClean="0"/>
+              <a:t>(</a:t>
+            </a:r>
+            <a:r>
+              <a:rPr lang="ja-JP" altLang="en-US" dirty="0" smtClean="0"/>
+              <a:t>余談</a:t>
+            </a:r>
+            <a:r>
+              <a:rPr lang="en-US" altLang="ja-JP" dirty="0" smtClean="0"/>
+              <a:t>)</a:t>
+            </a:r>
+            <a:r>
+              <a:rPr lang="ja-JP" altLang="en-US" dirty="0" smtClean="0"/>
+              <a:t>ニコニコ</a:t>
+            </a:r>
+            <a:r>
+              <a:rPr lang="ja-JP" altLang="en-US" dirty="0"/>
+              <a:t>大百科</a:t>
+            </a:r>
+            <a:r>
+              <a:rPr lang="ja-JP" altLang="en-US" dirty="0" smtClean="0"/>
+              <a:t>の</a:t>
+            </a:r>
+            <a:endParaRPr lang="en-US" altLang="ja-JP" dirty="0" smtClean="0"/>
+          </a:p>
+          <a:p>
+            <a:pPr marL="82296" indent="0">
+              <a:buNone/>
+            </a:pPr>
+            <a:r>
+              <a:rPr lang="ja-JP" altLang="en-US" dirty="0"/>
+              <a:t>　</a:t>
+            </a:r>
+            <a:r>
+              <a:rPr lang="en-US" altLang="ja-JP" dirty="0" smtClean="0"/>
+              <a:t>Lisp</a:t>
+            </a:r>
+            <a:r>
+              <a:rPr lang="ja-JP" altLang="en-US" dirty="0"/>
+              <a:t>の記事が異様に詳しい</a:t>
+            </a:r>
+            <a:endParaRPr lang="en-US" altLang="ja-JP" dirty="0" smtClean="0"/>
+          </a:p>
+          <a:p>
+            <a:pPr marL="82296" indent="0">
+              <a:buNone/>
+            </a:pPr>
+            <a:endParaRPr lang="en-US" altLang="ja-JP" dirty="0" smtClean="0"/>
+          </a:p>
+        </p:txBody>
+      </p:sp>
+    </p:spTree>
+    <p:extLst>
+      <p:ext uri="{BB962C8B-B14F-4D97-AF65-F5344CB8AC3E}">
+        <p14:creationId xmlns:p14="http://schemas.microsoft.com/office/powerpoint/2010/main" val="3093156977"/>
+      </p:ext>
+    </p:extLst>
+  </p:cSld>
+  <p:clrMapOvr>
+    <a:masterClrMapping/>
+  </p:clrMapOvr>
+  <p:timing>
+    <p:tnLst>
+      <p:par>
+        <p:cTn id="1" dur="indefinite" restart="never" nodeType="tmRoot"/>
+      </p:par>
+    </p:tnLst>
+  </p:timing>
+</p:sld>
+</file>
+
+<file path=ppt/slides/slide37.xml><?xml version="1.0" encoding="utf-8"?>
+<p:sld xmlns:a="http://schemas.openxmlformats.org/drawingml/2006/main" xmlns:r="http://schemas.openxmlformats.org/officeDocument/2006/relationships" xmlns:p="http://schemas.openxmlformats.org/presentationml/2006/main">
+  <p:cSld>
+    <p:spTree>
+      <p:nvGrpSpPr>
+        <p:cNvPr id="1" name=""/>
+        <p:cNvGrpSpPr/>
+        <p:nvPr/>
+      </p:nvGrpSpPr>
+      <p:grpSpPr>
+        <a:xfrm>
+          <a:off x="0" y="0"/>
+          <a:ext cx="0" cy="0"/>
+          <a:chOff x="0" y="0"/>
+          <a:chExt cx="0" cy="0"/>
+        </a:xfrm>
+      </p:grpSpPr>
+      <p:sp>
+        <p:nvSpPr>
+          <p:cNvPr id="2" name="タイトル 1"/>
+          <p:cNvSpPr>
+            <a:spLocks noGrp="1"/>
+          </p:cNvSpPr>
+          <p:nvPr>
+            <p:ph type="title"/>
+          </p:nvPr>
+        </p:nvSpPr>
+        <p:spPr/>
+        <p:txBody>
+          <a:bodyPr/>
+          <a:lstStyle/>
+          <a:p>
+            <a:r>
+              <a:rPr kumimoji="1" lang="ja-JP" altLang="en-US" dirty="0" smtClean="0"/>
+              <a:t>次回？</a:t>
+            </a:r>
+            <a:endParaRPr kumimoji="1" lang="ja-JP" altLang="en-US" dirty="0"/>
+          </a:p>
+        </p:txBody>
+      </p:sp>
+      <p:sp>
+        <p:nvSpPr>
+          <p:cNvPr id="3" name="コンテンツ プレースホルダー 2"/>
+          <p:cNvSpPr>
+            <a:spLocks noGrp="1"/>
+          </p:cNvSpPr>
+          <p:nvPr>
+            <p:ph idx="1"/>
+          </p:nvPr>
+        </p:nvSpPr>
+        <p:spPr>
+          <a:xfrm>
+            <a:off x="1115616" y="1124744"/>
+            <a:ext cx="7818072" cy="5544616"/>
+          </a:xfrm>
+        </p:spPr>
+        <p:txBody>
+          <a:bodyPr>
+            <a:normAutofit/>
+          </a:bodyPr>
+          <a:lstStyle/>
+          <a:p>
+            <a:pPr marL="82296" indent="0">
+              <a:buNone/>
+            </a:pPr>
+            <a:r>
+              <a:rPr lang="ja-JP" altLang="en-US" dirty="0" smtClean="0"/>
+              <a:t>・もうすこし深堀りしたい</a:t>
+            </a:r>
+            <a:endParaRPr lang="en-US" altLang="ja-JP" dirty="0" smtClean="0"/>
+          </a:p>
+          <a:p>
+            <a:pPr marL="82296" indent="0">
+              <a:buNone/>
+            </a:pPr>
+            <a:endParaRPr lang="en-US" altLang="ja-JP" dirty="0"/>
+          </a:p>
+          <a:p>
+            <a:pPr marL="82296" indent="0">
+              <a:buNone/>
+            </a:pPr>
+            <a:r>
+              <a:rPr lang="ja-JP" altLang="en-US" dirty="0" smtClean="0"/>
+              <a:t>・</a:t>
+            </a:r>
+            <a:r>
+              <a:rPr lang="en-US" altLang="ja-JP" dirty="0" err="1" smtClean="0"/>
+              <a:t>Emacs</a:t>
+            </a:r>
+            <a:r>
+              <a:rPr lang="ja-JP" altLang="en-US" dirty="0" smtClean="0"/>
+              <a:t>に手を出す？</a:t>
+            </a:r>
+            <a:endParaRPr lang="en-US" altLang="ja-JP" dirty="0" smtClean="0"/>
+          </a:p>
+        </p:txBody>
+      </p:sp>
+    </p:spTree>
+    <p:extLst>
+      <p:ext uri="{BB962C8B-B14F-4D97-AF65-F5344CB8AC3E}">
+        <p14:creationId xmlns:p14="http://schemas.microsoft.com/office/powerpoint/2010/main" val="1255941180"/>
+      </p:ext>
+    </p:extLst>
+  </p:cSld>
+  <p:clrMapOvr>
+    <a:masterClrMapping/>
+  </p:clrMapOvr>
+  <p:timing>
+    <p:tnLst>
+      <p:par>
+        <p:cTn id="1" dur="indefinite" restart="never" nodeType="tmRoot"/>
+      </p:par>
+    </p:tnLst>
+  </p:timing>
+</p:sld>
+</file>
+
+<file path=ppt/slides/slide38.xml><?xml version="1.0" encoding="utf-8"?>
 <p:sld xmlns:a="http://schemas.openxmlformats.org/drawingml/2006/main" xmlns:r="http://schemas.openxmlformats.org/officeDocument/2006/relationships" xmlns:p="http://schemas.openxmlformats.org/presentationml/2006/main">
   <p:cSld>
     <p:spTree>

</xml_diff>